<commit_message>
Part 3 Linear Regression Done
</commit_message>
<xml_diff>
--- a/Lab 5 - Predictive Analysis II/Linear Regression.pptx
+++ b/Lab 5 - Predictive Analysis II/Linear Regression.pptx
@@ -634,7 +634,7 @@
           <a:p>
             <a:fld id="{600A5673-BFAD-40C6-8655-65E761A5BBFA}" type="datetime1">
               <a:rPr lang="en-US" smtClean="0"/>
-              <a:t>4/5/2024</a:t>
+              <a:t>4/8/2024</a:t>
             </a:fld>
             <a:endParaRPr lang="en-US"/>
           </a:p>
@@ -5296,7 +5296,7 @@
           <a:p>
             <a:fld id="{93E09D05-EC44-487D-A528-587D6898A5DB}" type="datetime1">
               <a:rPr lang="en-US" smtClean="0"/>
-              <a:t>4/5/2024</a:t>
+              <a:t>4/7/2024</a:t>
             </a:fld>
             <a:endParaRPr lang="en-US"/>
           </a:p>
@@ -5655,7 +5655,7 @@
           <a:p>
             <a:fld id="{B1AE50B0-8BBC-4AEF-A46D-E7E0E2E23F80}" type="datetime1">
               <a:rPr lang="en-US" smtClean="0"/>
-              <a:t>4/5/2024</a:t>
+              <a:t>4/7/2024</a:t>
             </a:fld>
             <a:endParaRPr lang="en-US"/>
           </a:p>
@@ -5765,45 +5765,183 @@
           <a:lstStyle/>
           <a:p>
             <a:r>
+              <a:rPr lang="en-US" baseline="0" dirty="0"/>
+              <a:t>Creating a  hold-out data set (we discussed this in Apriori diagnostics earlier in lesson 2 of this module) before you fit the model, and using that to estimate prediction error is by far the easiest thing to do.</a:t>
+            </a:r>
+          </a:p>
+          <a:p>
+            <a:r>
+              <a:rPr lang="en-US" baseline="0" dirty="0"/>
+              <a:t>There are two kinds of errors in predictive models One is the training error and the other is the prediction error.  sets is the easiest way to estimate the prediction errors.</a:t>
+            </a:r>
+          </a:p>
+          <a:p>
+            <a:r>
+              <a:rPr lang="en-US" baseline="0" dirty="0"/>
+              <a:t>N-fold cross validation – it tells you if your set of variables is reasonable. </a:t>
+            </a:r>
+            <a:r>
+              <a:rPr lang="en-US" b="1" baseline="0" dirty="0"/>
+              <a:t>This method is used when you don't have enough data to create a  (test set) data. </a:t>
+            </a:r>
+          </a:p>
+          <a:p>
+            <a:pPr defTabSz="970202">
+              <a:defRPr/>
+            </a:pPr>
+            <a:r>
               <a:rPr lang="en-US" dirty="0"/>
-              <a:t>Once we determine the fit is good we need to perform the sanity checks. Linear regression is an </a:t>
-            </a:r>
-            <a:r>
-              <a:rPr lang="en-US" b="1" dirty="0"/>
-              <a:t>explanatory</a:t>
+              <a:t>Cross Validation is done by Splitting</a:t>
+            </a:r>
+            <a:r>
+              <a:rPr lang="en-US" baseline="0" dirty="0"/>
+              <a:t> the </a:t>
             </a:r>
             <a:r>
               <a:rPr lang="en-US" dirty="0"/>
-              <a:t> model and the coefficients provide the required details.</a:t>
-            </a:r>
-          </a:p>
-          <a:p>
+              <a:t>dataset into, say, N</a:t>
+            </a:r>
+            <a:r>
+              <a:rPr lang="en-US" baseline="0" dirty="0"/>
+              <a:t> </a:t>
+            </a:r>
             <a:r>
               <a:rPr lang="en-US" dirty="0"/>
-              <a:t>First check on</a:t>
+              <a:t>non-overlapping subsets (fold) , Fit a model using N-1 folds and predict its performance using the fold that was left out. This can be done for all possible combination of folds (first leave 1st fold out, then 2nd, .. , then Nth and train with the remaining folds). After completing</a:t>
             </a:r>
             <a:r>
               <a:rPr lang="en-US" baseline="0" dirty="0"/>
-              <a:t> the sign of the coefficients. Do the signs make sense? For example should the income increase with age or years of education? The coefficients should be positive. If not there might be something wrong. It is often an indicator that the variables are correlated to each other. Regression works best if all the drivers are independent. This does not in fact affect the predictive power but the explanatory capability is compromised here.</a:t>
-            </a:r>
-          </a:p>
-          <a:p>
+              <a:t> the fit on all possible folds</a:t>
+            </a:r>
+            <a:r>
+              <a:rPr lang="en-US" dirty="0"/>
+              <a:t> you estimate the mean performance of all folds (maybe also the variance/standard deviation of the performance).</a:t>
+            </a:r>
+          </a:p>
+          <a:p>
+            <a:pPr defTabSz="970202">
+              <a:defRPr/>
+            </a:pPr>
             <a:r>
               <a:rPr lang="en-US" baseline="0" dirty="0"/>
-              <a:t>We also need to check if the magnitude of the coefficients make sense? They sometimes can become excessively large and we prefer them not to be very large. This is also an indication of strongly correlated inputs. In this case consider eliminating some variables or use other regularized regression techniques such as Ridge and Lasso (Out of scope for this course). These techniques impose a penalty function on large coefficients and keep them in a desirable range.</a:t>
-            </a:r>
-          </a:p>
-          <a:p>
+              <a:t>R</a:t>
+            </a:r>
+            <a:r>
+              <a:rPr lang="en-US" baseline="30000" dirty="0"/>
+              <a:t>2</a:t>
+            </a:r>
             <a:r>
               <a:rPr lang="en-US" baseline="0" dirty="0"/>
-              <a:t>Sometimes you may get infinite magnitude coefficients (R package for OLS will report an error on this)  which could indicate that there is a variable that strongly predicts a certain subset of the output and does not predict well on the rest. For example there is a range of age for which the output income is perfectly predicted. In such conditions plot the output vs. the input and determine the segment at which the prediction goes wrong. Then segment the data before fitting the model.</a:t>
+              <a:t>  (goodness of fit metric) is reported by all standard packages</a:t>
+            </a:r>
+            <a:r>
+              <a:rPr lang="en-US" u="sng" baseline="0" dirty="0"/>
+              <a:t>. It is the </a:t>
+            </a:r>
+            <a:r>
+              <a:rPr lang="en-US" u="sng" dirty="0"/>
+              <a:t> fraction of the variance in the output variable that the model can explain</a:t>
+            </a:r>
+            <a:r>
+              <a:rPr lang="en-US" dirty="0"/>
+              <a:t>.</a:t>
+            </a:r>
+          </a:p>
+          <a:p>
+            <a:pPr defTabSz="970202">
+              <a:defRPr/>
+            </a:pPr>
+            <a:r>
+              <a:rPr lang="en-US" baseline="0" dirty="0"/>
+              <a:t> The definition of R</a:t>
+            </a:r>
+            <a:r>
+              <a:rPr lang="en-US" baseline="30000" dirty="0"/>
+              <a:t>2</a:t>
+            </a:r>
+            <a:r>
+              <a:rPr lang="en-US" baseline="0" dirty="0"/>
+              <a:t> is  1 – SSerr/SStot  where </a:t>
+            </a:r>
+          </a:p>
+          <a:p>
+            <a:pPr defTabSz="970202">
+              <a:defRPr/>
+            </a:pPr>
+            <a:r>
+              <a:rPr lang="en-US" baseline="0" dirty="0"/>
+              <a:t> SSerr = Sum[(y-y</a:t>
+            </a:r>
+            <a:r>
+              <a:rPr lang="en-US" baseline="-25000" dirty="0"/>
+              <a:t>pred</a:t>
+            </a:r>
+            <a:r>
+              <a:rPr lang="en-US" baseline="0" dirty="0"/>
+              <a:t>)</a:t>
+            </a:r>
+            <a:r>
+              <a:rPr lang="en-US" baseline="30000" dirty="0"/>
+              <a:t>2</a:t>
+            </a:r>
+            <a:r>
+              <a:rPr lang="en-US" baseline="0" dirty="0"/>
+              <a:t>] and </a:t>
+            </a:r>
+          </a:p>
+          <a:p>
+            <a:pPr defTabSz="970202">
+              <a:defRPr/>
+            </a:pPr>
+            <a:r>
+              <a:rPr lang="en-US" baseline="0" dirty="0"/>
+              <a:t> SStot = Sum[(y-y</a:t>
+            </a:r>
+            <a:r>
+              <a:rPr lang="en-US" baseline="-25000" dirty="0"/>
+              <a:t>mean</a:t>
+            </a:r>
+            <a:r>
+              <a:rPr lang="en-US" baseline="0" dirty="0"/>
+              <a:t>)</a:t>
+            </a:r>
+            <a:r>
+              <a:rPr lang="en-US" baseline="30000" dirty="0"/>
+              <a:t>2</a:t>
+            </a:r>
+            <a:r>
+              <a:rPr lang="en-US" baseline="0" dirty="0"/>
+              <a:t>]. </a:t>
+            </a:r>
+          </a:p>
+          <a:p>
+            <a:pPr defTabSz="970202">
+              <a:defRPr/>
+            </a:pPr>
+            <a:r>
+              <a:rPr lang="en-US" baseline="0" dirty="0"/>
+              <a:t>For the output of a correlated model, like regression, this definition will be the square of the correlation. For a good fit we want R</a:t>
+            </a:r>
+            <a:r>
+              <a:rPr lang="en-US" baseline="30000" dirty="0"/>
+              <a:t>2</a:t>
+            </a:r>
+            <a:r>
+              <a:rPr lang="en-US" baseline="0" dirty="0"/>
+              <a:t>  as close to 1 as possible.</a:t>
+            </a:r>
+          </a:p>
+          <a:p>
+            <a:pPr defTabSz="970202">
+              <a:defRPr/>
+            </a:pPr>
+            <a:r>
+              <a:rPr lang="en-US" baseline="0" dirty="0"/>
+              <a:t>Reference for n-fold cross validation is "Ensemble Methods in Data Mining", Seni and Elder. Nice succinct description.</a:t>
             </a:r>
           </a:p>
           <a:p>
             <a:endParaRPr lang="en-US" baseline="0" dirty="0"/>
-          </a:p>
-          <a:p>
-            <a:endParaRPr lang="en-US" dirty="0"/>
           </a:p>
         </p:txBody>
       </p:sp>
@@ -5830,7 +5968,7 @@
               <a:pPr>
                 <a:defRPr/>
               </a:pPr>
-              <a:t>36</a:t>
+              <a:t>35</a:t>
             </a:fld>
             <a:endParaRPr lang="en-US" dirty="0"/>
           </a:p>
@@ -5918,36 +6056,38 @@
           <a:p>
             <a:r>
               <a:rPr lang="en-US" dirty="0"/>
-              <a:t>Even if everything</a:t>
+              <a:t>Once we determine the fit is good we need to perform the sanity checks. Linear regression is an </a:t>
+            </a:r>
+            <a:r>
+              <a:rPr lang="en-US" b="1" dirty="0"/>
+              <a:t>explanatory</a:t>
+            </a:r>
+            <a:r>
+              <a:rPr lang="en-US" dirty="0"/>
+              <a:t> model and the coefficients provide the required details.</a:t>
+            </a:r>
+          </a:p>
+          <a:p>
+            <a:r>
+              <a:rPr lang="en-US" dirty="0"/>
+              <a:t>First check on</a:t>
             </a:r>
             <a:r>
               <a:rPr lang="en-US" baseline="0" dirty="0"/>
-              <a:t> before looks fairly reasonable, it's still a good idea to plot the prediction vs. true outcome. R base package comes with standard graphs but developing plots as the one shown here (generated with ggplot2) is more intuitive for stakeholders to understand. </a:t>
+              <a:t> the sign of the coefficients. Do the signs make sense? For example should the income increase with age or years of education? The coefficients should be positive. If not there might be something wrong. It is often an indicator that the variables are correlated to each other. Regression works best if all the drivers are independent. This does not in fact affect the predictive power but the explanatory capability is compromised here.</a:t>
             </a:r>
           </a:p>
           <a:p>
             <a:r>
               <a:rPr lang="en-US" baseline="0" dirty="0"/>
-              <a:t>What you have to look for is that the model does not systematically over predict or under predict in certain ranges. We want the variance to be Consistent (the cloud around the line to be symmetrical). These plots also identify the obvious outliers in the data.</a:t>
+              <a:t>We also need to check if the magnitude of the coefficients make sense? They sometimes can become excessively large and we prefer them not to be very large. This is also an indication of strongly correlated inputs. In this case consider eliminating some variables or use other regularized regression techniques such as Ridge and Lasso (Out of scope for this course). These techniques impose a penalty function on large coefficients and keep them in a desirable range.</a:t>
             </a:r>
           </a:p>
           <a:p>
             <a:r>
               <a:rPr lang="en-US" baseline="0" dirty="0"/>
-              <a:t>The two graphs show examples of a model in which we over predict for low true values and under predict at higher values. (Graph on the top of the slide).</a:t>
-            </a:r>
-          </a:p>
-          <a:p>
-            <a:r>
-              <a:rPr lang="en-US" baseline="0" dirty="0"/>
-              <a:t>The graph at the bottom shows an improvement of the model (selecting the correct range, eliminating correlated variables etc). Even in this plot we still do not see a consistent variance but the model fit seems to be better here.</a:t>
-            </a:r>
-          </a:p>
-          <a:p>
-            <a:endParaRPr lang="en-US" baseline="0" dirty="0"/>
-          </a:p>
-          <a:p>
-            <a:endParaRPr lang="en-US" baseline="0" dirty="0"/>
+              <a:t>Sometimes you may get infinite magnitude coefficients (R package for OLS will report an error on this)  which could indicate that there is a variable that strongly predicts a certain subset of the output and does not predict well on the rest. For example there is a range of age for which the output income is perfectly predicted. In such conditions plot the output vs. the input and determine the segment at which the prediction goes wrong. Then segment the data before fitting the model.</a:t>
+            </a:r>
           </a:p>
           <a:p>
             <a:endParaRPr lang="en-US" baseline="0" dirty="0"/>
@@ -5980,7 +6120,7 @@
               <a:pPr>
                 <a:defRPr/>
               </a:pPr>
-              <a:t>37</a:t>
+              <a:t>36</a:t>
             </a:fld>
             <a:endParaRPr lang="en-US" dirty="0"/>
           </a:p>
@@ -6021,6 +6161,156 @@
 </file>
 
 <file path=ppt/notesSlides/notesSlide12.xml><?xml version="1.0" encoding="utf-8"?>
+<p:notes xmlns:a="http://schemas.openxmlformats.org/drawingml/2006/main" xmlns:r="http://schemas.openxmlformats.org/officeDocument/2006/relationships" xmlns:p="http://schemas.openxmlformats.org/presentationml/2006/main">
+  <p:cSld>
+    <p:spTree>
+      <p:nvGrpSpPr>
+        <p:cNvPr id="1" name=""/>
+        <p:cNvGrpSpPr/>
+        <p:nvPr/>
+      </p:nvGrpSpPr>
+      <p:grpSpPr>
+        <a:xfrm>
+          <a:off x="0" y="0"/>
+          <a:ext cx="0" cy="0"/>
+          <a:chOff x="0" y="0"/>
+          <a:chExt cx="0" cy="0"/>
+        </a:xfrm>
+      </p:grpSpPr>
+      <p:sp>
+        <p:nvSpPr>
+          <p:cNvPr id="2" name="Slide Image Placeholder 1"/>
+          <p:cNvSpPr>
+            <a:spLocks noGrp="1" noRot="1" noChangeAspect="1"/>
+          </p:cNvSpPr>
+          <p:nvPr>
+            <p:ph type="sldImg"/>
+          </p:nvPr>
+        </p:nvSpPr>
+        <p:spPr/>
+      </p:sp>
+      <p:sp>
+        <p:nvSpPr>
+          <p:cNvPr id="3" name="Notes Placeholder 2"/>
+          <p:cNvSpPr>
+            <a:spLocks noGrp="1"/>
+          </p:cNvSpPr>
+          <p:nvPr>
+            <p:ph type="body" idx="1"/>
+          </p:nvPr>
+        </p:nvSpPr>
+        <p:spPr/>
+        <p:txBody>
+          <a:bodyPr lIns="97020" tIns="48510" rIns="97020" bIns="48510">
+            <a:normAutofit/>
+          </a:bodyPr>
+          <a:lstStyle/>
+          <a:p>
+            <a:r>
+              <a:rPr lang="en-US" dirty="0"/>
+              <a:t>Even if everything</a:t>
+            </a:r>
+            <a:r>
+              <a:rPr lang="en-US" baseline="0" dirty="0"/>
+              <a:t> before looks fairly reasonable, it's still a good idea to plot the prediction vs. true outcome. R base package comes with standard graphs but developing plots as the one shown here (generated with ggplot2) is more intuitive for stakeholders to understand. </a:t>
+            </a:r>
+          </a:p>
+          <a:p>
+            <a:r>
+              <a:rPr lang="en-US" baseline="0" dirty="0"/>
+              <a:t>What you have to look for is that the model does not systematically over predict or under predict in certain ranges. We want the variance to be Consistent (the cloud around the line to be symmetrical). These plots also identify the obvious outliers in the data.</a:t>
+            </a:r>
+          </a:p>
+          <a:p>
+            <a:r>
+              <a:rPr lang="en-US" baseline="0" dirty="0"/>
+              <a:t>The two graphs show examples of a model in which we over predict for low true values and under predict at higher values. (Graph on the top of the slide).</a:t>
+            </a:r>
+          </a:p>
+          <a:p>
+            <a:r>
+              <a:rPr lang="en-US" baseline="0" dirty="0"/>
+              <a:t>The graph at the bottom shows an improvement of the model (selecting the correct range, eliminating correlated variables etc). Even in this plot we still do not see a consistent variance but the model fit seems to be better here.</a:t>
+            </a:r>
+          </a:p>
+          <a:p>
+            <a:endParaRPr lang="en-US" baseline="0" dirty="0"/>
+          </a:p>
+          <a:p>
+            <a:endParaRPr lang="en-US" baseline="0" dirty="0"/>
+          </a:p>
+          <a:p>
+            <a:endParaRPr lang="en-US" baseline="0" dirty="0"/>
+          </a:p>
+          <a:p>
+            <a:endParaRPr lang="en-US" dirty="0"/>
+          </a:p>
+        </p:txBody>
+      </p:sp>
+      <p:sp>
+        <p:nvSpPr>
+          <p:cNvPr id="6" name="Slide Number Placeholder 5"/>
+          <p:cNvSpPr>
+            <a:spLocks noGrp="1"/>
+          </p:cNvSpPr>
+          <p:nvPr>
+            <p:ph type="sldNum" sz="quarter" idx="10"/>
+          </p:nvPr>
+        </p:nvSpPr>
+        <p:spPr/>
+        <p:txBody>
+          <a:bodyPr/>
+          <a:lstStyle/>
+          <a:p>
+            <a:pPr>
+              <a:defRPr/>
+            </a:pPr>
+            <a:fld id="{80249327-EC2F-4096-8D35-6B76097739FC}" type="slidenum">
+              <a:rPr lang="en-US" smtClean="0"/>
+              <a:pPr>
+                <a:defRPr/>
+              </a:pPr>
+              <a:t>37</a:t>
+            </a:fld>
+            <a:endParaRPr lang="en-US" dirty="0"/>
+          </a:p>
+        </p:txBody>
+      </p:sp>
+      <p:sp>
+        <p:nvSpPr>
+          <p:cNvPr id="7" name="Footer Placeholder 6"/>
+          <p:cNvSpPr>
+            <a:spLocks noGrp="1"/>
+          </p:cNvSpPr>
+          <p:nvPr>
+            <p:ph type="ftr" sz="quarter" idx="11"/>
+          </p:nvPr>
+        </p:nvSpPr>
+        <p:spPr/>
+        <p:txBody>
+          <a:bodyPr/>
+          <a:lstStyle/>
+          <a:p>
+            <a:pPr>
+              <a:defRPr/>
+            </a:pPr>
+            <a:r>
+              <a:rPr lang="en-US"/>
+              <a:t>Linear Regression</a:t>
+            </a:r>
+            <a:endParaRPr lang="en-US" dirty="0"/>
+          </a:p>
+        </p:txBody>
+      </p:sp>
+    </p:spTree>
+  </p:cSld>
+  <p:clrMapOvr>
+    <a:masterClrMapping/>
+  </p:clrMapOvr>
+</p:notes>
+</file>
+
+<file path=ppt/notesSlides/notesSlide13.xml><?xml version="1.0" encoding="utf-8"?>
 <p:notes xmlns:a="http://schemas.openxmlformats.org/drawingml/2006/main" xmlns:r="http://schemas.openxmlformats.org/officeDocument/2006/relationships" xmlns:p="http://schemas.openxmlformats.org/presentationml/2006/main">
   <p:cSld>
     <p:spTree>
@@ -6587,7 +6877,7 @@
           <a:p>
             <a:fld id="{93E09D05-EC44-487D-A528-587D6898A5DB}" type="datetime1">
               <a:rPr lang="en-US" smtClean="0"/>
-              <a:t>4/5/2024</a:t>
+              <a:t>4/7/2024</a:t>
             </a:fld>
             <a:endParaRPr lang="en-US"/>
           </a:p>
@@ -7842,7 +8132,7 @@
           <a:p>
             <a:fld id="{93E09D05-EC44-487D-A528-587D6898A5DB}" type="datetime1">
               <a:rPr lang="en-US" smtClean="0"/>
-              <a:t>4/5/2024</a:t>
+              <a:t>4/7/2024</a:t>
             </a:fld>
             <a:endParaRPr lang="en-US"/>
           </a:p>
@@ -7947,200 +8237,21 @@
         </p:nvSpPr>
         <p:spPr/>
         <p:txBody>
-          <a:bodyPr lIns="97020" tIns="48510" rIns="97020" bIns="48510">
-            <a:normAutofit/>
-          </a:bodyPr>
+          <a:bodyPr/>
           <a:lstStyle/>
           <a:p>
-            <a:r>
-              <a:rPr lang="en-US" baseline="0" dirty="0"/>
-              <a:t>Creating a  hold-out data set (we discussed this in Apriori diagnostics earlier in lesson 2 of this module) before you fit the model, and using that to estimate prediction error is by far the easiest thing to do.</a:t>
-            </a:r>
-          </a:p>
-          <a:p>
-            <a:r>
-              <a:rPr lang="en-US" baseline="0" dirty="0"/>
-              <a:t>There are two kinds of errors in predictive models One is the training error and the other is the prediction error.  sets is the easiest way to estimate the prediction errors.</a:t>
-            </a:r>
-          </a:p>
-          <a:p>
-            <a:r>
-              <a:rPr lang="en-US" baseline="0" dirty="0"/>
-              <a:t>N-fold cross validation – it tells you if your set of variables is reasonable. </a:t>
-            </a:r>
-            <a:r>
-              <a:rPr lang="en-US" b="1" baseline="0" dirty="0"/>
-              <a:t>This method is used when you don't have enough data to create a  (test set) data. </a:t>
-            </a:r>
-          </a:p>
-          <a:p>
-            <a:pPr defTabSz="970202">
-              <a:defRPr/>
-            </a:pPr>
-            <a:r>
-              <a:rPr lang="en-US" dirty="0"/>
-              <a:t>Cross Validation is done by Splitting</a:t>
-            </a:r>
-            <a:r>
-              <a:rPr lang="en-US" baseline="0" dirty="0"/>
-              <a:t> the </a:t>
-            </a:r>
-            <a:r>
-              <a:rPr lang="en-US" dirty="0"/>
-              <a:t>dataset into, say, N</a:t>
-            </a:r>
-            <a:r>
-              <a:rPr lang="en-US" baseline="0" dirty="0"/>
-              <a:t> </a:t>
-            </a:r>
-            <a:r>
-              <a:rPr lang="en-US" dirty="0"/>
-              <a:t>non-overlapping subsets (fold) , Fit a model using N-1 folds and predict its performance using the fold that was left out. This can be done for all possible combination of folds (first leave 1st fold out, then 2nd, .. , then Nth and train with the remaining folds). After completing</a:t>
-            </a:r>
-            <a:r>
-              <a:rPr lang="en-US" baseline="0" dirty="0"/>
-              <a:t> the fit on all possible folds</a:t>
-            </a:r>
-            <a:r>
-              <a:rPr lang="en-US" dirty="0"/>
-              <a:t> you estimate the mean performance of all folds (maybe also the variance/standard deviation of the performance).</a:t>
-            </a:r>
-          </a:p>
-          <a:p>
-            <a:pPr defTabSz="970202">
-              <a:defRPr/>
-            </a:pPr>
-            <a:r>
-              <a:rPr lang="en-US" baseline="0" dirty="0"/>
-              <a:t>R</a:t>
-            </a:r>
-            <a:r>
-              <a:rPr lang="en-US" baseline="30000" dirty="0"/>
-              <a:t>2</a:t>
-            </a:r>
-            <a:r>
-              <a:rPr lang="en-US" baseline="0" dirty="0"/>
-              <a:t>  (goodness of fit metric) is reported by all standard packages</a:t>
-            </a:r>
-            <a:r>
-              <a:rPr lang="en-US" u="sng" baseline="0" dirty="0"/>
-              <a:t>. It is the </a:t>
-            </a:r>
-            <a:r>
-              <a:rPr lang="en-US" u="sng" dirty="0"/>
-              <a:t> fraction of the variance in the output variable that the model can explain</a:t>
-            </a:r>
-            <a:r>
-              <a:rPr lang="en-US" dirty="0"/>
-              <a:t>.</a:t>
-            </a:r>
-          </a:p>
-          <a:p>
-            <a:pPr defTabSz="970202">
-              <a:defRPr/>
-            </a:pPr>
-            <a:r>
-              <a:rPr lang="en-US" baseline="0" dirty="0"/>
-              <a:t> The definition of R</a:t>
-            </a:r>
-            <a:r>
-              <a:rPr lang="en-US" baseline="30000" dirty="0"/>
-              <a:t>2</a:t>
-            </a:r>
-            <a:r>
-              <a:rPr lang="en-US" baseline="0" dirty="0"/>
-              <a:t> is  1 – SSerr/SStot  where </a:t>
-            </a:r>
-          </a:p>
-          <a:p>
-            <a:pPr defTabSz="970202">
-              <a:defRPr/>
-            </a:pPr>
-            <a:r>
-              <a:rPr lang="en-US" baseline="0" dirty="0"/>
-              <a:t> SSerr = Sum[(y-y</a:t>
-            </a:r>
-            <a:r>
-              <a:rPr lang="en-US" baseline="-25000" dirty="0"/>
-              <a:t>pred</a:t>
-            </a:r>
-            <a:r>
-              <a:rPr lang="en-US" baseline="0" dirty="0"/>
-              <a:t>)</a:t>
-            </a:r>
-            <a:r>
-              <a:rPr lang="en-US" baseline="30000" dirty="0"/>
-              <a:t>2</a:t>
-            </a:r>
-            <a:r>
-              <a:rPr lang="en-US" baseline="0" dirty="0"/>
-              <a:t>] and </a:t>
-            </a:r>
-          </a:p>
-          <a:p>
-            <a:pPr defTabSz="970202">
-              <a:defRPr/>
-            </a:pPr>
-            <a:r>
-              <a:rPr lang="en-US" baseline="0" dirty="0"/>
-              <a:t> SStot = Sum[(y-y</a:t>
-            </a:r>
-            <a:r>
-              <a:rPr lang="en-US" baseline="-25000" dirty="0"/>
-              <a:t>mean</a:t>
-            </a:r>
-            <a:r>
-              <a:rPr lang="en-US" baseline="0" dirty="0"/>
-              <a:t>)</a:t>
-            </a:r>
-            <a:r>
-              <a:rPr lang="en-US" baseline="30000" dirty="0"/>
-              <a:t>2</a:t>
-            </a:r>
-            <a:r>
-              <a:rPr lang="en-US" baseline="0" dirty="0"/>
-              <a:t>]. </a:t>
-            </a:r>
-          </a:p>
-          <a:p>
-            <a:pPr defTabSz="970202">
-              <a:defRPr/>
-            </a:pPr>
-            <a:r>
-              <a:rPr lang="en-US" baseline="0" dirty="0"/>
-              <a:t>For the output of a correlated model, like regression, this definition will be the square of the correlation. For a good fit we want R</a:t>
-            </a:r>
-            <a:r>
-              <a:rPr lang="en-US" baseline="30000" dirty="0"/>
-              <a:t>2</a:t>
-            </a:r>
-            <a:r>
-              <a:rPr lang="en-US" baseline="0" dirty="0"/>
-              <a:t>  as close to 1 as possible.</a:t>
-            </a:r>
-          </a:p>
-          <a:p>
-            <a:pPr defTabSz="970202">
-              <a:defRPr/>
-            </a:pPr>
-            <a:r>
-              <a:rPr lang="en-US" baseline="0" dirty="0"/>
-              <a:t>Reference for n-fold cross validation is "Ensemble Methods in Data Mining", Seni and Elder. Nice succinct description.</a:t>
-            </a:r>
-          </a:p>
-          <a:p>
-            <a:endParaRPr lang="en-US" baseline="0" dirty="0"/>
+            <a:endParaRPr lang="en-US"/>
           </a:p>
         </p:txBody>
       </p:sp>
       <p:sp>
         <p:nvSpPr>
-          <p:cNvPr id="6" name="Slide Number Placeholder 5"/>
+          <p:cNvPr id="4" name="Header Placeholder 3"/>
           <p:cNvSpPr>
             <a:spLocks noGrp="1"/>
           </p:cNvSpPr>
           <p:nvPr>
-            <p:ph type="sldNum" sz="quarter" idx="10"/>
+            <p:ph type="hdr" sz="quarter"/>
           </p:nvPr>
         </p:nvSpPr>
         <p:spPr/>
@@ -8148,28 +8259,21 @@
           <a:bodyPr/>
           <a:lstStyle/>
           <a:p>
-            <a:pPr>
-              <a:defRPr/>
-            </a:pPr>
-            <a:fld id="{80249327-EC2F-4096-8D35-6B76097739FC}" type="slidenum">
-              <a:rPr lang="en-US" smtClean="0"/>
-              <a:pPr>
-                <a:defRPr/>
-              </a:pPr>
-              <a:t>35</a:t>
-            </a:fld>
-            <a:endParaRPr lang="en-US" dirty="0"/>
+            <a:r>
+              <a:rPr lang="en-US"/>
+              <a:t>CMP461: Big Data Analytics</a:t>
+            </a:r>
           </a:p>
         </p:txBody>
       </p:sp>
       <p:sp>
         <p:nvSpPr>
-          <p:cNvPr id="7" name="Footer Placeholder 6"/>
+          <p:cNvPr id="5" name="Date Placeholder 4"/>
           <p:cNvSpPr>
             <a:spLocks noGrp="1"/>
           </p:cNvSpPr>
           <p:nvPr>
-            <p:ph type="ftr" sz="quarter" idx="11"/>
+            <p:ph type="dt" idx="1"/>
           </p:nvPr>
         </p:nvSpPr>
         <p:spPr/>
@@ -8177,18 +8281,65 @@
           <a:bodyPr/>
           <a:lstStyle/>
           <a:p>
-            <a:pPr>
-              <a:defRPr/>
-            </a:pPr>
+            <a:fld id="{93E09D05-EC44-487D-A528-587D6898A5DB}" type="datetime1">
+              <a:rPr lang="en-US" smtClean="0"/>
+              <a:t>4/8/2024</a:t>
+            </a:fld>
+            <a:endParaRPr lang="en-US"/>
+          </a:p>
+        </p:txBody>
+      </p:sp>
+      <p:sp>
+        <p:nvSpPr>
+          <p:cNvPr id="6" name="Footer Placeholder 5"/>
+          <p:cNvSpPr>
+            <a:spLocks noGrp="1"/>
+          </p:cNvSpPr>
+          <p:nvPr>
+            <p:ph type="ftr" sz="quarter" idx="4"/>
+          </p:nvPr>
+        </p:nvSpPr>
+        <p:spPr/>
+        <p:txBody>
+          <a:bodyPr/>
+          <a:lstStyle/>
+          <a:p>
             <a:r>
               <a:rPr lang="en-US"/>
               <a:t>Linear Regression</a:t>
             </a:r>
-            <a:endParaRPr lang="en-US" dirty="0"/>
+          </a:p>
+        </p:txBody>
+      </p:sp>
+      <p:sp>
+        <p:nvSpPr>
+          <p:cNvPr id="7" name="Slide Number Placeholder 6"/>
+          <p:cNvSpPr>
+            <a:spLocks noGrp="1"/>
+          </p:cNvSpPr>
+          <p:nvPr>
+            <p:ph type="sldNum" sz="quarter" idx="5"/>
+          </p:nvPr>
+        </p:nvSpPr>
+        <p:spPr/>
+        <p:txBody>
+          <a:bodyPr/>
+          <a:lstStyle/>
+          <a:p>
+            <a:fld id="{08D95B7C-6CF9-43D7-BE59-00ACFCE4D165}" type="slidenum">
+              <a:rPr lang="en-US" smtClean="0"/>
+              <a:t>30</a:t>
+            </a:fld>
+            <a:endParaRPr lang="en-US"/>
           </a:p>
         </p:txBody>
       </p:sp>
     </p:spTree>
+    <p:extLst>
+      <p:ext uri="{BB962C8B-B14F-4D97-AF65-F5344CB8AC3E}">
+        <p14:creationId xmlns:p14="http://schemas.microsoft.com/office/powerpoint/2010/main" val="1771539688"/>
+      </p:ext>
+    </p:extLst>
   </p:cSld>
   <p:clrMapOvr>
     <a:masterClrMapping/>
@@ -8375,7 +8526,7 @@
           <a:p>
             <a:fld id="{BD2B21F4-8356-453D-93D4-FB6119AC13C2}" type="datetime1">
               <a:rPr lang="en-US" smtClean="0"/>
-              <a:t>4/5/2024</a:t>
+              <a:t>4/7/2024</a:t>
             </a:fld>
             <a:endParaRPr lang="en-US"/>
           </a:p>
@@ -8546,7 +8697,7 @@
           <a:p>
             <a:fld id="{2163686E-AECE-4ABF-9583-4CD59B10D83D}" type="datetime1">
               <a:rPr lang="en-US" smtClean="0"/>
-              <a:t>4/5/2024</a:t>
+              <a:t>4/7/2024</a:t>
             </a:fld>
             <a:endParaRPr lang="en-US"/>
           </a:p>
@@ -8727,7 +8878,7 @@
           <a:p>
             <a:fld id="{D3EAA641-123B-41D5-AD6F-5BE16BD47FAD}" type="datetime1">
               <a:rPr lang="en-US" smtClean="0"/>
-              <a:t>4/5/2024</a:t>
+              <a:t>4/7/2024</a:t>
             </a:fld>
             <a:endParaRPr lang="en-US"/>
           </a:p>
@@ -9319,7 +9470,7 @@
           <a:p>
             <a:fld id="{B873234D-A1DE-48BD-AC0F-201DE61CF21E}" type="datetime1">
               <a:rPr lang="en-US" smtClean="0"/>
-              <a:t>4/5/2024</a:t>
+              <a:t>4/7/2024</a:t>
             </a:fld>
             <a:endParaRPr lang="en-US"/>
           </a:p>
@@ -9567,7 +9718,7 @@
           <a:p>
             <a:fld id="{C8D7601E-9C28-4262-AC42-07376CB7F27E}" type="datetime1">
               <a:rPr lang="en-US" smtClean="0"/>
-              <a:t>4/5/2024</a:t>
+              <a:t>4/7/2024</a:t>
             </a:fld>
             <a:endParaRPr lang="en-US"/>
           </a:p>
@@ -9855,7 +10006,7 @@
           <a:p>
             <a:fld id="{7DA15231-42B6-48F9-9594-987E6CD08259}" type="datetime1">
               <a:rPr lang="en-US" smtClean="0"/>
-              <a:t>4/5/2024</a:t>
+              <a:t>4/7/2024</a:t>
             </a:fld>
             <a:endParaRPr lang="en-US"/>
           </a:p>
@@ -10277,7 +10428,7 @@
           <a:p>
             <a:fld id="{711C91F2-84D0-4250-8441-371EA56C92FE}" type="datetime1">
               <a:rPr lang="en-US" smtClean="0"/>
-              <a:t>4/5/2024</a:t>
+              <a:t>4/7/2024</a:t>
             </a:fld>
             <a:endParaRPr lang="en-US"/>
           </a:p>
@@ -10397,7 +10548,7 @@
           <a:p>
             <a:fld id="{B72E5570-A714-4C20-8551-7E8D94A49CCE}" type="datetime1">
               <a:rPr lang="en-US" smtClean="0"/>
-              <a:t>4/5/2024</a:t>
+              <a:t>4/7/2024</a:t>
             </a:fld>
             <a:endParaRPr lang="en-US"/>
           </a:p>
@@ -10495,7 +10646,7 @@
           <a:p>
             <a:fld id="{929616CF-E2B4-4374-9EC7-0CF9AD2A71CF}" type="datetime1">
               <a:rPr lang="en-US" smtClean="0"/>
-              <a:t>4/5/2024</a:t>
+              <a:t>4/7/2024</a:t>
             </a:fld>
             <a:endParaRPr lang="en-US"/>
           </a:p>
@@ -10773,7 +10924,7 @@
           <a:p>
             <a:fld id="{029FACA9-626F-494B-BD8E-652540034750}" type="datetime1">
               <a:rPr lang="en-US" smtClean="0"/>
-              <a:t>4/5/2024</a:t>
+              <a:t>4/7/2024</a:t>
             </a:fld>
             <a:endParaRPr lang="en-US"/>
           </a:p>
@@ -11028,7 +11179,7 @@
           <a:p>
             <a:fld id="{0D6E6366-F532-4A1A-A36E-7C500FC2DDD7}" type="datetime1">
               <a:rPr lang="en-US" smtClean="0"/>
-              <a:t>4/5/2024</a:t>
+              <a:t>4/7/2024</a:t>
             </a:fld>
             <a:endParaRPr lang="en-US"/>
           </a:p>
@@ -11242,7 +11393,7 @@
           <a:p>
             <a:fld id="{A22F4270-BAFC-43D1-B46E-5407610DBDBF}" type="datetime1">
               <a:rPr lang="en-US" smtClean="0"/>
-              <a:t>4/5/2024</a:t>
+              <a:t>4/7/2024</a:t>
             </a:fld>
             <a:endParaRPr lang="en-US"/>
           </a:p>
@@ -14480,8 +14631,8 @@
           </a:p>
         </p:txBody>
       </p:sp>
-      <mc:AlternateContent xmlns:mc="http://schemas.openxmlformats.org/markup-compatibility/2006">
-        <mc:Choice xmlns:a14="http://schemas.microsoft.com/office/drawing/2010/main" Requires="a14">
+      <mc:AlternateContent xmlns:mc="http://schemas.openxmlformats.org/markup-compatibility/2006" xmlns:a14="http://schemas.microsoft.com/office/drawing/2010/main">
+        <mc:Choice Requires="a14">
           <p:sp>
             <p:nvSpPr>
               <p:cNvPr id="3" name="Content Placeholder 2"/>
@@ -14587,7 +14738,7 @@
             </p:txBody>
           </p:sp>
         </mc:Choice>
-        <mc:Fallback>
+        <mc:Fallback xmlns="">
           <p:sp>
             <p:nvSpPr>
               <p:cNvPr id="3" name="Content Placeholder 2"/>
@@ -16949,7 +17100,7 @@
   </p:timing>
   <p:extLst>
     <p:ext uri="{6950BFC3-D8DA-4A85-94F7-54DA5524770B}">
-      <p188:commentRel xmlns:p188="http://schemas.microsoft.com/office/powerpoint/2018/8/main" r:id="rId2"/>
+      <p188:commentRel xmlns:p188="http://schemas.microsoft.com/office/powerpoint/2018/8/main" r:id="rId3"/>
     </p:ext>
   </p:extLst>
 </p:sld>
@@ -18074,8 +18225,8 @@
           </a:p>
         </p:txBody>
       </p:sp>
-      <mc:AlternateContent xmlns:mc="http://schemas.openxmlformats.org/markup-compatibility/2006">
-        <mc:Choice xmlns:p14="http://schemas.microsoft.com/office/powerpoint/2010/main" Requires="p14">
+      <mc:AlternateContent xmlns:mc="http://schemas.openxmlformats.org/markup-compatibility/2006" xmlns:p14="http://schemas.microsoft.com/office/powerpoint/2010/main">
+        <mc:Choice Requires="p14">
           <p:contentPart p14:bwMode="auto" r:id="rId3">
             <p14:nvContentPartPr>
               <p14:cNvPr id="45" name="Ink 44">
@@ -18094,7 +18245,7 @@
             </p14:xfrm>
           </p:contentPart>
         </mc:Choice>
-        <mc:Fallback>
+        <mc:Fallback xmlns="">
           <p:pic>
             <p:nvPicPr>
               <p:cNvPr id="45" name="Ink 44">
@@ -18145,8 +18296,8 @@
             <a:chExt cx="2199240" cy="458280"/>
           </a:xfrm>
         </p:grpSpPr>
-        <mc:AlternateContent xmlns:mc="http://schemas.openxmlformats.org/markup-compatibility/2006">
-          <mc:Choice xmlns:p14="http://schemas.microsoft.com/office/powerpoint/2010/main" Requires="p14">
+        <mc:AlternateContent xmlns:mc="http://schemas.openxmlformats.org/markup-compatibility/2006" xmlns:p14="http://schemas.microsoft.com/office/powerpoint/2010/main">
+          <mc:Choice Requires="p14">
             <p:contentPart p14:bwMode="auto" r:id="rId5">
               <p14:nvContentPartPr>
                 <p14:cNvPr id="37" name="Ink 36">
@@ -18165,7 +18316,7 @@
               </p14:xfrm>
             </p:contentPart>
           </mc:Choice>
-          <mc:Fallback>
+          <mc:Fallback xmlns="">
             <p:pic>
               <p:nvPicPr>
                 <p:cNvPr id="37" name="Ink 36">
@@ -18196,8 +18347,8 @@
             </p:pic>
           </mc:Fallback>
         </mc:AlternateContent>
-        <mc:AlternateContent xmlns:mc="http://schemas.openxmlformats.org/markup-compatibility/2006">
-          <mc:Choice xmlns:p14="http://schemas.microsoft.com/office/powerpoint/2010/main" Requires="p14">
+        <mc:AlternateContent xmlns:mc="http://schemas.openxmlformats.org/markup-compatibility/2006" xmlns:p14="http://schemas.microsoft.com/office/powerpoint/2010/main">
+          <mc:Choice Requires="p14">
             <p:contentPart p14:bwMode="auto" r:id="rId6">
               <p14:nvContentPartPr>
                 <p14:cNvPr id="34" name="Ink 33">
@@ -18216,7 +18367,7 @@
               </p14:xfrm>
             </p:contentPart>
           </mc:Choice>
-          <mc:Fallback>
+          <mc:Fallback xmlns="">
             <p:pic>
               <p:nvPicPr>
                 <p:cNvPr id="34" name="Ink 33">
@@ -18247,8 +18398,8 @@
             </p:pic>
           </mc:Fallback>
         </mc:AlternateContent>
-        <mc:AlternateContent xmlns:mc="http://schemas.openxmlformats.org/markup-compatibility/2006">
-          <mc:Choice xmlns:p14="http://schemas.microsoft.com/office/powerpoint/2010/main" Requires="p14">
+        <mc:AlternateContent xmlns:mc="http://schemas.openxmlformats.org/markup-compatibility/2006" xmlns:p14="http://schemas.microsoft.com/office/powerpoint/2010/main">
+          <mc:Choice Requires="p14">
             <p:contentPart p14:bwMode="auto" r:id="rId7">
               <p14:nvContentPartPr>
                 <p14:cNvPr id="35" name="Ink 34">
@@ -18267,7 +18418,7 @@
               </p14:xfrm>
             </p:contentPart>
           </mc:Choice>
-          <mc:Fallback>
+          <mc:Fallback xmlns="">
             <p:pic>
               <p:nvPicPr>
                 <p:cNvPr id="35" name="Ink 34">
@@ -18298,8 +18449,8 @@
             </p:pic>
           </mc:Fallback>
         </mc:AlternateContent>
-        <mc:AlternateContent xmlns:mc="http://schemas.openxmlformats.org/markup-compatibility/2006">
-          <mc:Choice xmlns:p14="http://schemas.microsoft.com/office/powerpoint/2010/main" Requires="p14">
+        <mc:AlternateContent xmlns:mc="http://schemas.openxmlformats.org/markup-compatibility/2006" xmlns:p14="http://schemas.microsoft.com/office/powerpoint/2010/main">
+          <mc:Choice Requires="p14">
             <p:contentPart p14:bwMode="auto" r:id="rId8">
               <p14:nvContentPartPr>
                 <p14:cNvPr id="36" name="Ink 35">
@@ -18318,7 +18469,7 @@
               </p14:xfrm>
             </p:contentPart>
           </mc:Choice>
-          <mc:Fallback>
+          <mc:Fallback xmlns="">
             <p:pic>
               <p:nvPicPr>
                 <p:cNvPr id="36" name="Ink 35">
@@ -18349,8 +18500,8 @@
             </p:pic>
           </mc:Fallback>
         </mc:AlternateContent>
-        <mc:AlternateContent xmlns:mc="http://schemas.openxmlformats.org/markup-compatibility/2006">
-          <mc:Choice xmlns:p14="http://schemas.microsoft.com/office/powerpoint/2010/main" Requires="p14">
+        <mc:AlternateContent xmlns:mc="http://schemas.openxmlformats.org/markup-compatibility/2006" xmlns:p14="http://schemas.microsoft.com/office/powerpoint/2010/main">
+          <mc:Choice Requires="p14">
             <p:contentPart p14:bwMode="auto" r:id="rId9">
               <p14:nvContentPartPr>
                 <p14:cNvPr id="38" name="Ink 37">
@@ -18369,7 +18520,7 @@
               </p14:xfrm>
             </p:contentPart>
           </mc:Choice>
-          <mc:Fallback>
+          <mc:Fallback xmlns="">
             <p:pic>
               <p:nvPicPr>
                 <p:cNvPr id="38" name="Ink 37">
@@ -18400,8 +18551,8 @@
             </p:pic>
           </mc:Fallback>
         </mc:AlternateContent>
-        <mc:AlternateContent xmlns:mc="http://schemas.openxmlformats.org/markup-compatibility/2006">
-          <mc:Choice xmlns:p14="http://schemas.microsoft.com/office/powerpoint/2010/main" Requires="p14">
+        <mc:AlternateContent xmlns:mc="http://schemas.openxmlformats.org/markup-compatibility/2006" xmlns:p14="http://schemas.microsoft.com/office/powerpoint/2010/main">
+          <mc:Choice Requires="p14">
             <p:contentPart p14:bwMode="auto" r:id="rId10">
               <p14:nvContentPartPr>
                 <p14:cNvPr id="39" name="Ink 38">
@@ -18420,7 +18571,7 @@
               </p14:xfrm>
             </p:contentPart>
           </mc:Choice>
-          <mc:Fallback>
+          <mc:Fallback xmlns="">
             <p:pic>
               <p:nvPicPr>
                 <p:cNvPr id="39" name="Ink 38">
@@ -18451,8 +18602,8 @@
             </p:pic>
           </mc:Fallback>
         </mc:AlternateContent>
-        <mc:AlternateContent xmlns:mc="http://schemas.openxmlformats.org/markup-compatibility/2006">
-          <mc:Choice xmlns:p14="http://schemas.microsoft.com/office/powerpoint/2010/main" Requires="p14">
+        <mc:AlternateContent xmlns:mc="http://schemas.openxmlformats.org/markup-compatibility/2006" xmlns:p14="http://schemas.microsoft.com/office/powerpoint/2010/main">
+          <mc:Choice Requires="p14">
             <p:contentPart p14:bwMode="auto" r:id="rId11">
               <p14:nvContentPartPr>
                 <p14:cNvPr id="40" name="Ink 39">
@@ -18471,7 +18622,7 @@
               </p14:xfrm>
             </p:contentPart>
           </mc:Choice>
-          <mc:Fallback>
+          <mc:Fallback xmlns="">
             <p:pic>
               <p:nvPicPr>
                 <p:cNvPr id="40" name="Ink 39">
@@ -18502,8 +18653,8 @@
             </p:pic>
           </mc:Fallback>
         </mc:AlternateContent>
-        <mc:AlternateContent xmlns:mc="http://schemas.openxmlformats.org/markup-compatibility/2006">
-          <mc:Choice xmlns:p14="http://schemas.microsoft.com/office/powerpoint/2010/main" Requires="p14">
+        <mc:AlternateContent xmlns:mc="http://schemas.openxmlformats.org/markup-compatibility/2006" xmlns:p14="http://schemas.microsoft.com/office/powerpoint/2010/main">
+          <mc:Choice Requires="p14">
             <p:contentPart p14:bwMode="auto" r:id="rId12">
               <p14:nvContentPartPr>
                 <p14:cNvPr id="41" name="Ink 40">
@@ -18522,7 +18673,7 @@
               </p14:xfrm>
             </p:contentPart>
           </mc:Choice>
-          <mc:Fallback>
+          <mc:Fallback xmlns="">
             <p:pic>
               <p:nvPicPr>
                 <p:cNvPr id="41" name="Ink 40">
@@ -18553,8 +18704,8 @@
             </p:pic>
           </mc:Fallback>
         </mc:AlternateContent>
-        <mc:AlternateContent xmlns:mc="http://schemas.openxmlformats.org/markup-compatibility/2006">
-          <mc:Choice xmlns:p14="http://schemas.microsoft.com/office/powerpoint/2010/main" Requires="p14">
+        <mc:AlternateContent xmlns:mc="http://schemas.openxmlformats.org/markup-compatibility/2006" xmlns:p14="http://schemas.microsoft.com/office/powerpoint/2010/main">
+          <mc:Choice Requires="p14">
             <p:contentPart p14:bwMode="auto" r:id="rId13">
               <p14:nvContentPartPr>
                 <p14:cNvPr id="42" name="Ink 41">
@@ -18573,7 +18724,7 @@
               </p14:xfrm>
             </p:contentPart>
           </mc:Choice>
-          <mc:Fallback>
+          <mc:Fallback xmlns="">
             <p:pic>
               <p:nvPicPr>
                 <p:cNvPr id="42" name="Ink 41">
@@ -18604,8 +18755,8 @@
             </p:pic>
           </mc:Fallback>
         </mc:AlternateContent>
-        <mc:AlternateContent xmlns:mc="http://schemas.openxmlformats.org/markup-compatibility/2006">
-          <mc:Choice xmlns:p14="http://schemas.microsoft.com/office/powerpoint/2010/main" Requires="p14">
+        <mc:AlternateContent xmlns:mc="http://schemas.openxmlformats.org/markup-compatibility/2006" xmlns:p14="http://schemas.microsoft.com/office/powerpoint/2010/main">
+          <mc:Choice Requires="p14">
             <p:contentPart p14:bwMode="auto" r:id="rId14">
               <p14:nvContentPartPr>
                 <p14:cNvPr id="43" name="Ink 42">
@@ -18624,7 +18775,7 @@
               </p14:xfrm>
             </p:contentPart>
           </mc:Choice>
-          <mc:Fallback>
+          <mc:Fallback xmlns="">
             <p:pic>
               <p:nvPicPr>
                 <p:cNvPr id="43" name="Ink 42">
@@ -18655,8 +18806,8 @@
             </p:pic>
           </mc:Fallback>
         </mc:AlternateContent>
-        <mc:AlternateContent xmlns:mc="http://schemas.openxmlformats.org/markup-compatibility/2006">
-          <mc:Choice xmlns:p14="http://schemas.microsoft.com/office/powerpoint/2010/main" Requires="p14">
+        <mc:AlternateContent xmlns:mc="http://schemas.openxmlformats.org/markup-compatibility/2006" xmlns:p14="http://schemas.microsoft.com/office/powerpoint/2010/main">
+          <mc:Choice Requires="p14">
             <p:contentPart p14:bwMode="auto" r:id="rId15">
               <p14:nvContentPartPr>
                 <p14:cNvPr id="44" name="Ink 43">
@@ -18675,7 +18826,7 @@
               </p14:xfrm>
             </p:contentPart>
           </mc:Choice>
-          <mc:Fallback>
+          <mc:Fallback xmlns="">
             <p:pic>
               <p:nvPicPr>
                 <p:cNvPr id="44" name="Ink 43">
@@ -18706,8 +18857,8 @@
             </p:pic>
           </mc:Fallback>
         </mc:AlternateContent>
-        <mc:AlternateContent xmlns:mc="http://schemas.openxmlformats.org/markup-compatibility/2006">
-          <mc:Choice xmlns:p14="http://schemas.microsoft.com/office/powerpoint/2010/main" Requires="p14">
+        <mc:AlternateContent xmlns:mc="http://schemas.openxmlformats.org/markup-compatibility/2006" xmlns:p14="http://schemas.microsoft.com/office/powerpoint/2010/main">
+          <mc:Choice Requires="p14">
             <p:contentPart p14:bwMode="auto" r:id="rId16">
               <p14:nvContentPartPr>
                 <p14:cNvPr id="46" name="Ink 45">
@@ -18726,7 +18877,7 @@
               </p14:xfrm>
             </p:contentPart>
           </mc:Choice>
-          <mc:Fallback>
+          <mc:Fallback xmlns="">
             <p:pic>
               <p:nvPicPr>
                 <p:cNvPr id="46" name="Ink 45">
@@ -18757,8 +18908,8 @@
             </p:pic>
           </mc:Fallback>
         </mc:AlternateContent>
-        <mc:AlternateContent xmlns:mc="http://schemas.openxmlformats.org/markup-compatibility/2006">
-          <mc:Choice xmlns:p14="http://schemas.microsoft.com/office/powerpoint/2010/main" Requires="p14">
+        <mc:AlternateContent xmlns:mc="http://schemas.openxmlformats.org/markup-compatibility/2006" xmlns:p14="http://schemas.microsoft.com/office/powerpoint/2010/main">
+          <mc:Choice Requires="p14">
             <p:contentPart p14:bwMode="auto" r:id="rId17">
               <p14:nvContentPartPr>
                 <p14:cNvPr id="47" name="Ink 46">
@@ -18777,7 +18928,7 @@
               </p14:xfrm>
             </p:contentPart>
           </mc:Choice>
-          <mc:Fallback>
+          <mc:Fallback xmlns="">
             <p:pic>
               <p:nvPicPr>
                 <p:cNvPr id="47" name="Ink 46">
@@ -18808,8 +18959,8 @@
             </p:pic>
           </mc:Fallback>
         </mc:AlternateContent>
-        <mc:AlternateContent xmlns:mc="http://schemas.openxmlformats.org/markup-compatibility/2006">
-          <mc:Choice xmlns:p14="http://schemas.microsoft.com/office/powerpoint/2010/main" Requires="p14">
+        <mc:AlternateContent xmlns:mc="http://schemas.openxmlformats.org/markup-compatibility/2006" xmlns:p14="http://schemas.microsoft.com/office/powerpoint/2010/main">
+          <mc:Choice Requires="p14">
             <p:contentPart p14:bwMode="auto" r:id="rId18">
               <p14:nvContentPartPr>
                 <p14:cNvPr id="48" name="Ink 47">
@@ -18828,7 +18979,7 @@
               </p14:xfrm>
             </p:contentPart>
           </mc:Choice>
-          <mc:Fallback>
+          <mc:Fallback xmlns="">
             <p:pic>
               <p:nvPicPr>
                 <p:cNvPr id="48" name="Ink 47">
@@ -18859,8 +19010,8 @@
             </p:pic>
           </mc:Fallback>
         </mc:AlternateContent>
-        <mc:AlternateContent xmlns:mc="http://schemas.openxmlformats.org/markup-compatibility/2006">
-          <mc:Choice xmlns:p14="http://schemas.microsoft.com/office/powerpoint/2010/main" Requires="p14">
+        <mc:AlternateContent xmlns:mc="http://schemas.openxmlformats.org/markup-compatibility/2006" xmlns:p14="http://schemas.microsoft.com/office/powerpoint/2010/main">
+          <mc:Choice Requires="p14">
             <p:contentPart p14:bwMode="auto" r:id="rId19">
               <p14:nvContentPartPr>
                 <p14:cNvPr id="49" name="Ink 48">
@@ -18879,7 +19030,7 @@
               </p14:xfrm>
             </p:contentPart>
           </mc:Choice>
-          <mc:Fallback>
+          <mc:Fallback xmlns="">
             <p:pic>
               <p:nvPicPr>
                 <p:cNvPr id="49" name="Ink 48">
@@ -18910,8 +19061,8 @@
             </p:pic>
           </mc:Fallback>
         </mc:AlternateContent>
-        <mc:AlternateContent xmlns:mc="http://schemas.openxmlformats.org/markup-compatibility/2006">
-          <mc:Choice xmlns:p14="http://schemas.microsoft.com/office/powerpoint/2010/main" Requires="p14">
+        <mc:AlternateContent xmlns:mc="http://schemas.openxmlformats.org/markup-compatibility/2006" xmlns:p14="http://schemas.microsoft.com/office/powerpoint/2010/main">
+          <mc:Choice Requires="p14">
             <p:contentPart p14:bwMode="auto" r:id="rId20">
               <p14:nvContentPartPr>
                 <p14:cNvPr id="50" name="Ink 49">
@@ -18930,7 +19081,7 @@
               </p14:xfrm>
             </p:contentPart>
           </mc:Choice>
-          <mc:Fallback>
+          <mc:Fallback xmlns="">
             <p:pic>
               <p:nvPicPr>
                 <p:cNvPr id="50" name="Ink 49">
@@ -18961,8 +19112,8 @@
             </p:pic>
           </mc:Fallback>
         </mc:AlternateContent>
-        <mc:AlternateContent xmlns:mc="http://schemas.openxmlformats.org/markup-compatibility/2006">
-          <mc:Choice xmlns:p14="http://schemas.microsoft.com/office/powerpoint/2010/main" Requires="p14">
+        <mc:AlternateContent xmlns:mc="http://schemas.openxmlformats.org/markup-compatibility/2006" xmlns:p14="http://schemas.microsoft.com/office/powerpoint/2010/main">
+          <mc:Choice Requires="p14">
             <p:contentPart p14:bwMode="auto" r:id="rId21">
               <p14:nvContentPartPr>
                 <p14:cNvPr id="51" name="Ink 50">
@@ -18981,7 +19132,7 @@
               </p14:xfrm>
             </p:contentPart>
           </mc:Choice>
-          <mc:Fallback>
+          <mc:Fallback xmlns="">
             <p:pic>
               <p:nvPicPr>
                 <p:cNvPr id="51" name="Ink 50">
@@ -19012,8 +19163,8 @@
             </p:pic>
           </mc:Fallback>
         </mc:AlternateContent>
-        <mc:AlternateContent xmlns:mc="http://schemas.openxmlformats.org/markup-compatibility/2006">
-          <mc:Choice xmlns:p14="http://schemas.microsoft.com/office/powerpoint/2010/main" Requires="p14">
+        <mc:AlternateContent xmlns:mc="http://schemas.openxmlformats.org/markup-compatibility/2006" xmlns:p14="http://schemas.microsoft.com/office/powerpoint/2010/main">
+          <mc:Choice Requires="p14">
             <p:contentPart p14:bwMode="auto" r:id="rId22">
               <p14:nvContentPartPr>
                 <p14:cNvPr id="52" name="Ink 51">
@@ -19032,7 +19183,7 @@
               </p14:xfrm>
             </p:contentPart>
           </mc:Choice>
-          <mc:Fallback>
+          <mc:Fallback xmlns="">
             <p:pic>
               <p:nvPicPr>
                 <p:cNvPr id="52" name="Ink 51">
@@ -19063,8 +19214,8 @@
             </p:pic>
           </mc:Fallback>
         </mc:AlternateContent>
-        <mc:AlternateContent xmlns:mc="http://schemas.openxmlformats.org/markup-compatibility/2006">
-          <mc:Choice xmlns:p14="http://schemas.microsoft.com/office/powerpoint/2010/main" Requires="p14">
+        <mc:AlternateContent xmlns:mc="http://schemas.openxmlformats.org/markup-compatibility/2006" xmlns:p14="http://schemas.microsoft.com/office/powerpoint/2010/main">
+          <mc:Choice Requires="p14">
             <p:contentPart p14:bwMode="auto" r:id="rId23">
               <p14:nvContentPartPr>
                 <p14:cNvPr id="53" name="Ink 52">
@@ -19083,7 +19234,7 @@
               </p14:xfrm>
             </p:contentPart>
           </mc:Choice>
-          <mc:Fallback>
+          <mc:Fallback xmlns="">
             <p:pic>
               <p:nvPicPr>
                 <p:cNvPr id="53" name="Ink 52">
@@ -19114,8 +19265,8 @@
             </p:pic>
           </mc:Fallback>
         </mc:AlternateContent>
-        <mc:AlternateContent xmlns:mc="http://schemas.openxmlformats.org/markup-compatibility/2006">
-          <mc:Choice xmlns:p14="http://schemas.microsoft.com/office/powerpoint/2010/main" Requires="p14">
+        <mc:AlternateContent xmlns:mc="http://schemas.openxmlformats.org/markup-compatibility/2006" xmlns:p14="http://schemas.microsoft.com/office/powerpoint/2010/main">
+          <mc:Choice Requires="p14">
             <p:contentPart p14:bwMode="auto" r:id="rId24">
               <p14:nvContentPartPr>
                 <p14:cNvPr id="54" name="Ink 53">
@@ -19134,7 +19285,7 @@
               </p14:xfrm>
             </p:contentPart>
           </mc:Choice>
-          <mc:Fallback>
+          <mc:Fallback xmlns="">
             <p:pic>
               <p:nvPicPr>
                 <p:cNvPr id="54" name="Ink 53">
@@ -19165,8 +19316,8 @@
             </p:pic>
           </mc:Fallback>
         </mc:AlternateContent>
-        <mc:AlternateContent xmlns:mc="http://schemas.openxmlformats.org/markup-compatibility/2006">
-          <mc:Choice xmlns:p14="http://schemas.microsoft.com/office/powerpoint/2010/main" Requires="p14">
+        <mc:AlternateContent xmlns:mc="http://schemas.openxmlformats.org/markup-compatibility/2006" xmlns:p14="http://schemas.microsoft.com/office/powerpoint/2010/main">
+          <mc:Choice Requires="p14">
             <p:contentPart p14:bwMode="auto" r:id="rId25">
               <p14:nvContentPartPr>
                 <p14:cNvPr id="55" name="Ink 54">
@@ -19185,7 +19336,7 @@
               </p14:xfrm>
             </p:contentPart>
           </mc:Choice>
-          <mc:Fallback>
+          <mc:Fallback xmlns="">
             <p:pic>
               <p:nvPicPr>
                 <p:cNvPr id="55" name="Ink 54">
@@ -19216,8 +19367,8 @@
             </p:pic>
           </mc:Fallback>
         </mc:AlternateContent>
-        <mc:AlternateContent xmlns:mc="http://schemas.openxmlformats.org/markup-compatibility/2006">
-          <mc:Choice xmlns:p14="http://schemas.microsoft.com/office/powerpoint/2010/main" Requires="p14">
+        <mc:AlternateContent xmlns:mc="http://schemas.openxmlformats.org/markup-compatibility/2006" xmlns:p14="http://schemas.microsoft.com/office/powerpoint/2010/main">
+          <mc:Choice Requires="p14">
             <p:contentPart p14:bwMode="auto" r:id="rId26">
               <p14:nvContentPartPr>
                 <p14:cNvPr id="56" name="Ink 55">
@@ -19236,7 +19387,7 @@
               </p14:xfrm>
             </p:contentPart>
           </mc:Choice>
-          <mc:Fallback>
+          <mc:Fallback xmlns="">
             <p:pic>
               <p:nvPicPr>
                 <p:cNvPr id="56" name="Ink 55">
@@ -19267,8 +19418,8 @@
             </p:pic>
           </mc:Fallback>
         </mc:AlternateContent>
-        <mc:AlternateContent xmlns:mc="http://schemas.openxmlformats.org/markup-compatibility/2006">
-          <mc:Choice xmlns:p14="http://schemas.microsoft.com/office/powerpoint/2010/main" Requires="p14">
+        <mc:AlternateContent xmlns:mc="http://schemas.openxmlformats.org/markup-compatibility/2006" xmlns:p14="http://schemas.microsoft.com/office/powerpoint/2010/main">
+          <mc:Choice Requires="p14">
             <p:contentPart p14:bwMode="auto" r:id="rId27">
               <p14:nvContentPartPr>
                 <p14:cNvPr id="57" name="Ink 56">
@@ -19287,7 +19438,7 @@
               </p14:xfrm>
             </p:contentPart>
           </mc:Choice>
-          <mc:Fallback>
+          <mc:Fallback xmlns="">
             <p:pic>
               <p:nvPicPr>
                 <p:cNvPr id="57" name="Ink 56">
@@ -19318,8 +19469,8 @@
             </p:pic>
           </mc:Fallback>
         </mc:AlternateContent>
-        <mc:AlternateContent xmlns:mc="http://schemas.openxmlformats.org/markup-compatibility/2006">
-          <mc:Choice xmlns:p14="http://schemas.microsoft.com/office/powerpoint/2010/main" Requires="p14">
+        <mc:AlternateContent xmlns:mc="http://schemas.openxmlformats.org/markup-compatibility/2006" xmlns:p14="http://schemas.microsoft.com/office/powerpoint/2010/main">
+          <mc:Choice Requires="p14">
             <p:contentPart p14:bwMode="auto" r:id="rId28">
               <p14:nvContentPartPr>
                 <p14:cNvPr id="58" name="Ink 57">
@@ -19338,7 +19489,7 @@
               </p14:xfrm>
             </p:contentPart>
           </mc:Choice>
-          <mc:Fallback>
+          <mc:Fallback xmlns="">
             <p:pic>
               <p:nvPicPr>
                 <p:cNvPr id="58" name="Ink 57">
@@ -19369,8 +19520,8 @@
             </p:pic>
           </mc:Fallback>
         </mc:AlternateContent>
-        <mc:AlternateContent xmlns:mc="http://schemas.openxmlformats.org/markup-compatibility/2006">
-          <mc:Choice xmlns:p14="http://schemas.microsoft.com/office/powerpoint/2010/main" Requires="p14">
+        <mc:AlternateContent xmlns:mc="http://schemas.openxmlformats.org/markup-compatibility/2006" xmlns:p14="http://schemas.microsoft.com/office/powerpoint/2010/main">
+          <mc:Choice Requires="p14">
             <p:contentPart p14:bwMode="auto" r:id="rId29">
               <p14:nvContentPartPr>
                 <p14:cNvPr id="59" name="Ink 58">
@@ -19389,7 +19540,7 @@
               </p14:xfrm>
             </p:contentPart>
           </mc:Choice>
-          <mc:Fallback>
+          <mc:Fallback xmlns="">
             <p:pic>
               <p:nvPicPr>
                 <p:cNvPr id="59" name="Ink 58">
@@ -19420,8 +19571,8 @@
             </p:pic>
           </mc:Fallback>
         </mc:AlternateContent>
-        <mc:AlternateContent xmlns:mc="http://schemas.openxmlformats.org/markup-compatibility/2006">
-          <mc:Choice xmlns:p14="http://schemas.microsoft.com/office/powerpoint/2010/main" Requires="p14">
+        <mc:AlternateContent xmlns:mc="http://schemas.openxmlformats.org/markup-compatibility/2006" xmlns:p14="http://schemas.microsoft.com/office/powerpoint/2010/main">
+          <mc:Choice Requires="p14">
             <p:contentPart p14:bwMode="auto" r:id="rId30">
               <p14:nvContentPartPr>
                 <p14:cNvPr id="60" name="Ink 59">
@@ -19440,7 +19591,7 @@
               </p14:xfrm>
             </p:contentPart>
           </mc:Choice>
-          <mc:Fallback>
+          <mc:Fallback xmlns="">
             <p:pic>
               <p:nvPicPr>
                 <p:cNvPr id="60" name="Ink 59">
@@ -19471,8 +19622,8 @@
             </p:pic>
           </mc:Fallback>
         </mc:AlternateContent>
-        <mc:AlternateContent xmlns:mc="http://schemas.openxmlformats.org/markup-compatibility/2006">
-          <mc:Choice xmlns:p14="http://schemas.microsoft.com/office/powerpoint/2010/main" Requires="p14">
+        <mc:AlternateContent xmlns:mc="http://schemas.openxmlformats.org/markup-compatibility/2006" xmlns:p14="http://schemas.microsoft.com/office/powerpoint/2010/main">
+          <mc:Choice Requires="p14">
             <p:contentPart p14:bwMode="auto" r:id="rId31">
               <p14:nvContentPartPr>
                 <p14:cNvPr id="61" name="Ink 60">
@@ -19491,7 +19642,7 @@
               </p14:xfrm>
             </p:contentPart>
           </mc:Choice>
-          <mc:Fallback>
+          <mc:Fallback xmlns="">
             <p:pic>
               <p:nvPicPr>
                 <p:cNvPr id="61" name="Ink 60">
@@ -19522,8 +19673,8 @@
             </p:pic>
           </mc:Fallback>
         </mc:AlternateContent>
-        <mc:AlternateContent xmlns:mc="http://schemas.openxmlformats.org/markup-compatibility/2006">
-          <mc:Choice xmlns:p14="http://schemas.microsoft.com/office/powerpoint/2010/main" Requires="p14">
+        <mc:AlternateContent xmlns:mc="http://schemas.openxmlformats.org/markup-compatibility/2006" xmlns:p14="http://schemas.microsoft.com/office/powerpoint/2010/main">
+          <mc:Choice Requires="p14">
             <p:contentPart p14:bwMode="auto" r:id="rId32">
               <p14:nvContentPartPr>
                 <p14:cNvPr id="62" name="Ink 61">
@@ -19542,7 +19693,7 @@
               </p14:xfrm>
             </p:contentPart>
           </mc:Choice>
-          <mc:Fallback>
+          <mc:Fallback xmlns="">
             <p:pic>
               <p:nvPicPr>
                 <p:cNvPr id="62" name="Ink 61">
@@ -19573,8 +19724,8 @@
             </p:pic>
           </mc:Fallback>
         </mc:AlternateContent>
-        <mc:AlternateContent xmlns:mc="http://schemas.openxmlformats.org/markup-compatibility/2006">
-          <mc:Choice xmlns:p14="http://schemas.microsoft.com/office/powerpoint/2010/main" Requires="p14">
+        <mc:AlternateContent xmlns:mc="http://schemas.openxmlformats.org/markup-compatibility/2006" xmlns:p14="http://schemas.microsoft.com/office/powerpoint/2010/main">
+          <mc:Choice Requires="p14">
             <p:contentPart p14:bwMode="auto" r:id="rId33">
               <p14:nvContentPartPr>
                 <p14:cNvPr id="63" name="Ink 62">
@@ -19593,7 +19744,7 @@
               </p14:xfrm>
             </p:contentPart>
           </mc:Choice>
-          <mc:Fallback>
+          <mc:Fallback xmlns="">
             <p:pic>
               <p:nvPicPr>
                 <p:cNvPr id="63" name="Ink 62">
@@ -19624,8 +19775,8 @@
             </p:pic>
           </mc:Fallback>
         </mc:AlternateContent>
-        <mc:AlternateContent xmlns:mc="http://schemas.openxmlformats.org/markup-compatibility/2006">
-          <mc:Choice xmlns:p14="http://schemas.microsoft.com/office/powerpoint/2010/main" Requires="p14">
+        <mc:AlternateContent xmlns:mc="http://schemas.openxmlformats.org/markup-compatibility/2006" xmlns:p14="http://schemas.microsoft.com/office/powerpoint/2010/main">
+          <mc:Choice Requires="p14">
             <p:contentPart p14:bwMode="auto" r:id="rId34">
               <p14:nvContentPartPr>
                 <p14:cNvPr id="64" name="Ink 63">
@@ -19644,7 +19795,7 @@
               </p14:xfrm>
             </p:contentPart>
           </mc:Choice>
-          <mc:Fallback>
+          <mc:Fallback xmlns="">
             <p:pic>
               <p:nvPicPr>
                 <p:cNvPr id="64" name="Ink 63">
@@ -19675,8 +19826,8 @@
             </p:pic>
           </mc:Fallback>
         </mc:AlternateContent>
-        <mc:AlternateContent xmlns:mc="http://schemas.openxmlformats.org/markup-compatibility/2006">
-          <mc:Choice xmlns:p14="http://schemas.microsoft.com/office/powerpoint/2010/main" Requires="p14">
+        <mc:AlternateContent xmlns:mc="http://schemas.openxmlformats.org/markup-compatibility/2006" xmlns:p14="http://schemas.microsoft.com/office/powerpoint/2010/main">
+          <mc:Choice Requires="p14">
             <p:contentPart p14:bwMode="auto" r:id="rId35">
               <p14:nvContentPartPr>
                 <p14:cNvPr id="65" name="Ink 64">
@@ -19695,7 +19846,7 @@
               </p14:xfrm>
             </p:contentPart>
           </mc:Choice>
-          <mc:Fallback>
+          <mc:Fallback xmlns="">
             <p:pic>
               <p:nvPicPr>
                 <p:cNvPr id="65" name="Ink 64">
@@ -19726,8 +19877,8 @@
             </p:pic>
           </mc:Fallback>
         </mc:AlternateContent>
-        <mc:AlternateContent xmlns:mc="http://schemas.openxmlformats.org/markup-compatibility/2006">
-          <mc:Choice xmlns:p14="http://schemas.microsoft.com/office/powerpoint/2010/main" Requires="p14">
+        <mc:AlternateContent xmlns:mc="http://schemas.openxmlformats.org/markup-compatibility/2006" xmlns:p14="http://schemas.microsoft.com/office/powerpoint/2010/main">
+          <mc:Choice Requires="p14">
             <p:contentPart p14:bwMode="auto" r:id="rId36">
               <p14:nvContentPartPr>
                 <p14:cNvPr id="66" name="Ink 65">
@@ -19746,7 +19897,7 @@
               </p14:xfrm>
             </p:contentPart>
           </mc:Choice>
-          <mc:Fallback>
+          <mc:Fallback xmlns="">
             <p:pic>
               <p:nvPicPr>
                 <p:cNvPr id="66" name="Ink 65">
@@ -19777,8 +19928,8 @@
             </p:pic>
           </mc:Fallback>
         </mc:AlternateContent>
-        <mc:AlternateContent xmlns:mc="http://schemas.openxmlformats.org/markup-compatibility/2006">
-          <mc:Choice xmlns:p14="http://schemas.microsoft.com/office/powerpoint/2010/main" Requires="p14">
+        <mc:AlternateContent xmlns:mc="http://schemas.openxmlformats.org/markup-compatibility/2006" xmlns:p14="http://schemas.microsoft.com/office/powerpoint/2010/main">
+          <mc:Choice Requires="p14">
             <p:contentPart p14:bwMode="auto" r:id="rId37">
               <p14:nvContentPartPr>
                 <p14:cNvPr id="67" name="Ink 66">
@@ -19797,7 +19948,7 @@
               </p14:xfrm>
             </p:contentPart>
           </mc:Choice>
-          <mc:Fallback>
+          <mc:Fallback xmlns="">
             <p:pic>
               <p:nvPicPr>
                 <p:cNvPr id="67" name="Ink 66">
@@ -19828,8 +19979,8 @@
             </p:pic>
           </mc:Fallback>
         </mc:AlternateContent>
-        <mc:AlternateContent xmlns:mc="http://schemas.openxmlformats.org/markup-compatibility/2006">
-          <mc:Choice xmlns:p14="http://schemas.microsoft.com/office/powerpoint/2010/main" Requires="p14">
+        <mc:AlternateContent xmlns:mc="http://schemas.openxmlformats.org/markup-compatibility/2006" xmlns:p14="http://schemas.microsoft.com/office/powerpoint/2010/main">
+          <mc:Choice Requires="p14">
             <p:contentPart p14:bwMode="auto" r:id="rId38">
               <p14:nvContentPartPr>
                 <p14:cNvPr id="72" name="Ink 71">
@@ -19848,7 +19999,7 @@
               </p14:xfrm>
             </p:contentPart>
           </mc:Choice>
-          <mc:Fallback>
+          <mc:Fallback xmlns="">
             <p:pic>
               <p:nvPicPr>
                 <p:cNvPr id="72" name="Ink 71">
@@ -19879,8 +20030,8 @@
             </p:pic>
           </mc:Fallback>
         </mc:AlternateContent>
-        <mc:AlternateContent xmlns:mc="http://schemas.openxmlformats.org/markup-compatibility/2006">
-          <mc:Choice xmlns:p14="http://schemas.microsoft.com/office/powerpoint/2010/main" Requires="p14">
+        <mc:AlternateContent xmlns:mc="http://schemas.openxmlformats.org/markup-compatibility/2006" xmlns:p14="http://schemas.microsoft.com/office/powerpoint/2010/main">
+          <mc:Choice Requires="p14">
             <p:contentPart p14:bwMode="auto" r:id="rId40">
               <p14:nvContentPartPr>
                 <p14:cNvPr id="74" name="Ink 73">
@@ -19899,7 +20050,7 @@
               </p14:xfrm>
             </p:contentPart>
           </mc:Choice>
-          <mc:Fallback>
+          <mc:Fallback xmlns="">
             <p:pic>
               <p:nvPicPr>
                 <p:cNvPr id="74" name="Ink 73">
@@ -19931,8 +20082,8 @@
           </mc:Fallback>
         </mc:AlternateContent>
       </p:grpSp>
-      <mc:AlternateContent xmlns:mc="http://schemas.openxmlformats.org/markup-compatibility/2006">
-        <mc:Choice xmlns:p14="http://schemas.microsoft.com/office/powerpoint/2010/main" Requires="p14">
+      <mc:AlternateContent xmlns:mc="http://schemas.openxmlformats.org/markup-compatibility/2006" xmlns:p14="http://schemas.microsoft.com/office/powerpoint/2010/main">
+        <mc:Choice Requires="p14">
           <p:contentPart p14:bwMode="auto" r:id="rId42">
             <p14:nvContentPartPr>
               <p14:cNvPr id="84" name="Ink 83">
@@ -19951,7 +20102,7 @@
             </p14:xfrm>
           </p:contentPart>
         </mc:Choice>
-        <mc:Fallback>
+        <mc:Fallback xmlns="">
           <p:pic>
             <p:nvPicPr>
               <p:cNvPr id="84" name="Ink 83">
@@ -19982,8 +20133,8 @@
           </p:pic>
         </mc:Fallback>
       </mc:AlternateContent>
-      <mc:AlternateContent xmlns:mc="http://schemas.openxmlformats.org/markup-compatibility/2006">
-        <mc:Choice xmlns:p14="http://schemas.microsoft.com/office/powerpoint/2010/main" Requires="p14">
+      <mc:AlternateContent xmlns:mc="http://schemas.openxmlformats.org/markup-compatibility/2006" xmlns:p14="http://schemas.microsoft.com/office/powerpoint/2010/main">
+        <mc:Choice Requires="p14">
           <p:contentPart p14:bwMode="auto" r:id="rId43">
             <p14:nvContentPartPr>
               <p14:cNvPr id="86" name="Ink 85">
@@ -20002,7 +20153,7 @@
             </p14:xfrm>
           </p:contentPart>
         </mc:Choice>
-        <mc:Fallback>
+        <mc:Fallback xmlns="">
           <p:pic>
             <p:nvPicPr>
               <p:cNvPr id="86" name="Ink 85">
@@ -20053,8 +20204,8 @@
             <a:chExt cx="1187640" cy="472320"/>
           </a:xfrm>
         </p:grpSpPr>
-        <mc:AlternateContent xmlns:mc="http://schemas.openxmlformats.org/markup-compatibility/2006">
-          <mc:Choice xmlns:p14="http://schemas.microsoft.com/office/powerpoint/2010/main" Requires="p14">
+        <mc:AlternateContent xmlns:mc="http://schemas.openxmlformats.org/markup-compatibility/2006" xmlns:p14="http://schemas.microsoft.com/office/powerpoint/2010/main">
+          <mc:Choice Requires="p14">
             <p:contentPart p14:bwMode="auto" r:id="rId44">
               <p14:nvContentPartPr>
                 <p14:cNvPr id="4" name="Ink 3">
@@ -20073,7 +20224,7 @@
               </p14:xfrm>
             </p:contentPart>
           </mc:Choice>
-          <mc:Fallback>
+          <mc:Fallback xmlns="">
             <p:pic>
               <p:nvPicPr>
                 <p:cNvPr id="4" name="Ink 3">
@@ -20104,8 +20255,8 @@
             </p:pic>
           </mc:Fallback>
         </mc:AlternateContent>
-        <mc:AlternateContent xmlns:mc="http://schemas.openxmlformats.org/markup-compatibility/2006">
-          <mc:Choice xmlns:p14="http://schemas.microsoft.com/office/powerpoint/2010/main" Requires="p14">
+        <mc:AlternateContent xmlns:mc="http://schemas.openxmlformats.org/markup-compatibility/2006" xmlns:p14="http://schemas.microsoft.com/office/powerpoint/2010/main">
+          <mc:Choice Requires="p14">
             <p:contentPart p14:bwMode="auto" r:id="rId45">
               <p14:nvContentPartPr>
                 <p14:cNvPr id="5" name="Ink 4">
@@ -20124,7 +20275,7 @@
               </p14:xfrm>
             </p:contentPart>
           </mc:Choice>
-          <mc:Fallback>
+          <mc:Fallback xmlns="">
             <p:pic>
               <p:nvPicPr>
                 <p:cNvPr id="5" name="Ink 4">
@@ -20155,8 +20306,8 @@
             </p:pic>
           </mc:Fallback>
         </mc:AlternateContent>
-        <mc:AlternateContent xmlns:mc="http://schemas.openxmlformats.org/markup-compatibility/2006">
-          <mc:Choice xmlns:p14="http://schemas.microsoft.com/office/powerpoint/2010/main" Requires="p14">
+        <mc:AlternateContent xmlns:mc="http://schemas.openxmlformats.org/markup-compatibility/2006" xmlns:p14="http://schemas.microsoft.com/office/powerpoint/2010/main">
+          <mc:Choice Requires="p14">
             <p:contentPart p14:bwMode="auto" r:id="rId46">
               <p14:nvContentPartPr>
                 <p14:cNvPr id="6" name="Ink 5">
@@ -20175,7 +20326,7 @@
               </p14:xfrm>
             </p:contentPart>
           </mc:Choice>
-          <mc:Fallback>
+          <mc:Fallback xmlns="">
             <p:pic>
               <p:nvPicPr>
                 <p:cNvPr id="6" name="Ink 5">
@@ -20206,8 +20357,8 @@
             </p:pic>
           </mc:Fallback>
         </mc:AlternateContent>
-        <mc:AlternateContent xmlns:mc="http://schemas.openxmlformats.org/markup-compatibility/2006">
-          <mc:Choice xmlns:p14="http://schemas.microsoft.com/office/powerpoint/2010/main" Requires="p14">
+        <mc:AlternateContent xmlns:mc="http://schemas.openxmlformats.org/markup-compatibility/2006" xmlns:p14="http://schemas.microsoft.com/office/powerpoint/2010/main">
+          <mc:Choice Requires="p14">
             <p:contentPart p14:bwMode="auto" r:id="rId47">
               <p14:nvContentPartPr>
                 <p14:cNvPr id="7" name="Ink 6">
@@ -20226,7 +20377,7 @@
               </p14:xfrm>
             </p:contentPart>
           </mc:Choice>
-          <mc:Fallback>
+          <mc:Fallback xmlns="">
             <p:pic>
               <p:nvPicPr>
                 <p:cNvPr id="7" name="Ink 6">
@@ -20257,8 +20408,8 @@
             </p:pic>
           </mc:Fallback>
         </mc:AlternateContent>
-        <mc:AlternateContent xmlns:mc="http://schemas.openxmlformats.org/markup-compatibility/2006">
-          <mc:Choice xmlns:p14="http://schemas.microsoft.com/office/powerpoint/2010/main" Requires="p14">
+        <mc:AlternateContent xmlns:mc="http://schemas.openxmlformats.org/markup-compatibility/2006" xmlns:p14="http://schemas.microsoft.com/office/powerpoint/2010/main">
+          <mc:Choice Requires="p14">
             <p:contentPart p14:bwMode="auto" r:id="rId48">
               <p14:nvContentPartPr>
                 <p14:cNvPr id="8" name="Ink 7">
@@ -20277,7 +20428,7 @@
               </p14:xfrm>
             </p:contentPart>
           </mc:Choice>
-          <mc:Fallback>
+          <mc:Fallback xmlns="">
             <p:pic>
               <p:nvPicPr>
                 <p:cNvPr id="8" name="Ink 7">
@@ -20308,8 +20459,8 @@
             </p:pic>
           </mc:Fallback>
         </mc:AlternateContent>
-        <mc:AlternateContent xmlns:mc="http://schemas.openxmlformats.org/markup-compatibility/2006">
-          <mc:Choice xmlns:p14="http://schemas.microsoft.com/office/powerpoint/2010/main" Requires="p14">
+        <mc:AlternateContent xmlns:mc="http://schemas.openxmlformats.org/markup-compatibility/2006" xmlns:p14="http://schemas.microsoft.com/office/powerpoint/2010/main">
+          <mc:Choice Requires="p14">
             <p:contentPart p14:bwMode="auto" r:id="rId49">
               <p14:nvContentPartPr>
                 <p14:cNvPr id="9" name="Ink 8">
@@ -20328,7 +20479,7 @@
               </p14:xfrm>
             </p:contentPart>
           </mc:Choice>
-          <mc:Fallback>
+          <mc:Fallback xmlns="">
             <p:pic>
               <p:nvPicPr>
                 <p:cNvPr id="9" name="Ink 8">
@@ -20359,8 +20510,8 @@
             </p:pic>
           </mc:Fallback>
         </mc:AlternateContent>
-        <mc:AlternateContent xmlns:mc="http://schemas.openxmlformats.org/markup-compatibility/2006">
-          <mc:Choice xmlns:p14="http://schemas.microsoft.com/office/powerpoint/2010/main" Requires="p14">
+        <mc:AlternateContent xmlns:mc="http://schemas.openxmlformats.org/markup-compatibility/2006" xmlns:p14="http://schemas.microsoft.com/office/powerpoint/2010/main">
+          <mc:Choice Requires="p14">
             <p:contentPart p14:bwMode="auto" r:id="rId50">
               <p14:nvContentPartPr>
                 <p14:cNvPr id="10" name="Ink 9">
@@ -20379,7 +20530,7 @@
               </p14:xfrm>
             </p:contentPart>
           </mc:Choice>
-          <mc:Fallback>
+          <mc:Fallback xmlns="">
             <p:pic>
               <p:nvPicPr>
                 <p:cNvPr id="10" name="Ink 9">
@@ -20410,8 +20561,8 @@
             </p:pic>
           </mc:Fallback>
         </mc:AlternateContent>
-        <mc:AlternateContent xmlns:mc="http://schemas.openxmlformats.org/markup-compatibility/2006">
-          <mc:Choice xmlns:p14="http://schemas.microsoft.com/office/powerpoint/2010/main" Requires="p14">
+        <mc:AlternateContent xmlns:mc="http://schemas.openxmlformats.org/markup-compatibility/2006" xmlns:p14="http://schemas.microsoft.com/office/powerpoint/2010/main">
+          <mc:Choice Requires="p14">
             <p:contentPart p14:bwMode="auto" r:id="rId51">
               <p14:nvContentPartPr>
                 <p14:cNvPr id="11" name="Ink 10">
@@ -20430,7 +20581,7 @@
               </p14:xfrm>
             </p:contentPart>
           </mc:Choice>
-          <mc:Fallback>
+          <mc:Fallback xmlns="">
             <p:pic>
               <p:nvPicPr>
                 <p:cNvPr id="11" name="Ink 10">
@@ -20461,8 +20612,8 @@
             </p:pic>
           </mc:Fallback>
         </mc:AlternateContent>
-        <mc:AlternateContent xmlns:mc="http://schemas.openxmlformats.org/markup-compatibility/2006">
-          <mc:Choice xmlns:p14="http://schemas.microsoft.com/office/powerpoint/2010/main" Requires="p14">
+        <mc:AlternateContent xmlns:mc="http://schemas.openxmlformats.org/markup-compatibility/2006" xmlns:p14="http://schemas.microsoft.com/office/powerpoint/2010/main">
+          <mc:Choice Requires="p14">
             <p:contentPart p14:bwMode="auto" r:id="rId52">
               <p14:nvContentPartPr>
                 <p14:cNvPr id="12" name="Ink 11">
@@ -20481,7 +20632,7 @@
               </p14:xfrm>
             </p:contentPart>
           </mc:Choice>
-          <mc:Fallback>
+          <mc:Fallback xmlns="">
             <p:pic>
               <p:nvPicPr>
                 <p:cNvPr id="12" name="Ink 11">
@@ -20512,8 +20663,8 @@
             </p:pic>
           </mc:Fallback>
         </mc:AlternateContent>
-        <mc:AlternateContent xmlns:mc="http://schemas.openxmlformats.org/markup-compatibility/2006">
-          <mc:Choice xmlns:p14="http://schemas.microsoft.com/office/powerpoint/2010/main" Requires="p14">
+        <mc:AlternateContent xmlns:mc="http://schemas.openxmlformats.org/markup-compatibility/2006" xmlns:p14="http://schemas.microsoft.com/office/powerpoint/2010/main">
+          <mc:Choice Requires="p14">
             <p:contentPart p14:bwMode="auto" r:id="rId53">
               <p14:nvContentPartPr>
                 <p14:cNvPr id="13" name="Ink 12">
@@ -20532,7 +20683,7 @@
               </p14:xfrm>
             </p:contentPart>
           </mc:Choice>
-          <mc:Fallback>
+          <mc:Fallback xmlns="">
             <p:pic>
               <p:nvPicPr>
                 <p:cNvPr id="13" name="Ink 12">
@@ -20563,8 +20714,8 @@
             </p:pic>
           </mc:Fallback>
         </mc:AlternateContent>
-        <mc:AlternateContent xmlns:mc="http://schemas.openxmlformats.org/markup-compatibility/2006">
-          <mc:Choice xmlns:p14="http://schemas.microsoft.com/office/powerpoint/2010/main" Requires="p14">
+        <mc:AlternateContent xmlns:mc="http://schemas.openxmlformats.org/markup-compatibility/2006" xmlns:p14="http://schemas.microsoft.com/office/powerpoint/2010/main">
+          <mc:Choice Requires="p14">
             <p:contentPart p14:bwMode="auto" r:id="rId54">
               <p14:nvContentPartPr>
                 <p14:cNvPr id="14" name="Ink 13">
@@ -20583,7 +20734,7 @@
               </p14:xfrm>
             </p:contentPart>
           </mc:Choice>
-          <mc:Fallback>
+          <mc:Fallback xmlns="">
             <p:pic>
               <p:nvPicPr>
                 <p:cNvPr id="14" name="Ink 13">
@@ -20614,8 +20765,8 @@
             </p:pic>
           </mc:Fallback>
         </mc:AlternateContent>
-        <mc:AlternateContent xmlns:mc="http://schemas.openxmlformats.org/markup-compatibility/2006">
-          <mc:Choice xmlns:p14="http://schemas.microsoft.com/office/powerpoint/2010/main" Requires="p14">
+        <mc:AlternateContent xmlns:mc="http://schemas.openxmlformats.org/markup-compatibility/2006" xmlns:p14="http://schemas.microsoft.com/office/powerpoint/2010/main">
+          <mc:Choice Requires="p14">
             <p:contentPart p14:bwMode="auto" r:id="rId55">
               <p14:nvContentPartPr>
                 <p14:cNvPr id="15" name="Ink 14">
@@ -20634,7 +20785,7 @@
               </p14:xfrm>
             </p:contentPart>
           </mc:Choice>
-          <mc:Fallback>
+          <mc:Fallback xmlns="">
             <p:pic>
               <p:nvPicPr>
                 <p:cNvPr id="15" name="Ink 14">
@@ -20665,8 +20816,8 @@
             </p:pic>
           </mc:Fallback>
         </mc:AlternateContent>
-        <mc:AlternateContent xmlns:mc="http://schemas.openxmlformats.org/markup-compatibility/2006">
-          <mc:Choice xmlns:p14="http://schemas.microsoft.com/office/powerpoint/2010/main" Requires="p14">
+        <mc:AlternateContent xmlns:mc="http://schemas.openxmlformats.org/markup-compatibility/2006" xmlns:p14="http://schemas.microsoft.com/office/powerpoint/2010/main">
+          <mc:Choice Requires="p14">
             <p:contentPart p14:bwMode="auto" r:id="rId56">
               <p14:nvContentPartPr>
                 <p14:cNvPr id="18" name="Ink 17">
@@ -20685,7 +20836,7 @@
               </p14:xfrm>
             </p:contentPart>
           </mc:Choice>
-          <mc:Fallback>
+          <mc:Fallback xmlns="">
             <p:pic>
               <p:nvPicPr>
                 <p:cNvPr id="18" name="Ink 17">
@@ -20716,8 +20867,8 @@
             </p:pic>
           </mc:Fallback>
         </mc:AlternateContent>
-        <mc:AlternateContent xmlns:mc="http://schemas.openxmlformats.org/markup-compatibility/2006">
-          <mc:Choice xmlns:p14="http://schemas.microsoft.com/office/powerpoint/2010/main" Requires="p14">
+        <mc:AlternateContent xmlns:mc="http://schemas.openxmlformats.org/markup-compatibility/2006" xmlns:p14="http://schemas.microsoft.com/office/powerpoint/2010/main">
+          <mc:Choice Requires="p14">
             <p:contentPart p14:bwMode="auto" r:id="rId58">
               <p14:nvContentPartPr>
                 <p14:cNvPr id="19" name="Ink 18">
@@ -20736,7 +20887,7 @@
               </p14:xfrm>
             </p:contentPart>
           </mc:Choice>
-          <mc:Fallback>
+          <mc:Fallback xmlns="">
             <p:pic>
               <p:nvPicPr>
                 <p:cNvPr id="19" name="Ink 18">
@@ -20767,8 +20918,8 @@
             </p:pic>
           </mc:Fallback>
         </mc:AlternateContent>
-        <mc:AlternateContent xmlns:mc="http://schemas.openxmlformats.org/markup-compatibility/2006">
-          <mc:Choice xmlns:p14="http://schemas.microsoft.com/office/powerpoint/2010/main" Requires="p14">
+        <mc:AlternateContent xmlns:mc="http://schemas.openxmlformats.org/markup-compatibility/2006" xmlns:p14="http://schemas.microsoft.com/office/powerpoint/2010/main">
+          <mc:Choice Requires="p14">
             <p:contentPart p14:bwMode="auto" r:id="rId59">
               <p14:nvContentPartPr>
                 <p14:cNvPr id="20" name="Ink 19">
@@ -20787,7 +20938,7 @@
               </p14:xfrm>
             </p:contentPart>
           </mc:Choice>
-          <mc:Fallback>
+          <mc:Fallback xmlns="">
             <p:pic>
               <p:nvPicPr>
                 <p:cNvPr id="20" name="Ink 19">
@@ -20818,8 +20969,8 @@
             </p:pic>
           </mc:Fallback>
         </mc:AlternateContent>
-        <mc:AlternateContent xmlns:mc="http://schemas.openxmlformats.org/markup-compatibility/2006">
-          <mc:Choice xmlns:p14="http://schemas.microsoft.com/office/powerpoint/2010/main" Requires="p14">
+        <mc:AlternateContent xmlns:mc="http://schemas.openxmlformats.org/markup-compatibility/2006" xmlns:p14="http://schemas.microsoft.com/office/powerpoint/2010/main">
+          <mc:Choice Requires="p14">
             <p:contentPart p14:bwMode="auto" r:id="rId60">
               <p14:nvContentPartPr>
                 <p14:cNvPr id="21" name="Ink 20">
@@ -20838,7 +20989,7 @@
               </p14:xfrm>
             </p:contentPart>
           </mc:Choice>
-          <mc:Fallback>
+          <mc:Fallback xmlns="">
             <p:pic>
               <p:nvPicPr>
                 <p:cNvPr id="21" name="Ink 20">
@@ -20869,8 +21020,8 @@
             </p:pic>
           </mc:Fallback>
         </mc:AlternateContent>
-        <mc:AlternateContent xmlns:mc="http://schemas.openxmlformats.org/markup-compatibility/2006">
-          <mc:Choice xmlns:p14="http://schemas.microsoft.com/office/powerpoint/2010/main" Requires="p14">
+        <mc:AlternateContent xmlns:mc="http://schemas.openxmlformats.org/markup-compatibility/2006" xmlns:p14="http://schemas.microsoft.com/office/powerpoint/2010/main">
+          <mc:Choice Requires="p14">
             <p:contentPart p14:bwMode="auto" r:id="rId61">
               <p14:nvContentPartPr>
                 <p14:cNvPr id="22" name="Ink 21">
@@ -20889,7 +21040,7 @@
               </p14:xfrm>
             </p:contentPart>
           </mc:Choice>
-          <mc:Fallback>
+          <mc:Fallback xmlns="">
             <p:pic>
               <p:nvPicPr>
                 <p:cNvPr id="22" name="Ink 21">
@@ -20920,8 +21071,8 @@
             </p:pic>
           </mc:Fallback>
         </mc:AlternateContent>
-        <mc:AlternateContent xmlns:mc="http://schemas.openxmlformats.org/markup-compatibility/2006">
-          <mc:Choice xmlns:p14="http://schemas.microsoft.com/office/powerpoint/2010/main" Requires="p14">
+        <mc:AlternateContent xmlns:mc="http://schemas.openxmlformats.org/markup-compatibility/2006" xmlns:p14="http://schemas.microsoft.com/office/powerpoint/2010/main">
+          <mc:Choice Requires="p14">
             <p:contentPart p14:bwMode="auto" r:id="rId62">
               <p14:nvContentPartPr>
                 <p14:cNvPr id="23" name="Ink 22">
@@ -20940,7 +21091,7 @@
               </p14:xfrm>
             </p:contentPart>
           </mc:Choice>
-          <mc:Fallback>
+          <mc:Fallback xmlns="">
             <p:pic>
               <p:nvPicPr>
                 <p:cNvPr id="23" name="Ink 22">
@@ -20971,8 +21122,8 @@
             </p:pic>
           </mc:Fallback>
         </mc:AlternateContent>
-        <mc:AlternateContent xmlns:mc="http://schemas.openxmlformats.org/markup-compatibility/2006">
-          <mc:Choice xmlns:p14="http://schemas.microsoft.com/office/powerpoint/2010/main" Requires="p14">
+        <mc:AlternateContent xmlns:mc="http://schemas.openxmlformats.org/markup-compatibility/2006" xmlns:p14="http://schemas.microsoft.com/office/powerpoint/2010/main">
+          <mc:Choice Requires="p14">
             <p:contentPart p14:bwMode="auto" r:id="rId63">
               <p14:nvContentPartPr>
                 <p14:cNvPr id="24" name="Ink 23">
@@ -20991,7 +21142,7 @@
               </p14:xfrm>
             </p:contentPart>
           </mc:Choice>
-          <mc:Fallback>
+          <mc:Fallback xmlns="">
             <p:pic>
               <p:nvPicPr>
                 <p:cNvPr id="24" name="Ink 23">
@@ -21022,8 +21173,8 @@
             </p:pic>
           </mc:Fallback>
         </mc:AlternateContent>
-        <mc:AlternateContent xmlns:mc="http://schemas.openxmlformats.org/markup-compatibility/2006">
-          <mc:Choice xmlns:p14="http://schemas.microsoft.com/office/powerpoint/2010/main" Requires="p14">
+        <mc:AlternateContent xmlns:mc="http://schemas.openxmlformats.org/markup-compatibility/2006" xmlns:p14="http://schemas.microsoft.com/office/powerpoint/2010/main">
+          <mc:Choice Requires="p14">
             <p:contentPart p14:bwMode="auto" r:id="rId64">
               <p14:nvContentPartPr>
                 <p14:cNvPr id="25" name="Ink 24">
@@ -21042,7 +21193,7 @@
               </p14:xfrm>
             </p:contentPart>
           </mc:Choice>
-          <mc:Fallback>
+          <mc:Fallback xmlns="">
             <p:pic>
               <p:nvPicPr>
                 <p:cNvPr id="25" name="Ink 24">
@@ -21073,8 +21224,8 @@
             </p:pic>
           </mc:Fallback>
         </mc:AlternateContent>
-        <mc:AlternateContent xmlns:mc="http://schemas.openxmlformats.org/markup-compatibility/2006">
-          <mc:Choice xmlns:p14="http://schemas.microsoft.com/office/powerpoint/2010/main" Requires="p14">
+        <mc:AlternateContent xmlns:mc="http://schemas.openxmlformats.org/markup-compatibility/2006" xmlns:p14="http://schemas.microsoft.com/office/powerpoint/2010/main">
+          <mc:Choice Requires="p14">
             <p:contentPart p14:bwMode="auto" r:id="rId65">
               <p14:nvContentPartPr>
                 <p14:cNvPr id="26" name="Ink 25">
@@ -21093,7 +21244,7 @@
               </p14:xfrm>
             </p:contentPart>
           </mc:Choice>
-          <mc:Fallback>
+          <mc:Fallback xmlns="">
             <p:pic>
               <p:nvPicPr>
                 <p:cNvPr id="26" name="Ink 25">
@@ -21124,8 +21275,8 @@
             </p:pic>
           </mc:Fallback>
         </mc:AlternateContent>
-        <mc:AlternateContent xmlns:mc="http://schemas.openxmlformats.org/markup-compatibility/2006">
-          <mc:Choice xmlns:p14="http://schemas.microsoft.com/office/powerpoint/2010/main" Requires="p14">
+        <mc:AlternateContent xmlns:mc="http://schemas.openxmlformats.org/markup-compatibility/2006" xmlns:p14="http://schemas.microsoft.com/office/powerpoint/2010/main">
+          <mc:Choice Requires="p14">
             <p:contentPart p14:bwMode="auto" r:id="rId66">
               <p14:nvContentPartPr>
                 <p14:cNvPr id="27" name="Ink 26">
@@ -21144,7 +21295,7 @@
               </p14:xfrm>
             </p:contentPart>
           </mc:Choice>
-          <mc:Fallback>
+          <mc:Fallback xmlns="">
             <p:pic>
               <p:nvPicPr>
                 <p:cNvPr id="27" name="Ink 26">
@@ -21175,8 +21326,8 @@
             </p:pic>
           </mc:Fallback>
         </mc:AlternateContent>
-        <mc:AlternateContent xmlns:mc="http://schemas.openxmlformats.org/markup-compatibility/2006">
-          <mc:Choice xmlns:p14="http://schemas.microsoft.com/office/powerpoint/2010/main" Requires="p14">
+        <mc:AlternateContent xmlns:mc="http://schemas.openxmlformats.org/markup-compatibility/2006" xmlns:p14="http://schemas.microsoft.com/office/powerpoint/2010/main">
+          <mc:Choice Requires="p14">
             <p:contentPart p14:bwMode="auto" r:id="rId68">
               <p14:nvContentPartPr>
                 <p14:cNvPr id="31" name="Ink 30">
@@ -21195,7 +21346,7 @@
               </p14:xfrm>
             </p:contentPart>
           </mc:Choice>
-          <mc:Fallback>
+          <mc:Fallback xmlns="">
             <p:pic>
               <p:nvPicPr>
                 <p:cNvPr id="31" name="Ink 30">
@@ -21226,8 +21377,8 @@
             </p:pic>
           </mc:Fallback>
         </mc:AlternateContent>
-        <mc:AlternateContent xmlns:mc="http://schemas.openxmlformats.org/markup-compatibility/2006">
-          <mc:Choice xmlns:p14="http://schemas.microsoft.com/office/powerpoint/2010/main" Requires="p14">
+        <mc:AlternateContent xmlns:mc="http://schemas.openxmlformats.org/markup-compatibility/2006" xmlns:p14="http://schemas.microsoft.com/office/powerpoint/2010/main">
+          <mc:Choice Requires="p14">
             <p:contentPart p14:bwMode="auto" r:id="rId69">
               <p14:nvContentPartPr>
                 <p14:cNvPr id="32" name="Ink 31">
@@ -21246,7 +21397,7 @@
               </p14:xfrm>
             </p:contentPart>
           </mc:Choice>
-          <mc:Fallback>
+          <mc:Fallback xmlns="">
             <p:pic>
               <p:nvPicPr>
                 <p:cNvPr id="32" name="Ink 31">
@@ -21277,8 +21428,8 @@
             </p:pic>
           </mc:Fallback>
         </mc:AlternateContent>
-        <mc:AlternateContent xmlns:mc="http://schemas.openxmlformats.org/markup-compatibility/2006">
-          <mc:Choice xmlns:p14="http://schemas.microsoft.com/office/powerpoint/2010/main" Requires="p14">
+        <mc:AlternateContent xmlns:mc="http://schemas.openxmlformats.org/markup-compatibility/2006" xmlns:p14="http://schemas.microsoft.com/office/powerpoint/2010/main">
+          <mc:Choice Requires="p14">
             <p:contentPart p14:bwMode="auto" r:id="rId70">
               <p14:nvContentPartPr>
                 <p14:cNvPr id="33" name="Ink 32">
@@ -21297,7 +21448,7 @@
               </p14:xfrm>
             </p:contentPart>
           </mc:Choice>
-          <mc:Fallback>
+          <mc:Fallback xmlns="">
             <p:pic>
               <p:nvPicPr>
                 <p:cNvPr id="33" name="Ink 32">
@@ -21328,8 +21479,8 @@
             </p:pic>
           </mc:Fallback>
         </mc:AlternateContent>
-        <mc:AlternateContent xmlns:mc="http://schemas.openxmlformats.org/markup-compatibility/2006">
-          <mc:Choice xmlns:p14="http://schemas.microsoft.com/office/powerpoint/2010/main" Requires="p14">
+        <mc:AlternateContent xmlns:mc="http://schemas.openxmlformats.org/markup-compatibility/2006" xmlns:p14="http://schemas.microsoft.com/office/powerpoint/2010/main">
+          <mc:Choice Requires="p14">
             <p:contentPart p14:bwMode="auto" r:id="rId71">
               <p14:nvContentPartPr>
                 <p14:cNvPr id="76" name="Ink 75">
@@ -21348,7 +21499,7 @@
               </p14:xfrm>
             </p:contentPart>
           </mc:Choice>
-          <mc:Fallback>
+          <mc:Fallback xmlns="">
             <p:pic>
               <p:nvPicPr>
                 <p:cNvPr id="76" name="Ink 75">
@@ -21379,8 +21530,8 @@
             </p:pic>
           </mc:Fallback>
         </mc:AlternateContent>
-        <mc:AlternateContent xmlns:mc="http://schemas.openxmlformats.org/markup-compatibility/2006">
-          <mc:Choice xmlns:p14="http://schemas.microsoft.com/office/powerpoint/2010/main" Requires="p14">
+        <mc:AlternateContent xmlns:mc="http://schemas.openxmlformats.org/markup-compatibility/2006" xmlns:p14="http://schemas.microsoft.com/office/powerpoint/2010/main">
+          <mc:Choice Requires="p14">
             <p:contentPart p14:bwMode="auto" r:id="rId72">
               <p14:nvContentPartPr>
                 <p14:cNvPr id="77" name="Ink 76">
@@ -21399,7 +21550,7 @@
               </p14:xfrm>
             </p:contentPart>
           </mc:Choice>
-          <mc:Fallback>
+          <mc:Fallback xmlns="">
             <p:pic>
               <p:nvPicPr>
                 <p:cNvPr id="77" name="Ink 76">
@@ -21430,8 +21581,8 @@
             </p:pic>
           </mc:Fallback>
         </mc:AlternateContent>
-        <mc:AlternateContent xmlns:mc="http://schemas.openxmlformats.org/markup-compatibility/2006">
-          <mc:Choice xmlns:p14="http://schemas.microsoft.com/office/powerpoint/2010/main" Requires="p14">
+        <mc:AlternateContent xmlns:mc="http://schemas.openxmlformats.org/markup-compatibility/2006" xmlns:p14="http://schemas.microsoft.com/office/powerpoint/2010/main">
+          <mc:Choice Requires="p14">
             <p:contentPart p14:bwMode="auto" r:id="rId73">
               <p14:nvContentPartPr>
                 <p14:cNvPr id="78" name="Ink 77">
@@ -21450,7 +21601,7 @@
               </p14:xfrm>
             </p:contentPart>
           </mc:Choice>
-          <mc:Fallback>
+          <mc:Fallback xmlns="">
             <p:pic>
               <p:nvPicPr>
                 <p:cNvPr id="78" name="Ink 77">
@@ -21481,8 +21632,8 @@
             </p:pic>
           </mc:Fallback>
         </mc:AlternateContent>
-        <mc:AlternateContent xmlns:mc="http://schemas.openxmlformats.org/markup-compatibility/2006">
-          <mc:Choice xmlns:p14="http://schemas.microsoft.com/office/powerpoint/2010/main" Requires="p14">
+        <mc:AlternateContent xmlns:mc="http://schemas.openxmlformats.org/markup-compatibility/2006" xmlns:p14="http://schemas.microsoft.com/office/powerpoint/2010/main">
+          <mc:Choice Requires="p14">
             <p:contentPart p14:bwMode="auto" r:id="rId74">
               <p14:nvContentPartPr>
                 <p14:cNvPr id="79" name="Ink 78">
@@ -21501,7 +21652,7 @@
               </p14:xfrm>
             </p:contentPart>
           </mc:Choice>
-          <mc:Fallback>
+          <mc:Fallback xmlns="">
             <p:pic>
               <p:nvPicPr>
                 <p:cNvPr id="79" name="Ink 78">
@@ -21532,8 +21683,8 @@
             </p:pic>
           </mc:Fallback>
         </mc:AlternateContent>
-        <mc:AlternateContent xmlns:mc="http://schemas.openxmlformats.org/markup-compatibility/2006">
-          <mc:Choice xmlns:p14="http://schemas.microsoft.com/office/powerpoint/2010/main" Requires="p14">
+        <mc:AlternateContent xmlns:mc="http://schemas.openxmlformats.org/markup-compatibility/2006" xmlns:p14="http://schemas.microsoft.com/office/powerpoint/2010/main">
+          <mc:Choice Requires="p14">
             <p:contentPart p14:bwMode="auto" r:id="rId75">
               <p14:nvContentPartPr>
                 <p14:cNvPr id="80" name="Ink 79">
@@ -21552,7 +21703,7 @@
               </p14:xfrm>
             </p:contentPart>
           </mc:Choice>
-          <mc:Fallback>
+          <mc:Fallback xmlns="">
             <p:pic>
               <p:nvPicPr>
                 <p:cNvPr id="80" name="Ink 79">
@@ -21583,8 +21734,8 @@
             </p:pic>
           </mc:Fallback>
         </mc:AlternateContent>
-        <mc:AlternateContent xmlns:mc="http://schemas.openxmlformats.org/markup-compatibility/2006">
-          <mc:Choice xmlns:p14="http://schemas.microsoft.com/office/powerpoint/2010/main" Requires="p14">
+        <mc:AlternateContent xmlns:mc="http://schemas.openxmlformats.org/markup-compatibility/2006" xmlns:p14="http://schemas.microsoft.com/office/powerpoint/2010/main">
+          <mc:Choice Requires="p14">
             <p:contentPart p14:bwMode="auto" r:id="rId76">
               <p14:nvContentPartPr>
                 <p14:cNvPr id="82" name="Ink 81">
@@ -21603,7 +21754,7 @@
               </p14:xfrm>
             </p:contentPart>
           </mc:Choice>
-          <mc:Fallback>
+          <mc:Fallback xmlns="">
             <p:pic>
               <p:nvPicPr>
                 <p:cNvPr id="82" name="Ink 81">
@@ -21634,8 +21785,8 @@
             </p:pic>
           </mc:Fallback>
         </mc:AlternateContent>
-        <mc:AlternateContent xmlns:mc="http://schemas.openxmlformats.org/markup-compatibility/2006">
-          <mc:Choice xmlns:p14="http://schemas.microsoft.com/office/powerpoint/2010/main" Requires="p14">
+        <mc:AlternateContent xmlns:mc="http://schemas.openxmlformats.org/markup-compatibility/2006" xmlns:p14="http://schemas.microsoft.com/office/powerpoint/2010/main">
+          <mc:Choice Requires="p14">
             <p:contentPart p14:bwMode="auto" r:id="rId77">
               <p14:nvContentPartPr>
                 <p14:cNvPr id="83" name="Ink 82">
@@ -21654,7 +21805,7 @@
               </p14:xfrm>
             </p:contentPart>
           </mc:Choice>
-          <mc:Fallback>
+          <mc:Fallback xmlns="">
             <p:pic>
               <p:nvPicPr>
                 <p:cNvPr id="83" name="Ink 82">
@@ -21685,8 +21836,8 @@
             </p:pic>
           </mc:Fallback>
         </mc:AlternateContent>
-        <mc:AlternateContent xmlns:mc="http://schemas.openxmlformats.org/markup-compatibility/2006">
-          <mc:Choice xmlns:p14="http://schemas.microsoft.com/office/powerpoint/2010/main" Requires="p14">
+        <mc:AlternateContent xmlns:mc="http://schemas.openxmlformats.org/markup-compatibility/2006" xmlns:p14="http://schemas.microsoft.com/office/powerpoint/2010/main">
+          <mc:Choice Requires="p14">
             <p:contentPart p14:bwMode="auto" r:id="rId78">
               <p14:nvContentPartPr>
                 <p14:cNvPr id="85" name="Ink 84">
@@ -21705,7 +21856,7 @@
               </p14:xfrm>
             </p:contentPart>
           </mc:Choice>
-          <mc:Fallback>
+          <mc:Fallback xmlns="">
             <p:pic>
               <p:nvPicPr>
                 <p:cNvPr id="85" name="Ink 84">
@@ -21736,8 +21887,8 @@
             </p:pic>
           </mc:Fallback>
         </mc:AlternateContent>
-        <mc:AlternateContent xmlns:mc="http://schemas.openxmlformats.org/markup-compatibility/2006">
-          <mc:Choice xmlns:p14="http://schemas.microsoft.com/office/powerpoint/2010/main" Requires="p14">
+        <mc:AlternateContent xmlns:mc="http://schemas.openxmlformats.org/markup-compatibility/2006" xmlns:p14="http://schemas.microsoft.com/office/powerpoint/2010/main">
+          <mc:Choice Requires="p14">
             <p:contentPart p14:bwMode="auto" r:id="rId79">
               <p14:nvContentPartPr>
                 <p14:cNvPr id="28" name="Ink 27">
@@ -21756,7 +21907,7 @@
               </p14:xfrm>
             </p:contentPart>
           </mc:Choice>
-          <mc:Fallback>
+          <mc:Fallback xmlns="">
             <p:pic>
               <p:nvPicPr>
                 <p:cNvPr id="28" name="Ink 27">
@@ -21787,8 +21938,8 @@
             </p:pic>
           </mc:Fallback>
         </mc:AlternateContent>
-        <mc:AlternateContent xmlns:mc="http://schemas.openxmlformats.org/markup-compatibility/2006">
-          <mc:Choice xmlns:p14="http://schemas.microsoft.com/office/powerpoint/2010/main" Requires="p14">
+        <mc:AlternateContent xmlns:mc="http://schemas.openxmlformats.org/markup-compatibility/2006" xmlns:p14="http://schemas.microsoft.com/office/powerpoint/2010/main">
+          <mc:Choice Requires="p14">
             <p:contentPart p14:bwMode="auto" r:id="rId80">
               <p14:nvContentPartPr>
                 <p14:cNvPr id="29" name="Ink 28">
@@ -21807,7 +21958,7 @@
               </p14:xfrm>
             </p:contentPart>
           </mc:Choice>
-          <mc:Fallback>
+          <mc:Fallback xmlns="">
             <p:pic>
               <p:nvPicPr>
                 <p:cNvPr id="29" name="Ink 28">
@@ -21838,8 +21989,8 @@
             </p:pic>
           </mc:Fallback>
         </mc:AlternateContent>
-        <mc:AlternateContent xmlns:mc="http://schemas.openxmlformats.org/markup-compatibility/2006">
-          <mc:Choice xmlns:p14="http://schemas.microsoft.com/office/powerpoint/2010/main" Requires="p14">
+        <mc:AlternateContent xmlns:mc="http://schemas.openxmlformats.org/markup-compatibility/2006" xmlns:p14="http://schemas.microsoft.com/office/powerpoint/2010/main">
+          <mc:Choice Requires="p14">
             <p:contentPart p14:bwMode="auto" r:id="rId81">
               <p14:nvContentPartPr>
                 <p14:cNvPr id="30" name="Ink 29">
@@ -21858,7 +22009,7 @@
               </p14:xfrm>
             </p:contentPart>
           </mc:Choice>
-          <mc:Fallback>
+          <mc:Fallback xmlns="">
             <p:pic>
               <p:nvPicPr>
                 <p:cNvPr id="30" name="Ink 29">
@@ -21889,8 +22040,8 @@
             </p:pic>
           </mc:Fallback>
         </mc:AlternateContent>
-        <mc:AlternateContent xmlns:mc="http://schemas.openxmlformats.org/markup-compatibility/2006">
-          <mc:Choice xmlns:p14="http://schemas.microsoft.com/office/powerpoint/2010/main" Requires="p14">
+        <mc:AlternateContent xmlns:mc="http://schemas.openxmlformats.org/markup-compatibility/2006" xmlns:p14="http://schemas.microsoft.com/office/powerpoint/2010/main">
+          <mc:Choice Requires="p14">
             <p:contentPart p14:bwMode="auto" r:id="rId82">
               <p14:nvContentPartPr>
                 <p14:cNvPr id="81" name="Ink 80">
@@ -21909,7 +22060,7 @@
               </p14:xfrm>
             </p:contentPart>
           </mc:Choice>
-          <mc:Fallback>
+          <mc:Fallback xmlns="">
             <p:pic>
               <p:nvPicPr>
                 <p:cNvPr id="81" name="Ink 80">
@@ -21940,8 +22091,8 @@
             </p:pic>
           </mc:Fallback>
         </mc:AlternateContent>
-        <mc:AlternateContent xmlns:mc="http://schemas.openxmlformats.org/markup-compatibility/2006">
-          <mc:Choice xmlns:p14="http://schemas.microsoft.com/office/powerpoint/2010/main" Requires="p14">
+        <mc:AlternateContent xmlns:mc="http://schemas.openxmlformats.org/markup-compatibility/2006" xmlns:p14="http://schemas.microsoft.com/office/powerpoint/2010/main">
+          <mc:Choice Requires="p14">
             <p:contentPart p14:bwMode="auto" r:id="rId83">
               <p14:nvContentPartPr>
                 <p14:cNvPr id="87" name="Ink 86">
@@ -21960,7 +22111,7 @@
               </p14:xfrm>
             </p:contentPart>
           </mc:Choice>
-          <mc:Fallback>
+          <mc:Fallback xmlns="">
             <p:pic>
               <p:nvPicPr>
                 <p:cNvPr id="87" name="Ink 86">
@@ -21991,8 +22142,8 @@
             </p:pic>
           </mc:Fallback>
         </mc:AlternateContent>
-        <mc:AlternateContent xmlns:mc="http://schemas.openxmlformats.org/markup-compatibility/2006">
-          <mc:Choice xmlns:p14="http://schemas.microsoft.com/office/powerpoint/2010/main" Requires="p14">
+        <mc:AlternateContent xmlns:mc="http://schemas.openxmlformats.org/markup-compatibility/2006" xmlns:p14="http://schemas.microsoft.com/office/powerpoint/2010/main">
+          <mc:Choice Requires="p14">
             <p:contentPart p14:bwMode="auto" r:id="rId84">
               <p14:nvContentPartPr>
                 <p14:cNvPr id="88" name="Ink 87">
@@ -22011,7 +22162,7 @@
               </p14:xfrm>
             </p:contentPart>
           </mc:Choice>
-          <mc:Fallback>
+          <mc:Fallback xmlns="">
             <p:pic>
               <p:nvPicPr>
                 <p:cNvPr id="88" name="Ink 87">
@@ -22042,8 +22193,8 @@
             </p:pic>
           </mc:Fallback>
         </mc:AlternateContent>
-        <mc:AlternateContent xmlns:mc="http://schemas.openxmlformats.org/markup-compatibility/2006">
-          <mc:Choice xmlns:p14="http://schemas.microsoft.com/office/powerpoint/2010/main" Requires="p14">
+        <mc:AlternateContent xmlns:mc="http://schemas.openxmlformats.org/markup-compatibility/2006" xmlns:p14="http://schemas.microsoft.com/office/powerpoint/2010/main">
+          <mc:Choice Requires="p14">
             <p:contentPart p14:bwMode="auto" r:id="rId85">
               <p14:nvContentPartPr>
                 <p14:cNvPr id="89" name="Ink 88">
@@ -22062,7 +22213,7 @@
               </p14:xfrm>
             </p:contentPart>
           </mc:Choice>
-          <mc:Fallback>
+          <mc:Fallback xmlns="">
             <p:pic>
               <p:nvPicPr>
                 <p:cNvPr id="89" name="Ink 88">
@@ -22114,8 +22265,8 @@
             <a:chExt cx="532440" cy="300240"/>
           </a:xfrm>
         </p:grpSpPr>
-        <mc:AlternateContent xmlns:mc="http://schemas.openxmlformats.org/markup-compatibility/2006">
-          <mc:Choice xmlns:p14="http://schemas.microsoft.com/office/powerpoint/2010/main" Requires="p14">
+        <mc:AlternateContent xmlns:mc="http://schemas.openxmlformats.org/markup-compatibility/2006" xmlns:p14="http://schemas.microsoft.com/office/powerpoint/2010/main">
+          <mc:Choice Requires="p14">
             <p:contentPart p14:bwMode="auto" r:id="rId86">
               <p14:nvContentPartPr>
                 <p14:cNvPr id="90" name="Ink 89">
@@ -22134,7 +22285,7 @@
               </p14:xfrm>
             </p:contentPart>
           </mc:Choice>
-          <mc:Fallback>
+          <mc:Fallback xmlns="">
             <p:pic>
               <p:nvPicPr>
                 <p:cNvPr id="90" name="Ink 89">
@@ -22165,8 +22316,8 @@
             </p:pic>
           </mc:Fallback>
         </mc:AlternateContent>
-        <mc:AlternateContent xmlns:mc="http://schemas.openxmlformats.org/markup-compatibility/2006">
-          <mc:Choice xmlns:p14="http://schemas.microsoft.com/office/powerpoint/2010/main" Requires="p14">
+        <mc:AlternateContent xmlns:mc="http://schemas.openxmlformats.org/markup-compatibility/2006" xmlns:p14="http://schemas.microsoft.com/office/powerpoint/2010/main">
+          <mc:Choice Requires="p14">
             <p:contentPart p14:bwMode="auto" r:id="rId88">
               <p14:nvContentPartPr>
                 <p14:cNvPr id="94" name="Ink 93">
@@ -22185,7 +22336,7 @@
               </p14:xfrm>
             </p:contentPart>
           </mc:Choice>
-          <mc:Fallback>
+          <mc:Fallback xmlns="">
             <p:pic>
               <p:nvPicPr>
                 <p:cNvPr id="94" name="Ink 93">
@@ -22216,8 +22367,8 @@
             </p:pic>
           </mc:Fallback>
         </mc:AlternateContent>
-        <mc:AlternateContent xmlns:mc="http://schemas.openxmlformats.org/markup-compatibility/2006">
-          <mc:Choice xmlns:p14="http://schemas.microsoft.com/office/powerpoint/2010/main" Requires="p14">
+        <mc:AlternateContent xmlns:mc="http://schemas.openxmlformats.org/markup-compatibility/2006" xmlns:p14="http://schemas.microsoft.com/office/powerpoint/2010/main">
+          <mc:Choice Requires="p14">
             <p:contentPart p14:bwMode="auto" r:id="rId90">
               <p14:nvContentPartPr>
                 <p14:cNvPr id="96" name="Ink 95">
@@ -22236,7 +22387,7 @@
               </p14:xfrm>
             </p:contentPart>
           </mc:Choice>
-          <mc:Fallback>
+          <mc:Fallback xmlns="">
             <p:pic>
               <p:nvPicPr>
                 <p:cNvPr id="96" name="Ink 95">
@@ -22393,8 +22544,8 @@
           </a:p>
         </p:txBody>
       </p:sp>
-      <mc:AlternateContent xmlns:mc="http://schemas.openxmlformats.org/markup-compatibility/2006">
-        <mc:Choice xmlns:p14="http://schemas.microsoft.com/office/powerpoint/2010/main" Requires="p14">
+      <mc:AlternateContent xmlns:mc="http://schemas.openxmlformats.org/markup-compatibility/2006" xmlns:p14="http://schemas.microsoft.com/office/powerpoint/2010/main">
+        <mc:Choice Requires="p14">
           <p:contentPart p14:bwMode="auto" r:id="rId3">
             <p14:nvContentPartPr>
               <p14:cNvPr id="4" name="Ink 3">
@@ -22413,7 +22564,7 @@
             </p14:xfrm>
           </p:contentPart>
         </mc:Choice>
-        <mc:Fallback>
+        <mc:Fallback xmlns="">
           <p:pic>
             <p:nvPicPr>
               <p:cNvPr id="4" name="Ink 3">
@@ -22464,8 +22615,8 @@
             <a:chExt cx="360" cy="360"/>
           </a:xfrm>
         </p:grpSpPr>
-        <mc:AlternateContent xmlns:mc="http://schemas.openxmlformats.org/markup-compatibility/2006">
-          <mc:Choice xmlns:p14="http://schemas.microsoft.com/office/powerpoint/2010/main" Requires="p14">
+        <mc:AlternateContent xmlns:mc="http://schemas.openxmlformats.org/markup-compatibility/2006" xmlns:p14="http://schemas.microsoft.com/office/powerpoint/2010/main">
+          <mc:Choice Requires="p14">
             <p:contentPart p14:bwMode="auto" r:id="rId5">
               <p14:nvContentPartPr>
                 <p14:cNvPr id="5" name="Ink 4">
@@ -22484,7 +22635,7 @@
               </p14:xfrm>
             </p:contentPart>
           </mc:Choice>
-          <mc:Fallback>
+          <mc:Fallback xmlns="">
             <p:pic>
               <p:nvPicPr>
                 <p:cNvPr id="5" name="Ink 4">
@@ -22515,8 +22666,8 @@
             </p:pic>
           </mc:Fallback>
         </mc:AlternateContent>
-        <mc:AlternateContent xmlns:mc="http://schemas.openxmlformats.org/markup-compatibility/2006">
-          <mc:Choice xmlns:p14="http://schemas.microsoft.com/office/powerpoint/2010/main" Requires="p14">
+        <mc:AlternateContent xmlns:mc="http://schemas.openxmlformats.org/markup-compatibility/2006" xmlns:p14="http://schemas.microsoft.com/office/powerpoint/2010/main">
+          <mc:Choice Requires="p14">
             <p:contentPart p14:bwMode="auto" r:id="rId7">
               <p14:nvContentPartPr>
                 <p14:cNvPr id="6" name="Ink 5">
@@ -22535,7 +22686,7 @@
               </p14:xfrm>
             </p:contentPart>
           </mc:Choice>
-          <mc:Fallback>
+          <mc:Fallback xmlns="">
             <p:pic>
               <p:nvPicPr>
                 <p:cNvPr id="6" name="Ink 5">
@@ -22587,8 +22738,8 @@
             <a:chExt cx="360" cy="360"/>
           </a:xfrm>
         </p:grpSpPr>
-        <mc:AlternateContent xmlns:mc="http://schemas.openxmlformats.org/markup-compatibility/2006">
-          <mc:Choice xmlns:p14="http://schemas.microsoft.com/office/powerpoint/2010/main" Requires="p14">
+        <mc:AlternateContent xmlns:mc="http://schemas.openxmlformats.org/markup-compatibility/2006" xmlns:p14="http://schemas.microsoft.com/office/powerpoint/2010/main">
+          <mc:Choice Requires="p14">
             <p:contentPart p14:bwMode="auto" r:id="rId8">
               <p14:nvContentPartPr>
                 <p14:cNvPr id="7" name="Ink 6">
@@ -22607,7 +22758,7 @@
               </p14:xfrm>
             </p:contentPart>
           </mc:Choice>
-          <mc:Fallback>
+          <mc:Fallback xmlns="">
             <p:pic>
               <p:nvPicPr>
                 <p:cNvPr id="7" name="Ink 6">
@@ -22638,8 +22789,8 @@
             </p:pic>
           </mc:Fallback>
         </mc:AlternateContent>
-        <mc:AlternateContent xmlns:mc="http://schemas.openxmlformats.org/markup-compatibility/2006">
-          <mc:Choice xmlns:p14="http://schemas.microsoft.com/office/powerpoint/2010/main" Requires="p14">
+        <mc:AlternateContent xmlns:mc="http://schemas.openxmlformats.org/markup-compatibility/2006" xmlns:p14="http://schemas.microsoft.com/office/powerpoint/2010/main">
+          <mc:Choice Requires="p14">
             <p:contentPart p14:bwMode="auto" r:id="rId9">
               <p14:nvContentPartPr>
                 <p14:cNvPr id="8" name="Ink 7">
@@ -22658,7 +22809,7 @@
               </p14:xfrm>
             </p:contentPart>
           </mc:Choice>
-          <mc:Fallback>
+          <mc:Fallback xmlns="">
             <p:pic>
               <p:nvPicPr>
                 <p:cNvPr id="8" name="Ink 7">
@@ -22710,8 +22861,8 @@
             <a:chExt cx="360" cy="360"/>
           </a:xfrm>
         </p:grpSpPr>
-        <mc:AlternateContent xmlns:mc="http://schemas.openxmlformats.org/markup-compatibility/2006">
-          <mc:Choice xmlns:p14="http://schemas.microsoft.com/office/powerpoint/2010/main" Requires="p14">
+        <mc:AlternateContent xmlns:mc="http://schemas.openxmlformats.org/markup-compatibility/2006" xmlns:p14="http://schemas.microsoft.com/office/powerpoint/2010/main">
+          <mc:Choice Requires="p14">
             <p:contentPart p14:bwMode="auto" r:id="rId10">
               <p14:nvContentPartPr>
                 <p14:cNvPr id="9" name="Ink 8">
@@ -22730,7 +22881,7 @@
               </p14:xfrm>
             </p:contentPart>
           </mc:Choice>
-          <mc:Fallback>
+          <mc:Fallback xmlns="">
             <p:pic>
               <p:nvPicPr>
                 <p:cNvPr id="9" name="Ink 8">
@@ -22761,8 +22912,8 @@
             </p:pic>
           </mc:Fallback>
         </mc:AlternateContent>
-        <mc:AlternateContent xmlns:mc="http://schemas.openxmlformats.org/markup-compatibility/2006">
-          <mc:Choice xmlns:p14="http://schemas.microsoft.com/office/powerpoint/2010/main" Requires="p14">
+        <mc:AlternateContent xmlns:mc="http://schemas.openxmlformats.org/markup-compatibility/2006" xmlns:p14="http://schemas.microsoft.com/office/powerpoint/2010/main">
+          <mc:Choice Requires="p14">
             <p:contentPart p14:bwMode="auto" r:id="rId11">
               <p14:nvContentPartPr>
                 <p14:cNvPr id="10" name="Ink 9">
@@ -22781,7 +22932,7 @@
               </p14:xfrm>
             </p:contentPart>
           </mc:Choice>
-          <mc:Fallback>
+          <mc:Fallback xmlns="">
             <p:pic>
               <p:nvPicPr>
                 <p:cNvPr id="10" name="Ink 9">
@@ -22812,8 +22963,8 @@
             </p:pic>
           </mc:Fallback>
         </mc:AlternateContent>
-        <mc:AlternateContent xmlns:mc="http://schemas.openxmlformats.org/markup-compatibility/2006">
-          <mc:Choice xmlns:p14="http://schemas.microsoft.com/office/powerpoint/2010/main" Requires="p14">
+        <mc:AlternateContent xmlns:mc="http://schemas.openxmlformats.org/markup-compatibility/2006" xmlns:p14="http://schemas.microsoft.com/office/powerpoint/2010/main">
+          <mc:Choice Requires="p14">
             <p:contentPart p14:bwMode="auto" r:id="rId12">
               <p14:nvContentPartPr>
                 <p14:cNvPr id="11" name="Ink 10">
@@ -22832,7 +22983,7 @@
               </p14:xfrm>
             </p:contentPart>
           </mc:Choice>
-          <mc:Fallback>
+          <mc:Fallback xmlns="">
             <p:pic>
               <p:nvPicPr>
                 <p:cNvPr id="11" name="Ink 10">
@@ -22864,8 +23015,8 @@
           </mc:Fallback>
         </mc:AlternateContent>
       </p:grpSp>
-      <mc:AlternateContent xmlns:mc="http://schemas.openxmlformats.org/markup-compatibility/2006">
-        <mc:Choice xmlns:p14="http://schemas.microsoft.com/office/powerpoint/2010/main" Requires="p14">
+      <mc:AlternateContent xmlns:mc="http://schemas.openxmlformats.org/markup-compatibility/2006" xmlns:p14="http://schemas.microsoft.com/office/powerpoint/2010/main">
+        <mc:Choice Requires="p14">
           <p:contentPart p14:bwMode="auto" r:id="rId13">
             <p14:nvContentPartPr>
               <p14:cNvPr id="12" name="Ink 11">
@@ -22884,7 +23035,7 @@
             </p14:xfrm>
           </p:contentPart>
         </mc:Choice>
-        <mc:Fallback>
+        <mc:Fallback xmlns="">
           <p:pic>
             <p:nvPicPr>
               <p:cNvPr id="12" name="Ink 11">
@@ -22915,8 +23066,8 @@
           </p:pic>
         </mc:Fallback>
       </mc:AlternateContent>
-      <mc:AlternateContent xmlns:mc="http://schemas.openxmlformats.org/markup-compatibility/2006">
-        <mc:Choice xmlns:p14="http://schemas.microsoft.com/office/powerpoint/2010/main" Requires="p14">
+      <mc:AlternateContent xmlns:mc="http://schemas.openxmlformats.org/markup-compatibility/2006" xmlns:p14="http://schemas.microsoft.com/office/powerpoint/2010/main">
+        <mc:Choice Requires="p14">
           <p:contentPart p14:bwMode="auto" r:id="rId14">
             <p14:nvContentPartPr>
               <p14:cNvPr id="13" name="Ink 12">
@@ -22935,7 +23086,7 @@
             </p14:xfrm>
           </p:contentPart>
         </mc:Choice>
-        <mc:Fallback>
+        <mc:Fallback xmlns="">
           <p:pic>
             <p:nvPicPr>
               <p:cNvPr id="13" name="Ink 12">
@@ -22986,8 +23137,8 @@
             <a:chExt cx="360" cy="360"/>
           </a:xfrm>
         </p:grpSpPr>
-        <mc:AlternateContent xmlns:mc="http://schemas.openxmlformats.org/markup-compatibility/2006">
-          <mc:Choice xmlns:p14="http://schemas.microsoft.com/office/powerpoint/2010/main" Requires="p14">
+        <mc:AlternateContent xmlns:mc="http://schemas.openxmlformats.org/markup-compatibility/2006" xmlns:p14="http://schemas.microsoft.com/office/powerpoint/2010/main">
+          <mc:Choice Requires="p14">
             <p:contentPart p14:bwMode="auto" r:id="rId15">
               <p14:nvContentPartPr>
                 <p14:cNvPr id="14" name="Ink 13">
@@ -23006,7 +23157,7 @@
               </p14:xfrm>
             </p:contentPart>
           </mc:Choice>
-          <mc:Fallback>
+          <mc:Fallback xmlns="">
             <p:pic>
               <p:nvPicPr>
                 <p:cNvPr id="14" name="Ink 13">
@@ -23037,8 +23188,8 @@
             </p:pic>
           </mc:Fallback>
         </mc:AlternateContent>
-        <mc:AlternateContent xmlns:mc="http://schemas.openxmlformats.org/markup-compatibility/2006">
-          <mc:Choice xmlns:p14="http://schemas.microsoft.com/office/powerpoint/2010/main" Requires="p14">
+        <mc:AlternateContent xmlns:mc="http://schemas.openxmlformats.org/markup-compatibility/2006" xmlns:p14="http://schemas.microsoft.com/office/powerpoint/2010/main">
+          <mc:Choice Requires="p14">
             <p:contentPart p14:bwMode="auto" r:id="rId16">
               <p14:nvContentPartPr>
                 <p14:cNvPr id="15" name="Ink 14">
@@ -23057,7 +23208,7 @@
               </p14:xfrm>
             </p:contentPart>
           </mc:Choice>
-          <mc:Fallback>
+          <mc:Fallback xmlns="">
             <p:pic>
               <p:nvPicPr>
                 <p:cNvPr id="15" name="Ink 14">
@@ -23089,8 +23240,8 @@
           </mc:Fallback>
         </mc:AlternateContent>
       </p:grpSp>
-      <mc:AlternateContent xmlns:mc="http://schemas.openxmlformats.org/markup-compatibility/2006">
-        <mc:Choice xmlns:p14="http://schemas.microsoft.com/office/powerpoint/2010/main" Requires="p14">
+      <mc:AlternateContent xmlns:mc="http://schemas.openxmlformats.org/markup-compatibility/2006" xmlns:p14="http://schemas.microsoft.com/office/powerpoint/2010/main">
+        <mc:Choice Requires="p14">
           <p:contentPart p14:bwMode="auto" r:id="rId17">
             <p14:nvContentPartPr>
               <p14:cNvPr id="16" name="Ink 15">
@@ -23109,7 +23260,7 @@
             </p14:xfrm>
           </p:contentPart>
         </mc:Choice>
-        <mc:Fallback>
+        <mc:Fallback xmlns="">
           <p:pic>
             <p:nvPicPr>
               <p:cNvPr id="16" name="Ink 15">
@@ -23140,8 +23291,8 @@
           </p:pic>
         </mc:Fallback>
       </mc:AlternateContent>
-      <mc:AlternateContent xmlns:mc="http://schemas.openxmlformats.org/markup-compatibility/2006">
-        <mc:Choice xmlns:p14="http://schemas.microsoft.com/office/powerpoint/2010/main" Requires="p14">
+      <mc:AlternateContent xmlns:mc="http://schemas.openxmlformats.org/markup-compatibility/2006" xmlns:p14="http://schemas.microsoft.com/office/powerpoint/2010/main">
+        <mc:Choice Requires="p14">
           <p:contentPart p14:bwMode="auto" r:id="rId18">
             <p14:nvContentPartPr>
               <p14:cNvPr id="17" name="Ink 16">
@@ -23160,7 +23311,7 @@
             </p14:xfrm>
           </p:contentPart>
         </mc:Choice>
-        <mc:Fallback>
+        <mc:Fallback xmlns="">
           <p:pic>
             <p:nvPicPr>
               <p:cNvPr id="17" name="Ink 16">
@@ -23191,8 +23342,8 @@
           </p:pic>
         </mc:Fallback>
       </mc:AlternateContent>
-      <mc:AlternateContent xmlns:mc="http://schemas.openxmlformats.org/markup-compatibility/2006">
-        <mc:Choice xmlns:p14="http://schemas.microsoft.com/office/powerpoint/2010/main" Requires="p14">
+      <mc:AlternateContent xmlns:mc="http://schemas.openxmlformats.org/markup-compatibility/2006" xmlns:p14="http://schemas.microsoft.com/office/powerpoint/2010/main">
+        <mc:Choice Requires="p14">
           <p:contentPart p14:bwMode="auto" r:id="rId19">
             <p14:nvContentPartPr>
               <p14:cNvPr id="18" name="Ink 17">
@@ -23211,7 +23362,7 @@
             </p14:xfrm>
           </p:contentPart>
         </mc:Choice>
-        <mc:Fallback>
+        <mc:Fallback xmlns="">
           <p:pic>
             <p:nvPicPr>
               <p:cNvPr id="18" name="Ink 17">
@@ -23242,8 +23393,8 @@
           </p:pic>
         </mc:Fallback>
       </mc:AlternateContent>
-      <mc:AlternateContent xmlns:mc="http://schemas.openxmlformats.org/markup-compatibility/2006">
-        <mc:Choice xmlns:p14="http://schemas.microsoft.com/office/powerpoint/2010/main" Requires="p14">
+      <mc:AlternateContent xmlns:mc="http://schemas.openxmlformats.org/markup-compatibility/2006" xmlns:p14="http://schemas.microsoft.com/office/powerpoint/2010/main">
+        <mc:Choice Requires="p14">
           <p:contentPart p14:bwMode="auto" r:id="rId20">
             <p14:nvContentPartPr>
               <p14:cNvPr id="19" name="Ink 18">
@@ -23262,7 +23413,7 @@
             </p14:xfrm>
           </p:contentPart>
         </mc:Choice>
-        <mc:Fallback>
+        <mc:Fallback xmlns="">
           <p:pic>
             <p:nvPicPr>
               <p:cNvPr id="19" name="Ink 18">
@@ -23313,8 +23464,8 @@
             <a:chExt cx="360" cy="360"/>
           </a:xfrm>
         </p:grpSpPr>
-        <mc:AlternateContent xmlns:mc="http://schemas.openxmlformats.org/markup-compatibility/2006">
-          <mc:Choice xmlns:p14="http://schemas.microsoft.com/office/powerpoint/2010/main" Requires="p14">
+        <mc:AlternateContent xmlns:mc="http://schemas.openxmlformats.org/markup-compatibility/2006" xmlns:p14="http://schemas.microsoft.com/office/powerpoint/2010/main">
+          <mc:Choice Requires="p14">
             <p:contentPart p14:bwMode="auto" r:id="rId21">
               <p14:nvContentPartPr>
                 <p14:cNvPr id="20" name="Ink 19">
@@ -23333,7 +23484,7 @@
               </p14:xfrm>
             </p:contentPart>
           </mc:Choice>
-          <mc:Fallback>
+          <mc:Fallback xmlns="">
             <p:pic>
               <p:nvPicPr>
                 <p:cNvPr id="20" name="Ink 19">
@@ -23364,8 +23515,8 @@
             </p:pic>
           </mc:Fallback>
         </mc:AlternateContent>
-        <mc:AlternateContent xmlns:mc="http://schemas.openxmlformats.org/markup-compatibility/2006">
-          <mc:Choice xmlns:p14="http://schemas.microsoft.com/office/powerpoint/2010/main" Requires="p14">
+        <mc:AlternateContent xmlns:mc="http://schemas.openxmlformats.org/markup-compatibility/2006" xmlns:p14="http://schemas.microsoft.com/office/powerpoint/2010/main">
+          <mc:Choice Requires="p14">
             <p:contentPart p14:bwMode="auto" r:id="rId22">
               <p14:nvContentPartPr>
                 <p14:cNvPr id="21" name="Ink 20">
@@ -23384,7 +23535,7 @@
               </p14:xfrm>
             </p:contentPart>
           </mc:Choice>
-          <mc:Fallback>
+          <mc:Fallback xmlns="">
             <p:pic>
               <p:nvPicPr>
                 <p:cNvPr id="21" name="Ink 20">
@@ -23436,8 +23587,8 @@
             <a:chExt cx="360" cy="360"/>
           </a:xfrm>
         </p:grpSpPr>
-        <mc:AlternateContent xmlns:mc="http://schemas.openxmlformats.org/markup-compatibility/2006">
-          <mc:Choice xmlns:p14="http://schemas.microsoft.com/office/powerpoint/2010/main" Requires="p14">
+        <mc:AlternateContent xmlns:mc="http://schemas.openxmlformats.org/markup-compatibility/2006" xmlns:p14="http://schemas.microsoft.com/office/powerpoint/2010/main">
+          <mc:Choice Requires="p14">
             <p:contentPart p14:bwMode="auto" r:id="rId23">
               <p14:nvContentPartPr>
                 <p14:cNvPr id="22" name="Ink 21">
@@ -23456,7 +23607,7 @@
               </p14:xfrm>
             </p:contentPart>
           </mc:Choice>
-          <mc:Fallback>
+          <mc:Fallback xmlns="">
             <p:pic>
               <p:nvPicPr>
                 <p:cNvPr id="22" name="Ink 21">
@@ -23487,8 +23638,8 @@
             </p:pic>
           </mc:Fallback>
         </mc:AlternateContent>
-        <mc:AlternateContent xmlns:mc="http://schemas.openxmlformats.org/markup-compatibility/2006">
-          <mc:Choice xmlns:p14="http://schemas.microsoft.com/office/powerpoint/2010/main" Requires="p14">
+        <mc:AlternateContent xmlns:mc="http://schemas.openxmlformats.org/markup-compatibility/2006" xmlns:p14="http://schemas.microsoft.com/office/powerpoint/2010/main">
+          <mc:Choice Requires="p14">
             <p:contentPart p14:bwMode="auto" r:id="rId24">
               <p14:nvContentPartPr>
                 <p14:cNvPr id="23" name="Ink 22">
@@ -23507,7 +23658,7 @@
               </p14:xfrm>
             </p:contentPart>
           </mc:Choice>
-          <mc:Fallback>
+          <mc:Fallback xmlns="">
             <p:pic>
               <p:nvPicPr>
                 <p:cNvPr id="23" name="Ink 22">
@@ -23539,8 +23690,8 @@
           </mc:Fallback>
         </mc:AlternateContent>
       </p:grpSp>
-      <mc:AlternateContent xmlns:mc="http://schemas.openxmlformats.org/markup-compatibility/2006">
-        <mc:Choice xmlns:p14="http://schemas.microsoft.com/office/powerpoint/2010/main" Requires="p14">
+      <mc:AlternateContent xmlns:mc="http://schemas.openxmlformats.org/markup-compatibility/2006" xmlns:p14="http://schemas.microsoft.com/office/powerpoint/2010/main">
+        <mc:Choice Requires="p14">
           <p:contentPart p14:bwMode="auto" r:id="rId25">
             <p14:nvContentPartPr>
               <p14:cNvPr id="24" name="Ink 23">
@@ -23559,7 +23710,7 @@
             </p14:xfrm>
           </p:contentPart>
         </mc:Choice>
-        <mc:Fallback>
+        <mc:Fallback xmlns="">
           <p:pic>
             <p:nvPicPr>
               <p:cNvPr id="24" name="Ink 23">
@@ -23590,8 +23741,8 @@
           </p:pic>
         </mc:Fallback>
       </mc:AlternateContent>
-      <mc:AlternateContent xmlns:mc="http://schemas.openxmlformats.org/markup-compatibility/2006">
-        <mc:Choice xmlns:p14="http://schemas.microsoft.com/office/powerpoint/2010/main" Requires="p14">
+      <mc:AlternateContent xmlns:mc="http://schemas.openxmlformats.org/markup-compatibility/2006" xmlns:p14="http://schemas.microsoft.com/office/powerpoint/2010/main">
+        <mc:Choice Requires="p14">
           <p:contentPart p14:bwMode="auto" r:id="rId26">
             <p14:nvContentPartPr>
               <p14:cNvPr id="25" name="Ink 24">
@@ -23610,7 +23761,7 @@
             </p14:xfrm>
           </p:contentPart>
         </mc:Choice>
-        <mc:Fallback>
+        <mc:Fallback xmlns="">
           <p:pic>
             <p:nvPicPr>
               <p:cNvPr id="25" name="Ink 24">
@@ -23641,8 +23792,8 @@
           </p:pic>
         </mc:Fallback>
       </mc:AlternateContent>
-      <mc:AlternateContent xmlns:mc="http://schemas.openxmlformats.org/markup-compatibility/2006">
-        <mc:Choice xmlns:p14="http://schemas.microsoft.com/office/powerpoint/2010/main" Requires="p14">
+      <mc:AlternateContent xmlns:mc="http://schemas.openxmlformats.org/markup-compatibility/2006" xmlns:p14="http://schemas.microsoft.com/office/powerpoint/2010/main">
+        <mc:Choice Requires="p14">
           <p:contentPart p14:bwMode="auto" r:id="rId27">
             <p14:nvContentPartPr>
               <p14:cNvPr id="26" name="Ink 25">
@@ -23661,7 +23812,7 @@
             </p14:xfrm>
           </p:contentPart>
         </mc:Choice>
-        <mc:Fallback>
+        <mc:Fallback xmlns="">
           <p:pic>
             <p:nvPicPr>
               <p:cNvPr id="26" name="Ink 25">
@@ -23692,8 +23843,8 @@
           </p:pic>
         </mc:Fallback>
       </mc:AlternateContent>
-      <mc:AlternateContent xmlns:mc="http://schemas.openxmlformats.org/markup-compatibility/2006">
-        <mc:Choice xmlns:p14="http://schemas.microsoft.com/office/powerpoint/2010/main" Requires="p14">
+      <mc:AlternateContent xmlns:mc="http://schemas.openxmlformats.org/markup-compatibility/2006" xmlns:p14="http://schemas.microsoft.com/office/powerpoint/2010/main">
+        <mc:Choice Requires="p14">
           <p:contentPart p14:bwMode="auto" r:id="rId29">
             <p14:nvContentPartPr>
               <p14:cNvPr id="27" name="Ink 26">
@@ -23712,7 +23863,7 @@
             </p14:xfrm>
           </p:contentPart>
         </mc:Choice>
-        <mc:Fallback>
+        <mc:Fallback xmlns="">
           <p:pic>
             <p:nvPicPr>
               <p:cNvPr id="27" name="Ink 26">
@@ -23743,8 +23894,8 @@
           </p:pic>
         </mc:Fallback>
       </mc:AlternateContent>
-      <mc:AlternateContent xmlns:mc="http://schemas.openxmlformats.org/markup-compatibility/2006">
-        <mc:Choice xmlns:p14="http://schemas.microsoft.com/office/powerpoint/2010/main" Requires="p14">
+      <mc:AlternateContent xmlns:mc="http://schemas.openxmlformats.org/markup-compatibility/2006" xmlns:p14="http://schemas.microsoft.com/office/powerpoint/2010/main">
+        <mc:Choice Requires="p14">
           <p:contentPart p14:bwMode="auto" r:id="rId30">
             <p14:nvContentPartPr>
               <p14:cNvPr id="28" name="Ink 27">
@@ -23763,7 +23914,7 @@
             </p14:xfrm>
           </p:contentPart>
         </mc:Choice>
-        <mc:Fallback>
+        <mc:Fallback xmlns="">
           <p:pic>
             <p:nvPicPr>
               <p:cNvPr id="28" name="Ink 27">
@@ -23794,8 +23945,8 @@
           </p:pic>
         </mc:Fallback>
       </mc:AlternateContent>
-      <mc:AlternateContent xmlns:mc="http://schemas.openxmlformats.org/markup-compatibility/2006">
-        <mc:Choice xmlns:p14="http://schemas.microsoft.com/office/powerpoint/2010/main" Requires="p14">
+      <mc:AlternateContent xmlns:mc="http://schemas.openxmlformats.org/markup-compatibility/2006" xmlns:p14="http://schemas.microsoft.com/office/powerpoint/2010/main">
+        <mc:Choice Requires="p14">
           <p:contentPart p14:bwMode="auto" r:id="rId31">
             <p14:nvContentPartPr>
               <p14:cNvPr id="29" name="Ink 28">
@@ -23814,7 +23965,7 @@
             </p14:xfrm>
           </p:contentPart>
         </mc:Choice>
-        <mc:Fallback>
+        <mc:Fallback xmlns="">
           <p:pic>
             <p:nvPicPr>
               <p:cNvPr id="29" name="Ink 28">
@@ -23845,8 +23996,8 @@
           </p:pic>
         </mc:Fallback>
       </mc:AlternateContent>
-      <mc:AlternateContent xmlns:mc="http://schemas.openxmlformats.org/markup-compatibility/2006">
-        <mc:Choice xmlns:p14="http://schemas.microsoft.com/office/powerpoint/2010/main" Requires="p14">
+      <mc:AlternateContent xmlns:mc="http://schemas.openxmlformats.org/markup-compatibility/2006" xmlns:p14="http://schemas.microsoft.com/office/powerpoint/2010/main">
+        <mc:Choice Requires="p14">
           <p:contentPart p14:bwMode="auto" r:id="rId33">
             <p14:nvContentPartPr>
               <p14:cNvPr id="30" name="Ink 29">
@@ -23865,7 +24016,7 @@
             </p14:xfrm>
           </p:contentPart>
         </mc:Choice>
-        <mc:Fallback>
+        <mc:Fallback xmlns="">
           <p:pic>
             <p:nvPicPr>
               <p:cNvPr id="30" name="Ink 29">
@@ -23896,8 +24047,8 @@
           </p:pic>
         </mc:Fallback>
       </mc:AlternateContent>
-      <mc:AlternateContent xmlns:mc="http://schemas.openxmlformats.org/markup-compatibility/2006">
-        <mc:Choice xmlns:p14="http://schemas.microsoft.com/office/powerpoint/2010/main" Requires="p14">
+      <mc:AlternateContent xmlns:mc="http://schemas.openxmlformats.org/markup-compatibility/2006" xmlns:p14="http://schemas.microsoft.com/office/powerpoint/2010/main">
+        <mc:Choice Requires="p14">
           <p:contentPart p14:bwMode="auto" r:id="rId34">
             <p14:nvContentPartPr>
               <p14:cNvPr id="31" name="Ink 30">
@@ -23916,7 +24067,7 @@
             </p14:xfrm>
           </p:contentPart>
         </mc:Choice>
-        <mc:Fallback>
+        <mc:Fallback xmlns="">
           <p:pic>
             <p:nvPicPr>
               <p:cNvPr id="31" name="Ink 30">
@@ -23967,8 +24118,8 @@
             <a:chExt cx="16920" cy="9000"/>
           </a:xfrm>
         </p:grpSpPr>
-        <mc:AlternateContent xmlns:mc="http://schemas.openxmlformats.org/markup-compatibility/2006">
-          <mc:Choice xmlns:p14="http://schemas.microsoft.com/office/powerpoint/2010/main" Requires="p14">
+        <mc:AlternateContent xmlns:mc="http://schemas.openxmlformats.org/markup-compatibility/2006" xmlns:p14="http://schemas.microsoft.com/office/powerpoint/2010/main">
+          <mc:Choice Requires="p14">
             <p:contentPart p14:bwMode="auto" r:id="rId35">
               <p14:nvContentPartPr>
                 <p14:cNvPr id="32" name="Ink 31">
@@ -23987,7 +24138,7 @@
               </p14:xfrm>
             </p:contentPart>
           </mc:Choice>
-          <mc:Fallback>
+          <mc:Fallback xmlns="">
             <p:pic>
               <p:nvPicPr>
                 <p:cNvPr id="32" name="Ink 31">
@@ -24018,8 +24169,8 @@
             </p:pic>
           </mc:Fallback>
         </mc:AlternateContent>
-        <mc:AlternateContent xmlns:mc="http://schemas.openxmlformats.org/markup-compatibility/2006">
-          <mc:Choice xmlns:p14="http://schemas.microsoft.com/office/powerpoint/2010/main" Requires="p14">
+        <mc:AlternateContent xmlns:mc="http://schemas.openxmlformats.org/markup-compatibility/2006" xmlns:p14="http://schemas.microsoft.com/office/powerpoint/2010/main">
+          <mc:Choice Requires="p14">
             <p:contentPart p14:bwMode="auto" r:id="rId36">
               <p14:nvContentPartPr>
                 <p14:cNvPr id="33" name="Ink 32">
@@ -24038,7 +24189,7 @@
               </p14:xfrm>
             </p:contentPart>
           </mc:Choice>
-          <mc:Fallback>
+          <mc:Fallback xmlns="">
             <p:pic>
               <p:nvPicPr>
                 <p:cNvPr id="33" name="Ink 32">
@@ -24090,8 +24241,8 @@
             <a:chExt cx="33840" cy="360"/>
           </a:xfrm>
         </p:grpSpPr>
-        <mc:AlternateContent xmlns:mc="http://schemas.openxmlformats.org/markup-compatibility/2006">
-          <mc:Choice xmlns:p14="http://schemas.microsoft.com/office/powerpoint/2010/main" Requires="p14">
+        <mc:AlternateContent xmlns:mc="http://schemas.openxmlformats.org/markup-compatibility/2006" xmlns:p14="http://schemas.microsoft.com/office/powerpoint/2010/main">
+          <mc:Choice Requires="p14">
             <p:contentPart p14:bwMode="auto" r:id="rId37">
               <p14:nvContentPartPr>
                 <p14:cNvPr id="34" name="Ink 33">
@@ -24110,7 +24261,7 @@
               </p14:xfrm>
             </p:contentPart>
           </mc:Choice>
-          <mc:Fallback>
+          <mc:Fallback xmlns="">
             <p:pic>
               <p:nvPicPr>
                 <p:cNvPr id="34" name="Ink 33">
@@ -24141,8 +24292,8 @@
             </p:pic>
           </mc:Fallback>
         </mc:AlternateContent>
-        <mc:AlternateContent xmlns:mc="http://schemas.openxmlformats.org/markup-compatibility/2006">
-          <mc:Choice xmlns:p14="http://schemas.microsoft.com/office/powerpoint/2010/main" Requires="p14">
+        <mc:AlternateContent xmlns:mc="http://schemas.openxmlformats.org/markup-compatibility/2006" xmlns:p14="http://schemas.microsoft.com/office/powerpoint/2010/main">
+          <mc:Choice Requires="p14">
             <p:contentPart p14:bwMode="auto" r:id="rId38">
               <p14:nvContentPartPr>
                 <p14:cNvPr id="35" name="Ink 34">
@@ -24161,7 +24312,7 @@
               </p14:xfrm>
             </p:contentPart>
           </mc:Choice>
-          <mc:Fallback>
+          <mc:Fallback xmlns="">
             <p:pic>
               <p:nvPicPr>
                 <p:cNvPr id="35" name="Ink 34">
@@ -24193,8 +24344,8 @@
           </mc:Fallback>
         </mc:AlternateContent>
       </p:grpSp>
-      <mc:AlternateContent xmlns:mc="http://schemas.openxmlformats.org/markup-compatibility/2006">
-        <mc:Choice xmlns:p14="http://schemas.microsoft.com/office/powerpoint/2010/main" Requires="p14">
+      <mc:AlternateContent xmlns:mc="http://schemas.openxmlformats.org/markup-compatibility/2006" xmlns:p14="http://schemas.microsoft.com/office/powerpoint/2010/main">
+        <mc:Choice Requires="p14">
           <p:contentPart p14:bwMode="auto" r:id="rId39">
             <p14:nvContentPartPr>
               <p14:cNvPr id="36" name="Ink 35">
@@ -24213,7 +24364,7 @@
             </p14:xfrm>
           </p:contentPart>
         </mc:Choice>
-        <mc:Fallback>
+        <mc:Fallback xmlns="">
           <p:pic>
             <p:nvPicPr>
               <p:cNvPr id="36" name="Ink 35">
@@ -24244,8 +24395,8 @@
           </p:pic>
         </mc:Fallback>
       </mc:AlternateContent>
-      <mc:AlternateContent xmlns:mc="http://schemas.openxmlformats.org/markup-compatibility/2006">
-        <mc:Choice xmlns:p14="http://schemas.microsoft.com/office/powerpoint/2010/main" Requires="p14">
+      <mc:AlternateContent xmlns:mc="http://schemas.openxmlformats.org/markup-compatibility/2006" xmlns:p14="http://schemas.microsoft.com/office/powerpoint/2010/main">
+        <mc:Choice Requires="p14">
           <p:contentPart p14:bwMode="auto" r:id="rId40">
             <p14:nvContentPartPr>
               <p14:cNvPr id="37" name="Ink 36">
@@ -24264,7 +24415,7 @@
             </p14:xfrm>
           </p:contentPart>
         </mc:Choice>
-        <mc:Fallback>
+        <mc:Fallback xmlns="">
           <p:pic>
             <p:nvPicPr>
               <p:cNvPr id="37" name="Ink 36">
@@ -24295,8 +24446,8 @@
           </p:pic>
         </mc:Fallback>
       </mc:AlternateContent>
-      <mc:AlternateContent xmlns:mc="http://schemas.openxmlformats.org/markup-compatibility/2006">
-        <mc:Choice xmlns:p14="http://schemas.microsoft.com/office/powerpoint/2010/main" Requires="p14">
+      <mc:AlternateContent xmlns:mc="http://schemas.openxmlformats.org/markup-compatibility/2006" xmlns:p14="http://schemas.microsoft.com/office/powerpoint/2010/main">
+        <mc:Choice Requires="p14">
           <p:contentPart p14:bwMode="auto" r:id="rId41">
             <p14:nvContentPartPr>
               <p14:cNvPr id="38" name="Ink 37">
@@ -24315,7 +24466,7 @@
             </p14:xfrm>
           </p:contentPart>
         </mc:Choice>
-        <mc:Fallback>
+        <mc:Fallback xmlns="">
           <p:pic>
             <p:nvPicPr>
               <p:cNvPr id="38" name="Ink 37">
@@ -24366,8 +24517,8 @@
             <a:chExt cx="8640" cy="9000"/>
           </a:xfrm>
         </p:grpSpPr>
-        <mc:AlternateContent xmlns:mc="http://schemas.openxmlformats.org/markup-compatibility/2006">
-          <mc:Choice xmlns:p14="http://schemas.microsoft.com/office/powerpoint/2010/main" Requires="p14">
+        <mc:AlternateContent xmlns:mc="http://schemas.openxmlformats.org/markup-compatibility/2006" xmlns:p14="http://schemas.microsoft.com/office/powerpoint/2010/main">
+          <mc:Choice Requires="p14">
             <p:contentPart p14:bwMode="auto" r:id="rId42">
               <p14:nvContentPartPr>
                 <p14:cNvPr id="48" name="Ink 47">
@@ -24386,7 +24537,7 @@
               </p14:xfrm>
             </p:contentPart>
           </mc:Choice>
-          <mc:Fallback>
+          <mc:Fallback xmlns="">
             <p:pic>
               <p:nvPicPr>
                 <p:cNvPr id="48" name="Ink 47">
@@ -24417,8 +24568,8 @@
             </p:pic>
           </mc:Fallback>
         </mc:AlternateContent>
-        <mc:AlternateContent xmlns:mc="http://schemas.openxmlformats.org/markup-compatibility/2006">
-          <mc:Choice xmlns:p14="http://schemas.microsoft.com/office/powerpoint/2010/main" Requires="p14">
+        <mc:AlternateContent xmlns:mc="http://schemas.openxmlformats.org/markup-compatibility/2006" xmlns:p14="http://schemas.microsoft.com/office/powerpoint/2010/main">
+          <mc:Choice Requires="p14">
             <p:contentPart p14:bwMode="auto" r:id="rId43">
               <p14:nvContentPartPr>
                 <p14:cNvPr id="49" name="Ink 48">
@@ -24437,7 +24588,7 @@
               </p14:xfrm>
             </p:contentPart>
           </mc:Choice>
-          <mc:Fallback>
+          <mc:Fallback xmlns="">
             <p:pic>
               <p:nvPicPr>
                 <p:cNvPr id="49" name="Ink 48">
@@ -24489,8 +24640,8 @@
             <a:chExt cx="381600" cy="245880"/>
           </a:xfrm>
         </p:grpSpPr>
-        <mc:AlternateContent xmlns:mc="http://schemas.openxmlformats.org/markup-compatibility/2006">
-          <mc:Choice xmlns:p14="http://schemas.microsoft.com/office/powerpoint/2010/main" Requires="p14">
+        <mc:AlternateContent xmlns:mc="http://schemas.openxmlformats.org/markup-compatibility/2006" xmlns:p14="http://schemas.microsoft.com/office/powerpoint/2010/main">
+          <mc:Choice Requires="p14">
             <p:contentPart p14:bwMode="auto" r:id="rId44">
               <p14:nvContentPartPr>
                 <p14:cNvPr id="39" name="Ink 38">
@@ -24509,7 +24660,7 @@
               </p14:xfrm>
             </p:contentPart>
           </mc:Choice>
-          <mc:Fallback>
+          <mc:Fallback xmlns="">
             <p:pic>
               <p:nvPicPr>
                 <p:cNvPr id="39" name="Ink 38">
@@ -24540,8 +24691,8 @@
             </p:pic>
           </mc:Fallback>
         </mc:AlternateContent>
-        <mc:AlternateContent xmlns:mc="http://schemas.openxmlformats.org/markup-compatibility/2006">
-          <mc:Choice xmlns:p14="http://schemas.microsoft.com/office/powerpoint/2010/main" Requires="p14">
+        <mc:AlternateContent xmlns:mc="http://schemas.openxmlformats.org/markup-compatibility/2006" xmlns:p14="http://schemas.microsoft.com/office/powerpoint/2010/main">
+          <mc:Choice Requires="p14">
             <p:contentPart p14:bwMode="auto" r:id="rId45">
               <p14:nvContentPartPr>
                 <p14:cNvPr id="40" name="Ink 39">
@@ -24560,7 +24711,7 @@
               </p14:xfrm>
             </p:contentPart>
           </mc:Choice>
-          <mc:Fallback>
+          <mc:Fallback xmlns="">
             <p:pic>
               <p:nvPicPr>
                 <p:cNvPr id="40" name="Ink 39">
@@ -24591,8 +24742,8 @@
             </p:pic>
           </mc:Fallback>
         </mc:AlternateContent>
-        <mc:AlternateContent xmlns:mc="http://schemas.openxmlformats.org/markup-compatibility/2006">
-          <mc:Choice xmlns:p14="http://schemas.microsoft.com/office/powerpoint/2010/main" Requires="p14">
+        <mc:AlternateContent xmlns:mc="http://schemas.openxmlformats.org/markup-compatibility/2006" xmlns:p14="http://schemas.microsoft.com/office/powerpoint/2010/main">
+          <mc:Choice Requires="p14">
             <p:contentPart p14:bwMode="auto" r:id="rId46">
               <p14:nvContentPartPr>
                 <p14:cNvPr id="41" name="Ink 40">
@@ -24611,7 +24762,7 @@
               </p14:xfrm>
             </p:contentPart>
           </mc:Choice>
-          <mc:Fallback>
+          <mc:Fallback xmlns="">
             <p:pic>
               <p:nvPicPr>
                 <p:cNvPr id="41" name="Ink 40">
@@ -24642,8 +24793,8 @@
             </p:pic>
           </mc:Fallback>
         </mc:AlternateContent>
-        <mc:AlternateContent xmlns:mc="http://schemas.openxmlformats.org/markup-compatibility/2006">
-          <mc:Choice xmlns:p14="http://schemas.microsoft.com/office/powerpoint/2010/main" Requires="p14">
+        <mc:AlternateContent xmlns:mc="http://schemas.openxmlformats.org/markup-compatibility/2006" xmlns:p14="http://schemas.microsoft.com/office/powerpoint/2010/main">
+          <mc:Choice Requires="p14">
             <p:contentPart p14:bwMode="auto" r:id="rId47">
               <p14:nvContentPartPr>
                 <p14:cNvPr id="42" name="Ink 41">
@@ -24662,7 +24813,7 @@
               </p14:xfrm>
             </p:contentPart>
           </mc:Choice>
-          <mc:Fallback>
+          <mc:Fallback xmlns="">
             <p:pic>
               <p:nvPicPr>
                 <p:cNvPr id="42" name="Ink 41">
@@ -24693,8 +24844,8 @@
             </p:pic>
           </mc:Fallback>
         </mc:AlternateContent>
-        <mc:AlternateContent xmlns:mc="http://schemas.openxmlformats.org/markup-compatibility/2006">
-          <mc:Choice xmlns:p14="http://schemas.microsoft.com/office/powerpoint/2010/main" Requires="p14">
+        <mc:AlternateContent xmlns:mc="http://schemas.openxmlformats.org/markup-compatibility/2006" xmlns:p14="http://schemas.microsoft.com/office/powerpoint/2010/main">
+          <mc:Choice Requires="p14">
             <p:contentPart p14:bwMode="auto" r:id="rId48">
               <p14:nvContentPartPr>
                 <p14:cNvPr id="43" name="Ink 42">
@@ -24713,7 +24864,7 @@
               </p14:xfrm>
             </p:contentPart>
           </mc:Choice>
-          <mc:Fallback>
+          <mc:Fallback xmlns="">
             <p:pic>
               <p:nvPicPr>
                 <p:cNvPr id="43" name="Ink 42">
@@ -24744,8 +24895,8 @@
             </p:pic>
           </mc:Fallback>
         </mc:AlternateContent>
-        <mc:AlternateContent xmlns:mc="http://schemas.openxmlformats.org/markup-compatibility/2006">
-          <mc:Choice xmlns:p14="http://schemas.microsoft.com/office/powerpoint/2010/main" Requires="p14">
+        <mc:AlternateContent xmlns:mc="http://schemas.openxmlformats.org/markup-compatibility/2006" xmlns:p14="http://schemas.microsoft.com/office/powerpoint/2010/main">
+          <mc:Choice Requires="p14">
             <p:contentPart p14:bwMode="auto" r:id="rId49">
               <p14:nvContentPartPr>
                 <p14:cNvPr id="44" name="Ink 43">
@@ -24764,7 +24915,7 @@
               </p14:xfrm>
             </p:contentPart>
           </mc:Choice>
-          <mc:Fallback>
+          <mc:Fallback xmlns="">
             <p:pic>
               <p:nvPicPr>
                 <p:cNvPr id="44" name="Ink 43">
@@ -24795,8 +24946,8 @@
             </p:pic>
           </mc:Fallback>
         </mc:AlternateContent>
-        <mc:AlternateContent xmlns:mc="http://schemas.openxmlformats.org/markup-compatibility/2006">
-          <mc:Choice xmlns:p14="http://schemas.microsoft.com/office/powerpoint/2010/main" Requires="p14">
+        <mc:AlternateContent xmlns:mc="http://schemas.openxmlformats.org/markup-compatibility/2006" xmlns:p14="http://schemas.microsoft.com/office/powerpoint/2010/main">
+          <mc:Choice Requires="p14">
             <p:contentPart p14:bwMode="auto" r:id="rId50">
               <p14:nvContentPartPr>
                 <p14:cNvPr id="45" name="Ink 44">
@@ -24815,7 +24966,7 @@
               </p14:xfrm>
             </p:contentPart>
           </mc:Choice>
-          <mc:Fallback>
+          <mc:Fallback xmlns="">
             <p:pic>
               <p:nvPicPr>
                 <p:cNvPr id="45" name="Ink 44">
@@ -24846,8 +24997,8 @@
             </p:pic>
           </mc:Fallback>
         </mc:AlternateContent>
-        <mc:AlternateContent xmlns:mc="http://schemas.openxmlformats.org/markup-compatibility/2006">
-          <mc:Choice xmlns:p14="http://schemas.microsoft.com/office/powerpoint/2010/main" Requires="p14">
+        <mc:AlternateContent xmlns:mc="http://schemas.openxmlformats.org/markup-compatibility/2006" xmlns:p14="http://schemas.microsoft.com/office/powerpoint/2010/main">
+          <mc:Choice Requires="p14">
             <p:contentPart p14:bwMode="auto" r:id="rId51">
               <p14:nvContentPartPr>
                 <p14:cNvPr id="46" name="Ink 45">
@@ -24866,7 +25017,7 @@
               </p14:xfrm>
             </p:contentPart>
           </mc:Choice>
-          <mc:Fallback>
+          <mc:Fallback xmlns="">
             <p:pic>
               <p:nvPicPr>
                 <p:cNvPr id="46" name="Ink 45">
@@ -24897,8 +25048,8 @@
             </p:pic>
           </mc:Fallback>
         </mc:AlternateContent>
-        <mc:AlternateContent xmlns:mc="http://schemas.openxmlformats.org/markup-compatibility/2006">
-          <mc:Choice xmlns:p14="http://schemas.microsoft.com/office/powerpoint/2010/main" Requires="p14">
+        <mc:AlternateContent xmlns:mc="http://schemas.openxmlformats.org/markup-compatibility/2006" xmlns:p14="http://schemas.microsoft.com/office/powerpoint/2010/main">
+          <mc:Choice Requires="p14">
             <p:contentPart p14:bwMode="auto" r:id="rId53">
               <p14:nvContentPartPr>
                 <p14:cNvPr id="47" name="Ink 46">
@@ -24917,7 +25068,7 @@
               </p14:xfrm>
             </p:contentPart>
           </mc:Choice>
-          <mc:Fallback>
+          <mc:Fallback xmlns="">
             <p:pic>
               <p:nvPicPr>
                 <p:cNvPr id="47" name="Ink 46">
@@ -24948,8 +25099,8 @@
             </p:pic>
           </mc:Fallback>
         </mc:AlternateContent>
-        <mc:AlternateContent xmlns:mc="http://schemas.openxmlformats.org/markup-compatibility/2006">
-          <mc:Choice xmlns:p14="http://schemas.microsoft.com/office/powerpoint/2010/main" Requires="p14">
+        <mc:AlternateContent xmlns:mc="http://schemas.openxmlformats.org/markup-compatibility/2006" xmlns:p14="http://schemas.microsoft.com/office/powerpoint/2010/main">
+          <mc:Choice Requires="p14">
             <p:contentPart p14:bwMode="auto" r:id="rId54">
               <p14:nvContentPartPr>
                 <p14:cNvPr id="50" name="Ink 49">
@@ -24968,7 +25119,7 @@
               </p14:xfrm>
             </p:contentPart>
           </mc:Choice>
-          <mc:Fallback>
+          <mc:Fallback xmlns="">
             <p:pic>
               <p:nvPicPr>
                 <p:cNvPr id="50" name="Ink 49">
@@ -25020,8 +25171,8 @@
             <a:chExt cx="1806120" cy="1414080"/>
           </a:xfrm>
         </p:grpSpPr>
-        <mc:AlternateContent xmlns:mc="http://schemas.openxmlformats.org/markup-compatibility/2006">
-          <mc:Choice xmlns:p14="http://schemas.microsoft.com/office/powerpoint/2010/main" Requires="p14">
+        <mc:AlternateContent xmlns:mc="http://schemas.openxmlformats.org/markup-compatibility/2006" xmlns:p14="http://schemas.microsoft.com/office/powerpoint/2010/main">
+          <mc:Choice Requires="p14">
             <p:contentPart p14:bwMode="auto" r:id="rId56">
               <p14:nvContentPartPr>
                 <p14:cNvPr id="61" name="Ink 60">
@@ -25040,7 +25191,7 @@
               </p14:xfrm>
             </p:contentPart>
           </mc:Choice>
-          <mc:Fallback>
+          <mc:Fallback xmlns="">
             <p:pic>
               <p:nvPicPr>
                 <p:cNvPr id="61" name="Ink 60">
@@ -25071,8 +25222,8 @@
             </p:pic>
           </mc:Fallback>
         </mc:AlternateContent>
-        <mc:AlternateContent xmlns:mc="http://schemas.openxmlformats.org/markup-compatibility/2006">
-          <mc:Choice xmlns:p14="http://schemas.microsoft.com/office/powerpoint/2010/main" Requires="p14">
+        <mc:AlternateContent xmlns:mc="http://schemas.openxmlformats.org/markup-compatibility/2006" xmlns:p14="http://schemas.microsoft.com/office/powerpoint/2010/main">
+          <mc:Choice Requires="p14">
             <p:contentPart p14:bwMode="auto" r:id="rId58">
               <p14:nvContentPartPr>
                 <p14:cNvPr id="62" name="Ink 61">
@@ -25091,7 +25242,7 @@
               </p14:xfrm>
             </p:contentPart>
           </mc:Choice>
-          <mc:Fallback>
+          <mc:Fallback xmlns="">
             <p:pic>
               <p:nvPicPr>
                 <p:cNvPr id="62" name="Ink 61">
@@ -25122,8 +25273,8 @@
             </p:pic>
           </mc:Fallback>
         </mc:AlternateContent>
-        <mc:AlternateContent xmlns:mc="http://schemas.openxmlformats.org/markup-compatibility/2006">
-          <mc:Choice xmlns:p14="http://schemas.microsoft.com/office/powerpoint/2010/main" Requires="p14">
+        <mc:AlternateContent xmlns:mc="http://schemas.openxmlformats.org/markup-compatibility/2006" xmlns:p14="http://schemas.microsoft.com/office/powerpoint/2010/main">
+          <mc:Choice Requires="p14">
             <p:contentPart p14:bwMode="auto" r:id="rId60">
               <p14:nvContentPartPr>
                 <p14:cNvPr id="63" name="Ink 62">
@@ -25142,7 +25293,7 @@
               </p14:xfrm>
             </p:contentPart>
           </mc:Choice>
-          <mc:Fallback>
+          <mc:Fallback xmlns="">
             <p:pic>
               <p:nvPicPr>
                 <p:cNvPr id="63" name="Ink 62">
@@ -27712,8 +27863,8 @@
           </a:p>
         </p:txBody>
       </p:sp>
-      <mc:AlternateContent xmlns:mc="http://schemas.openxmlformats.org/markup-compatibility/2006">
-        <mc:Choice xmlns:p14="http://schemas.microsoft.com/office/powerpoint/2010/main" Requires="p14">
+      <mc:AlternateContent xmlns:mc="http://schemas.openxmlformats.org/markup-compatibility/2006" xmlns:p14="http://schemas.microsoft.com/office/powerpoint/2010/main">
+        <mc:Choice Requires="p14">
           <p:contentPart p14:bwMode="auto" r:id="rId4">
             <p14:nvContentPartPr>
               <p14:cNvPr id="10" name="Ink 9">
@@ -27732,7 +27883,7 @@
             </p14:xfrm>
           </p:contentPart>
         </mc:Choice>
-        <mc:Fallback>
+        <mc:Fallback xmlns="">
           <p:pic>
             <p:nvPicPr>
               <p:cNvPr id="10" name="Ink 9">
@@ -27763,8 +27914,8 @@
           </p:pic>
         </mc:Fallback>
       </mc:AlternateContent>
-      <mc:AlternateContent xmlns:mc="http://schemas.openxmlformats.org/markup-compatibility/2006">
-        <mc:Choice xmlns:p14="http://schemas.microsoft.com/office/powerpoint/2010/main" Requires="p14">
+      <mc:AlternateContent xmlns:mc="http://schemas.openxmlformats.org/markup-compatibility/2006" xmlns:p14="http://schemas.microsoft.com/office/powerpoint/2010/main">
+        <mc:Choice Requires="p14">
           <p:contentPart p14:bwMode="auto" r:id="rId6">
             <p14:nvContentPartPr>
               <p14:cNvPr id="11" name="Ink 10">
@@ -27783,7 +27934,7 @@
             </p14:xfrm>
           </p:contentPart>
         </mc:Choice>
-        <mc:Fallback>
+        <mc:Fallback xmlns="">
           <p:pic>
             <p:nvPicPr>
               <p:cNvPr id="11" name="Ink 10">
@@ -27814,8 +27965,8 @@
           </p:pic>
         </mc:Fallback>
       </mc:AlternateContent>
-      <mc:AlternateContent xmlns:mc="http://schemas.openxmlformats.org/markup-compatibility/2006">
-        <mc:Choice xmlns:p14="http://schemas.microsoft.com/office/powerpoint/2010/main" Requires="p14">
+      <mc:AlternateContent xmlns:mc="http://schemas.openxmlformats.org/markup-compatibility/2006" xmlns:p14="http://schemas.microsoft.com/office/powerpoint/2010/main">
+        <mc:Choice Requires="p14">
           <p:contentPart p14:bwMode="auto" r:id="rId7">
             <p14:nvContentPartPr>
               <p14:cNvPr id="12" name="Ink 11">
@@ -27834,7 +27985,7 @@
             </p14:xfrm>
           </p:contentPart>
         </mc:Choice>
-        <mc:Fallback>
+        <mc:Fallback xmlns="">
           <p:pic>
             <p:nvPicPr>
               <p:cNvPr id="12" name="Ink 11">
@@ -27865,8 +28016,8 @@
           </p:pic>
         </mc:Fallback>
       </mc:AlternateContent>
-      <mc:AlternateContent xmlns:mc="http://schemas.openxmlformats.org/markup-compatibility/2006">
-        <mc:Choice xmlns:p14="http://schemas.microsoft.com/office/powerpoint/2010/main" Requires="p14">
+      <mc:AlternateContent xmlns:mc="http://schemas.openxmlformats.org/markup-compatibility/2006" xmlns:p14="http://schemas.microsoft.com/office/powerpoint/2010/main">
+        <mc:Choice Requires="p14">
           <p:contentPart p14:bwMode="auto" r:id="rId8">
             <p14:nvContentPartPr>
               <p14:cNvPr id="13" name="Ink 12">
@@ -27885,7 +28036,7 @@
             </p14:xfrm>
           </p:contentPart>
         </mc:Choice>
-        <mc:Fallback>
+        <mc:Fallback xmlns="">
           <p:pic>
             <p:nvPicPr>
               <p:cNvPr id="13" name="Ink 12">
@@ -27916,8 +28067,8 @@
           </p:pic>
         </mc:Fallback>
       </mc:AlternateContent>
-      <mc:AlternateContent xmlns:mc="http://schemas.openxmlformats.org/markup-compatibility/2006">
-        <mc:Choice xmlns:p14="http://schemas.microsoft.com/office/powerpoint/2010/main" Requires="p14">
+      <mc:AlternateContent xmlns:mc="http://schemas.openxmlformats.org/markup-compatibility/2006" xmlns:p14="http://schemas.microsoft.com/office/powerpoint/2010/main">
+        <mc:Choice Requires="p14">
           <p:contentPart p14:bwMode="auto" r:id="rId9">
             <p14:nvContentPartPr>
               <p14:cNvPr id="14" name="Ink 13">
@@ -27936,7 +28087,7 @@
             </p14:xfrm>
           </p:contentPart>
         </mc:Choice>
-        <mc:Fallback>
+        <mc:Fallback xmlns="">
           <p:pic>
             <p:nvPicPr>
               <p:cNvPr id="14" name="Ink 13">
@@ -27967,8 +28118,8 @@
           </p:pic>
         </mc:Fallback>
       </mc:AlternateContent>
-      <mc:AlternateContent xmlns:mc="http://schemas.openxmlformats.org/markup-compatibility/2006">
-        <mc:Choice xmlns:p14="http://schemas.microsoft.com/office/powerpoint/2010/main" Requires="p14">
+      <mc:AlternateContent xmlns:mc="http://schemas.openxmlformats.org/markup-compatibility/2006" xmlns:p14="http://schemas.microsoft.com/office/powerpoint/2010/main">
+        <mc:Choice Requires="p14">
           <p:contentPart p14:bwMode="auto" r:id="rId10">
             <p14:nvContentPartPr>
               <p14:cNvPr id="15" name="Ink 14">
@@ -27987,7 +28138,7 @@
             </p14:xfrm>
           </p:contentPart>
         </mc:Choice>
-        <mc:Fallback>
+        <mc:Fallback xmlns="">
           <p:pic>
             <p:nvPicPr>
               <p:cNvPr id="15" name="Ink 14">
@@ -28018,8 +28169,8 @@
           </p:pic>
         </mc:Fallback>
       </mc:AlternateContent>
-      <mc:AlternateContent xmlns:mc="http://schemas.openxmlformats.org/markup-compatibility/2006">
-        <mc:Choice xmlns:p14="http://schemas.microsoft.com/office/powerpoint/2010/main" Requires="p14">
+      <mc:AlternateContent xmlns:mc="http://schemas.openxmlformats.org/markup-compatibility/2006" xmlns:p14="http://schemas.microsoft.com/office/powerpoint/2010/main">
+        <mc:Choice Requires="p14">
           <p:contentPart p14:bwMode="auto" r:id="rId11">
             <p14:nvContentPartPr>
               <p14:cNvPr id="16" name="Ink 15">
@@ -28038,7 +28189,7 @@
             </p14:xfrm>
           </p:contentPart>
         </mc:Choice>
-        <mc:Fallback>
+        <mc:Fallback xmlns="">
           <p:pic>
             <p:nvPicPr>
               <p:cNvPr id="16" name="Ink 15">
@@ -28069,8 +28220,8 @@
           </p:pic>
         </mc:Fallback>
       </mc:AlternateContent>
-      <mc:AlternateContent xmlns:mc="http://schemas.openxmlformats.org/markup-compatibility/2006">
-        <mc:Choice xmlns:p14="http://schemas.microsoft.com/office/powerpoint/2010/main" Requires="p14">
+      <mc:AlternateContent xmlns:mc="http://schemas.openxmlformats.org/markup-compatibility/2006" xmlns:p14="http://schemas.microsoft.com/office/powerpoint/2010/main">
+        <mc:Choice Requires="p14">
           <p:contentPart p14:bwMode="auto" r:id="rId12">
             <p14:nvContentPartPr>
               <p14:cNvPr id="17" name="Ink 16">
@@ -28089,7 +28240,7 @@
             </p14:xfrm>
           </p:contentPart>
         </mc:Choice>
-        <mc:Fallback>
+        <mc:Fallback xmlns="">
           <p:pic>
             <p:nvPicPr>
               <p:cNvPr id="17" name="Ink 16">
@@ -28120,8 +28271,8 @@
           </p:pic>
         </mc:Fallback>
       </mc:AlternateContent>
-      <mc:AlternateContent xmlns:mc="http://schemas.openxmlformats.org/markup-compatibility/2006">
-        <mc:Choice xmlns:p14="http://schemas.microsoft.com/office/powerpoint/2010/main" Requires="p14">
+      <mc:AlternateContent xmlns:mc="http://schemas.openxmlformats.org/markup-compatibility/2006" xmlns:p14="http://schemas.microsoft.com/office/powerpoint/2010/main">
+        <mc:Choice Requires="p14">
           <p:contentPart p14:bwMode="auto" r:id="rId13">
             <p14:nvContentPartPr>
               <p14:cNvPr id="18" name="Ink 17">
@@ -28140,7 +28291,7 @@
             </p14:xfrm>
           </p:contentPart>
         </mc:Choice>
-        <mc:Fallback>
+        <mc:Fallback xmlns="">
           <p:pic>
             <p:nvPicPr>
               <p:cNvPr id="18" name="Ink 17">
@@ -28171,8 +28322,8 @@
           </p:pic>
         </mc:Fallback>
       </mc:AlternateContent>
-      <mc:AlternateContent xmlns:mc="http://schemas.openxmlformats.org/markup-compatibility/2006">
-        <mc:Choice xmlns:p14="http://schemas.microsoft.com/office/powerpoint/2010/main" Requires="p14">
+      <mc:AlternateContent xmlns:mc="http://schemas.openxmlformats.org/markup-compatibility/2006" xmlns:p14="http://schemas.microsoft.com/office/powerpoint/2010/main">
+        <mc:Choice Requires="p14">
           <p:contentPart p14:bwMode="auto" r:id="rId14">
             <p14:nvContentPartPr>
               <p14:cNvPr id="19" name="Ink 18">
@@ -28191,7 +28342,7 @@
             </p14:xfrm>
           </p:contentPart>
         </mc:Choice>
-        <mc:Fallback>
+        <mc:Fallback xmlns="">
           <p:pic>
             <p:nvPicPr>
               <p:cNvPr id="19" name="Ink 18">
@@ -28222,8 +28373,8 @@
           </p:pic>
         </mc:Fallback>
       </mc:AlternateContent>
-      <mc:AlternateContent xmlns:mc="http://schemas.openxmlformats.org/markup-compatibility/2006">
-        <mc:Choice xmlns:p14="http://schemas.microsoft.com/office/powerpoint/2010/main" Requires="p14">
+      <mc:AlternateContent xmlns:mc="http://schemas.openxmlformats.org/markup-compatibility/2006" xmlns:p14="http://schemas.microsoft.com/office/powerpoint/2010/main">
+        <mc:Choice Requires="p14">
           <p:contentPart p14:bwMode="auto" r:id="rId15">
             <p14:nvContentPartPr>
               <p14:cNvPr id="20" name="Ink 19">
@@ -28242,7 +28393,7 @@
             </p14:xfrm>
           </p:contentPart>
         </mc:Choice>
-        <mc:Fallback>
+        <mc:Fallback xmlns="">
           <p:pic>
             <p:nvPicPr>
               <p:cNvPr id="20" name="Ink 19">
@@ -28273,8 +28424,8 @@
           </p:pic>
         </mc:Fallback>
       </mc:AlternateContent>
-      <mc:AlternateContent xmlns:mc="http://schemas.openxmlformats.org/markup-compatibility/2006">
-        <mc:Choice xmlns:p14="http://schemas.microsoft.com/office/powerpoint/2010/main" Requires="p14">
+      <mc:AlternateContent xmlns:mc="http://schemas.openxmlformats.org/markup-compatibility/2006" xmlns:p14="http://schemas.microsoft.com/office/powerpoint/2010/main">
+        <mc:Choice Requires="p14">
           <p:contentPart p14:bwMode="auto" r:id="rId16">
             <p14:nvContentPartPr>
               <p14:cNvPr id="21" name="Ink 20">
@@ -28293,7 +28444,7 @@
             </p14:xfrm>
           </p:contentPart>
         </mc:Choice>
-        <mc:Fallback>
+        <mc:Fallback xmlns="">
           <p:pic>
             <p:nvPicPr>
               <p:cNvPr id="21" name="Ink 20">
@@ -28324,8 +28475,8 @@
           </p:pic>
         </mc:Fallback>
       </mc:AlternateContent>
-      <mc:AlternateContent xmlns:mc="http://schemas.openxmlformats.org/markup-compatibility/2006">
-        <mc:Choice xmlns:p14="http://schemas.microsoft.com/office/powerpoint/2010/main" Requires="p14">
+      <mc:AlternateContent xmlns:mc="http://schemas.openxmlformats.org/markup-compatibility/2006" xmlns:p14="http://schemas.microsoft.com/office/powerpoint/2010/main">
+        <mc:Choice Requires="p14">
           <p:contentPart p14:bwMode="auto" r:id="rId17">
             <p14:nvContentPartPr>
               <p14:cNvPr id="22" name="Ink 21">
@@ -28344,7 +28495,7 @@
             </p14:xfrm>
           </p:contentPart>
         </mc:Choice>
-        <mc:Fallback>
+        <mc:Fallback xmlns="">
           <p:pic>
             <p:nvPicPr>
               <p:cNvPr id="22" name="Ink 21">
@@ -28375,8 +28526,8 @@
           </p:pic>
         </mc:Fallback>
       </mc:AlternateContent>
-      <mc:AlternateContent xmlns:mc="http://schemas.openxmlformats.org/markup-compatibility/2006">
-        <mc:Choice xmlns:p14="http://schemas.microsoft.com/office/powerpoint/2010/main" Requires="p14">
+      <mc:AlternateContent xmlns:mc="http://schemas.openxmlformats.org/markup-compatibility/2006" xmlns:p14="http://schemas.microsoft.com/office/powerpoint/2010/main">
+        <mc:Choice Requires="p14">
           <p:contentPart p14:bwMode="auto" r:id="rId18">
             <p14:nvContentPartPr>
               <p14:cNvPr id="23" name="Ink 22">
@@ -28395,7 +28546,7 @@
             </p14:xfrm>
           </p:contentPart>
         </mc:Choice>
-        <mc:Fallback>
+        <mc:Fallback xmlns="">
           <p:pic>
             <p:nvPicPr>
               <p:cNvPr id="23" name="Ink 22">
@@ -28426,8 +28577,8 @@
           </p:pic>
         </mc:Fallback>
       </mc:AlternateContent>
-      <mc:AlternateContent xmlns:mc="http://schemas.openxmlformats.org/markup-compatibility/2006">
-        <mc:Choice xmlns:p14="http://schemas.microsoft.com/office/powerpoint/2010/main" Requires="p14">
+      <mc:AlternateContent xmlns:mc="http://schemas.openxmlformats.org/markup-compatibility/2006" xmlns:p14="http://schemas.microsoft.com/office/powerpoint/2010/main">
+        <mc:Choice Requires="p14">
           <p:contentPart p14:bwMode="auto" r:id="rId19">
             <p14:nvContentPartPr>
               <p14:cNvPr id="24" name="Ink 23">
@@ -28446,7 +28597,7 @@
             </p14:xfrm>
           </p:contentPart>
         </mc:Choice>
-        <mc:Fallback>
+        <mc:Fallback xmlns="">
           <p:pic>
             <p:nvPicPr>
               <p:cNvPr id="24" name="Ink 23">
@@ -28497,8 +28648,8 @@
             <a:chExt cx="360" cy="360"/>
           </a:xfrm>
         </p:grpSpPr>
-        <mc:AlternateContent xmlns:mc="http://schemas.openxmlformats.org/markup-compatibility/2006">
-          <mc:Choice xmlns:p14="http://schemas.microsoft.com/office/powerpoint/2010/main" Requires="p14">
+        <mc:AlternateContent xmlns:mc="http://schemas.openxmlformats.org/markup-compatibility/2006" xmlns:p14="http://schemas.microsoft.com/office/powerpoint/2010/main">
+          <mc:Choice Requires="p14">
             <p:contentPart p14:bwMode="auto" r:id="rId20">
               <p14:nvContentPartPr>
                 <p14:cNvPr id="25" name="Ink 24">
@@ -28517,7 +28668,7 @@
               </p14:xfrm>
             </p:contentPart>
           </mc:Choice>
-          <mc:Fallback>
+          <mc:Fallback xmlns="">
             <p:pic>
               <p:nvPicPr>
                 <p:cNvPr id="25" name="Ink 24">
@@ -28548,8 +28699,8 @@
             </p:pic>
           </mc:Fallback>
         </mc:AlternateContent>
-        <mc:AlternateContent xmlns:mc="http://schemas.openxmlformats.org/markup-compatibility/2006">
-          <mc:Choice xmlns:p14="http://schemas.microsoft.com/office/powerpoint/2010/main" Requires="p14">
+        <mc:AlternateContent xmlns:mc="http://schemas.openxmlformats.org/markup-compatibility/2006" xmlns:p14="http://schemas.microsoft.com/office/powerpoint/2010/main">
+          <mc:Choice Requires="p14">
             <p:contentPart p14:bwMode="auto" r:id="rId21">
               <p14:nvContentPartPr>
                 <p14:cNvPr id="26" name="Ink 25">
@@ -28568,7 +28719,7 @@
               </p14:xfrm>
             </p:contentPart>
           </mc:Choice>
-          <mc:Fallback>
+          <mc:Fallback xmlns="">
             <p:pic>
               <p:nvPicPr>
                 <p:cNvPr id="26" name="Ink 25">
@@ -28600,8 +28751,8 @@
           </mc:Fallback>
         </mc:AlternateContent>
       </p:grpSp>
-      <mc:AlternateContent xmlns:mc="http://schemas.openxmlformats.org/markup-compatibility/2006">
-        <mc:Choice xmlns:p14="http://schemas.microsoft.com/office/powerpoint/2010/main" Requires="p14">
+      <mc:AlternateContent xmlns:mc="http://schemas.openxmlformats.org/markup-compatibility/2006" xmlns:p14="http://schemas.microsoft.com/office/powerpoint/2010/main">
+        <mc:Choice Requires="p14">
           <p:contentPart p14:bwMode="auto" r:id="rId22">
             <p14:nvContentPartPr>
               <p14:cNvPr id="27" name="Ink 26">
@@ -28620,7 +28771,7 @@
             </p14:xfrm>
           </p:contentPart>
         </mc:Choice>
-        <mc:Fallback>
+        <mc:Fallback xmlns="">
           <p:pic>
             <p:nvPicPr>
               <p:cNvPr id="27" name="Ink 26">
@@ -28651,8 +28802,8 @@
           </p:pic>
         </mc:Fallback>
       </mc:AlternateContent>
-      <mc:AlternateContent xmlns:mc="http://schemas.openxmlformats.org/markup-compatibility/2006">
-        <mc:Choice xmlns:p14="http://schemas.microsoft.com/office/powerpoint/2010/main" Requires="p14">
+      <mc:AlternateContent xmlns:mc="http://schemas.openxmlformats.org/markup-compatibility/2006" xmlns:p14="http://schemas.microsoft.com/office/powerpoint/2010/main">
+        <mc:Choice Requires="p14">
           <p:contentPart p14:bwMode="auto" r:id="rId23">
             <p14:nvContentPartPr>
               <p14:cNvPr id="28" name="Ink 27">
@@ -28671,7 +28822,7 @@
             </p14:xfrm>
           </p:contentPart>
         </mc:Choice>
-        <mc:Fallback>
+        <mc:Fallback xmlns="">
           <p:pic>
             <p:nvPicPr>
               <p:cNvPr id="28" name="Ink 27">
@@ -28702,8 +28853,8 @@
           </p:pic>
         </mc:Fallback>
       </mc:AlternateContent>
-      <mc:AlternateContent xmlns:mc="http://schemas.openxmlformats.org/markup-compatibility/2006">
-        <mc:Choice xmlns:p14="http://schemas.microsoft.com/office/powerpoint/2010/main" Requires="p14">
+      <mc:AlternateContent xmlns:mc="http://schemas.openxmlformats.org/markup-compatibility/2006" xmlns:p14="http://schemas.microsoft.com/office/powerpoint/2010/main">
+        <mc:Choice Requires="p14">
           <p:contentPart p14:bwMode="auto" r:id="rId24">
             <p14:nvContentPartPr>
               <p14:cNvPr id="29" name="Ink 28">
@@ -28722,7 +28873,7 @@
             </p14:xfrm>
           </p:contentPart>
         </mc:Choice>
-        <mc:Fallback>
+        <mc:Fallback xmlns="">
           <p:pic>
             <p:nvPicPr>
               <p:cNvPr id="29" name="Ink 28">
@@ -28753,8 +28904,8 @@
           </p:pic>
         </mc:Fallback>
       </mc:AlternateContent>
-      <mc:AlternateContent xmlns:mc="http://schemas.openxmlformats.org/markup-compatibility/2006">
-        <mc:Choice xmlns:p14="http://schemas.microsoft.com/office/powerpoint/2010/main" Requires="p14">
+      <mc:AlternateContent xmlns:mc="http://schemas.openxmlformats.org/markup-compatibility/2006" xmlns:p14="http://schemas.microsoft.com/office/powerpoint/2010/main">
+        <mc:Choice Requires="p14">
           <p:contentPart p14:bwMode="auto" r:id="rId25">
             <p14:nvContentPartPr>
               <p14:cNvPr id="30" name="Ink 29">
@@ -28773,7 +28924,7 @@
             </p14:xfrm>
           </p:contentPart>
         </mc:Choice>
-        <mc:Fallback>
+        <mc:Fallback xmlns="">
           <p:pic>
             <p:nvPicPr>
               <p:cNvPr id="30" name="Ink 29">
@@ -28824,8 +28975,8 @@
             <a:chExt cx="360" cy="360"/>
           </a:xfrm>
         </p:grpSpPr>
-        <mc:AlternateContent xmlns:mc="http://schemas.openxmlformats.org/markup-compatibility/2006">
-          <mc:Choice xmlns:p14="http://schemas.microsoft.com/office/powerpoint/2010/main" Requires="p14">
+        <mc:AlternateContent xmlns:mc="http://schemas.openxmlformats.org/markup-compatibility/2006" xmlns:p14="http://schemas.microsoft.com/office/powerpoint/2010/main">
+          <mc:Choice Requires="p14">
             <p:contentPart p14:bwMode="auto" r:id="rId26">
               <p14:nvContentPartPr>
                 <p14:cNvPr id="31" name="Ink 30">
@@ -28844,7 +28995,7 @@
               </p14:xfrm>
             </p:contentPart>
           </mc:Choice>
-          <mc:Fallback>
+          <mc:Fallback xmlns="">
             <p:pic>
               <p:nvPicPr>
                 <p:cNvPr id="31" name="Ink 30">
@@ -28875,8 +29026,8 @@
             </p:pic>
           </mc:Fallback>
         </mc:AlternateContent>
-        <mc:AlternateContent xmlns:mc="http://schemas.openxmlformats.org/markup-compatibility/2006">
-          <mc:Choice xmlns:p14="http://schemas.microsoft.com/office/powerpoint/2010/main" Requires="p14">
+        <mc:AlternateContent xmlns:mc="http://schemas.openxmlformats.org/markup-compatibility/2006" xmlns:p14="http://schemas.microsoft.com/office/powerpoint/2010/main">
+          <mc:Choice Requires="p14">
             <p:contentPart p14:bwMode="auto" r:id="rId28">
               <p14:nvContentPartPr>
                 <p14:cNvPr id="32" name="Ink 31">
@@ -28895,7 +29046,7 @@
               </p14:xfrm>
             </p:contentPart>
           </mc:Choice>
-          <mc:Fallback>
+          <mc:Fallback xmlns="">
             <p:pic>
               <p:nvPicPr>
                 <p:cNvPr id="32" name="Ink 31">
@@ -28927,8 +29078,8 @@
           </mc:Fallback>
         </mc:AlternateContent>
       </p:grpSp>
-      <mc:AlternateContent xmlns:mc="http://schemas.openxmlformats.org/markup-compatibility/2006">
-        <mc:Choice xmlns:p14="http://schemas.microsoft.com/office/powerpoint/2010/main" Requires="p14">
+      <mc:AlternateContent xmlns:mc="http://schemas.openxmlformats.org/markup-compatibility/2006" xmlns:p14="http://schemas.microsoft.com/office/powerpoint/2010/main">
+        <mc:Choice Requires="p14">
           <p:contentPart p14:bwMode="auto" r:id="rId29">
             <p14:nvContentPartPr>
               <p14:cNvPr id="33" name="Ink 32">
@@ -28947,7 +29098,7 @@
             </p14:xfrm>
           </p:contentPart>
         </mc:Choice>
-        <mc:Fallback>
+        <mc:Fallback xmlns="">
           <p:pic>
             <p:nvPicPr>
               <p:cNvPr id="33" name="Ink 32">
@@ -28978,8 +29129,8 @@
           </p:pic>
         </mc:Fallback>
       </mc:AlternateContent>
-      <mc:AlternateContent xmlns:mc="http://schemas.openxmlformats.org/markup-compatibility/2006">
-        <mc:Choice xmlns:p14="http://schemas.microsoft.com/office/powerpoint/2010/main" Requires="p14">
+      <mc:AlternateContent xmlns:mc="http://schemas.openxmlformats.org/markup-compatibility/2006" xmlns:p14="http://schemas.microsoft.com/office/powerpoint/2010/main">
+        <mc:Choice Requires="p14">
           <p:contentPart p14:bwMode="auto" r:id="rId30">
             <p14:nvContentPartPr>
               <p14:cNvPr id="36" name="Ink 35">
@@ -28998,7 +29149,7 @@
             </p14:xfrm>
           </p:contentPart>
         </mc:Choice>
-        <mc:Fallback>
+        <mc:Fallback xmlns="">
           <p:pic>
             <p:nvPicPr>
               <p:cNvPr id="36" name="Ink 35">
@@ -29107,8 +29258,8 @@
             <a:chExt cx="360" cy="360"/>
           </a:xfrm>
         </p:grpSpPr>
-        <mc:AlternateContent xmlns:mc="http://schemas.openxmlformats.org/markup-compatibility/2006">
-          <mc:Choice xmlns:p14="http://schemas.microsoft.com/office/powerpoint/2010/main" Requires="p14">
+        <mc:AlternateContent xmlns:mc="http://schemas.openxmlformats.org/markup-compatibility/2006" xmlns:p14="http://schemas.microsoft.com/office/powerpoint/2010/main">
+          <mc:Choice Requires="p14">
             <p:contentPart p14:bwMode="auto" r:id="rId32">
               <p14:nvContentPartPr>
                 <p14:cNvPr id="38" name="Ink 37">
@@ -29127,7 +29278,7 @@
               </p14:xfrm>
             </p:contentPart>
           </mc:Choice>
-          <mc:Fallback>
+          <mc:Fallback xmlns="">
             <p:pic>
               <p:nvPicPr>
                 <p:cNvPr id="38" name="Ink 37">
@@ -29158,8 +29309,8 @@
             </p:pic>
           </mc:Fallback>
         </mc:AlternateContent>
-        <mc:AlternateContent xmlns:mc="http://schemas.openxmlformats.org/markup-compatibility/2006">
-          <mc:Choice xmlns:p14="http://schemas.microsoft.com/office/powerpoint/2010/main" Requires="p14">
+        <mc:AlternateContent xmlns:mc="http://schemas.openxmlformats.org/markup-compatibility/2006" xmlns:p14="http://schemas.microsoft.com/office/powerpoint/2010/main">
+          <mc:Choice Requires="p14">
             <p:contentPart p14:bwMode="auto" r:id="rId34">
               <p14:nvContentPartPr>
                 <p14:cNvPr id="39" name="Ink 38">
@@ -29178,7 +29329,7 @@
               </p14:xfrm>
             </p:contentPart>
           </mc:Choice>
-          <mc:Fallback>
+          <mc:Fallback xmlns="">
             <p:pic>
               <p:nvPicPr>
                 <p:cNvPr id="39" name="Ink 38">
@@ -29230,8 +29381,8 @@
             <a:chExt cx="360" cy="360"/>
           </a:xfrm>
         </p:grpSpPr>
-        <mc:AlternateContent xmlns:mc="http://schemas.openxmlformats.org/markup-compatibility/2006">
-          <mc:Choice xmlns:p14="http://schemas.microsoft.com/office/powerpoint/2010/main" Requires="p14">
+        <mc:AlternateContent xmlns:mc="http://schemas.openxmlformats.org/markup-compatibility/2006" xmlns:p14="http://schemas.microsoft.com/office/powerpoint/2010/main">
+          <mc:Choice Requires="p14">
             <p:contentPart p14:bwMode="auto" r:id="rId35">
               <p14:nvContentPartPr>
                 <p14:cNvPr id="40" name="Ink 39">
@@ -29250,7 +29401,7 @@
               </p14:xfrm>
             </p:contentPart>
           </mc:Choice>
-          <mc:Fallback>
+          <mc:Fallback xmlns="">
             <p:pic>
               <p:nvPicPr>
                 <p:cNvPr id="40" name="Ink 39">
@@ -29281,8 +29432,8 @@
             </p:pic>
           </mc:Fallback>
         </mc:AlternateContent>
-        <mc:AlternateContent xmlns:mc="http://schemas.openxmlformats.org/markup-compatibility/2006">
-          <mc:Choice xmlns:p14="http://schemas.microsoft.com/office/powerpoint/2010/main" Requires="p14">
+        <mc:AlternateContent xmlns:mc="http://schemas.openxmlformats.org/markup-compatibility/2006" xmlns:p14="http://schemas.microsoft.com/office/powerpoint/2010/main">
+          <mc:Choice Requires="p14">
             <p:contentPart p14:bwMode="auto" r:id="rId36">
               <p14:nvContentPartPr>
                 <p14:cNvPr id="41" name="Ink 40">
@@ -29301,7 +29452,7 @@
               </p14:xfrm>
             </p:contentPart>
           </mc:Choice>
-          <mc:Fallback>
+          <mc:Fallback xmlns="">
             <p:pic>
               <p:nvPicPr>
                 <p:cNvPr id="41" name="Ink 40">
@@ -29353,8 +29504,8 @@
             <a:chExt cx="360" cy="360"/>
           </a:xfrm>
         </p:grpSpPr>
-        <mc:AlternateContent xmlns:mc="http://schemas.openxmlformats.org/markup-compatibility/2006">
-          <mc:Choice xmlns:p14="http://schemas.microsoft.com/office/powerpoint/2010/main" Requires="p14">
+        <mc:AlternateContent xmlns:mc="http://schemas.openxmlformats.org/markup-compatibility/2006" xmlns:p14="http://schemas.microsoft.com/office/powerpoint/2010/main">
+          <mc:Choice Requires="p14">
             <p:contentPart p14:bwMode="auto" r:id="rId37">
               <p14:nvContentPartPr>
                 <p14:cNvPr id="44" name="Ink 43">
@@ -29373,7 +29524,7 @@
               </p14:xfrm>
             </p:contentPart>
           </mc:Choice>
-          <mc:Fallback>
+          <mc:Fallback xmlns="">
             <p:pic>
               <p:nvPicPr>
                 <p:cNvPr id="44" name="Ink 43">
@@ -29404,8 +29555,8 @@
             </p:pic>
           </mc:Fallback>
         </mc:AlternateContent>
-        <mc:AlternateContent xmlns:mc="http://schemas.openxmlformats.org/markup-compatibility/2006">
-          <mc:Choice xmlns:p14="http://schemas.microsoft.com/office/powerpoint/2010/main" Requires="p14">
+        <mc:AlternateContent xmlns:mc="http://schemas.openxmlformats.org/markup-compatibility/2006" xmlns:p14="http://schemas.microsoft.com/office/powerpoint/2010/main">
+          <mc:Choice Requires="p14">
             <p:contentPart p14:bwMode="auto" r:id="rId38">
               <p14:nvContentPartPr>
                 <p14:cNvPr id="45" name="Ink 44">
@@ -29424,7 +29575,7 @@
               </p14:xfrm>
             </p:contentPart>
           </mc:Choice>
-          <mc:Fallback>
+          <mc:Fallback xmlns="">
             <p:pic>
               <p:nvPicPr>
                 <p:cNvPr id="45" name="Ink 44">

</xml_diff>